<commit_message>
AddBlock Diagram and last fix
AddBlock Diagram and last fix
</commit_message>
<xml_diff>
--- a/ProjectDocuments/‏‏Poster_with_software.pptx
+++ b/ProjectDocuments/‏‏Poster_with_software.pptx
@@ -243,7 +243,7 @@
           <a:p>
             <a:fld id="{EBC92114-2DE2-4DBD-88F5-EC34E326FC88}" type="datetimeFigureOut">
               <a:rPr lang="he-IL" smtClean="0"/>
-              <a:t>ט"ז/אדר ב/תשפ"ד</a:t>
+              <a:t>כ"ח/אדר ב/תשפ"ד</a:t>
             </a:fld>
             <a:endParaRPr lang="he-IL"/>
           </a:p>
@@ -413,7 +413,7 @@
           <a:p>
             <a:fld id="{EBC92114-2DE2-4DBD-88F5-EC34E326FC88}" type="datetimeFigureOut">
               <a:rPr lang="he-IL" smtClean="0"/>
-              <a:t>ט"ז/אדר ב/תשפ"ד</a:t>
+              <a:t>כ"ח/אדר ב/תשפ"ד</a:t>
             </a:fld>
             <a:endParaRPr lang="he-IL"/>
           </a:p>
@@ -593,7 +593,7 @@
           <a:p>
             <a:fld id="{EBC92114-2DE2-4DBD-88F5-EC34E326FC88}" type="datetimeFigureOut">
               <a:rPr lang="he-IL" smtClean="0"/>
-              <a:t>ט"ז/אדר ב/תשפ"ד</a:t>
+              <a:t>כ"ח/אדר ב/תשפ"ד</a:t>
             </a:fld>
             <a:endParaRPr lang="he-IL"/>
           </a:p>
@@ -763,7 +763,7 @@
           <a:p>
             <a:fld id="{EBC92114-2DE2-4DBD-88F5-EC34E326FC88}" type="datetimeFigureOut">
               <a:rPr lang="he-IL" smtClean="0"/>
-              <a:t>ט"ז/אדר ב/תשפ"ד</a:t>
+              <a:t>כ"ח/אדר ב/תשפ"ד</a:t>
             </a:fld>
             <a:endParaRPr lang="he-IL"/>
           </a:p>
@@ -1007,7 +1007,7 @@
           <a:p>
             <a:fld id="{EBC92114-2DE2-4DBD-88F5-EC34E326FC88}" type="datetimeFigureOut">
               <a:rPr lang="he-IL" smtClean="0"/>
-              <a:t>ט"ז/אדר ב/תשפ"ד</a:t>
+              <a:t>כ"ח/אדר ב/תשפ"ד</a:t>
             </a:fld>
             <a:endParaRPr lang="he-IL"/>
           </a:p>
@@ -1239,7 +1239,7 @@
           <a:p>
             <a:fld id="{EBC92114-2DE2-4DBD-88F5-EC34E326FC88}" type="datetimeFigureOut">
               <a:rPr lang="he-IL" smtClean="0"/>
-              <a:t>ט"ז/אדר ב/תשפ"ד</a:t>
+              <a:t>כ"ח/אדר ב/תשפ"ד</a:t>
             </a:fld>
             <a:endParaRPr lang="he-IL"/>
           </a:p>
@@ -1606,7 +1606,7 @@
           <a:p>
             <a:fld id="{EBC92114-2DE2-4DBD-88F5-EC34E326FC88}" type="datetimeFigureOut">
               <a:rPr lang="he-IL" smtClean="0"/>
-              <a:t>ט"ז/אדר ב/תשפ"ד</a:t>
+              <a:t>כ"ח/אדר ב/תשפ"ד</a:t>
             </a:fld>
             <a:endParaRPr lang="he-IL"/>
           </a:p>
@@ -1724,7 +1724,7 @@
           <a:p>
             <a:fld id="{EBC92114-2DE2-4DBD-88F5-EC34E326FC88}" type="datetimeFigureOut">
               <a:rPr lang="he-IL" smtClean="0"/>
-              <a:t>ט"ז/אדר ב/תשפ"ד</a:t>
+              <a:t>כ"ח/אדר ב/תשפ"ד</a:t>
             </a:fld>
             <a:endParaRPr lang="he-IL"/>
           </a:p>
@@ -1819,7 +1819,7 @@
           <a:p>
             <a:fld id="{EBC92114-2DE2-4DBD-88F5-EC34E326FC88}" type="datetimeFigureOut">
               <a:rPr lang="he-IL" smtClean="0"/>
-              <a:t>ט"ז/אדר ב/תשפ"ד</a:t>
+              <a:t>כ"ח/אדר ב/תשפ"ד</a:t>
             </a:fld>
             <a:endParaRPr lang="he-IL"/>
           </a:p>
@@ -2096,7 +2096,7 @@
           <a:p>
             <a:fld id="{EBC92114-2DE2-4DBD-88F5-EC34E326FC88}" type="datetimeFigureOut">
               <a:rPr lang="he-IL" smtClean="0"/>
-              <a:t>ט"ז/אדר ב/תשפ"ד</a:t>
+              <a:t>כ"ח/אדר ב/תשפ"ד</a:t>
             </a:fld>
             <a:endParaRPr lang="he-IL"/>
           </a:p>
@@ -2353,7 +2353,7 @@
           <a:p>
             <a:fld id="{EBC92114-2DE2-4DBD-88F5-EC34E326FC88}" type="datetimeFigureOut">
               <a:rPr lang="he-IL" smtClean="0"/>
-              <a:t>ט"ז/אדר ב/תשפ"ד</a:t>
+              <a:t>כ"ח/אדר ב/תשפ"ד</a:t>
             </a:fld>
             <a:endParaRPr lang="he-IL"/>
           </a:p>
@@ -2566,7 +2566,7 @@
           <a:p>
             <a:fld id="{EBC92114-2DE2-4DBD-88F5-EC34E326FC88}" type="datetimeFigureOut">
               <a:rPr lang="he-IL" smtClean="0"/>
-              <a:t>ט"ז/אדר ב/תשפ"ד</a:t>
+              <a:t>כ"ח/אדר ב/תשפ"ד</a:t>
             </a:fld>
             <a:endParaRPr lang="he-IL"/>
           </a:p>
@@ -3388,8 +3388,14 @@
                           <a:effectLst/>
                           <a:latin typeface="+mn-lt"/>
                         </a:rPr>
-                        <a:t> </a:t>
+                        <a:t> sensor – distance Sensor</a:t>
                       </a:r>
+                    </a:p>
+                    <a:p>
+                      <a:pPr marL="457200" indent="-457200" algn="l">
+                        <a:buFont typeface="Arial" panose="020B0604020202020204" pitchFamily="34" charset="0"/>
+                        <a:buChar char="•"/>
+                      </a:pPr>
                       <a:r>
                         <a:rPr lang="en-US" sz="2400" b="0" i="0" dirty="0" smtClean="0">
                           <a:solidFill>
@@ -3398,50 +3404,7 @@
                           <a:effectLst/>
                           <a:latin typeface="+mn-lt"/>
                         </a:rPr>
-                        <a:t>sensor – distance Sensor</a:t>
-                      </a:r>
-                      <a:endParaRPr lang="en-US" sz="2400" b="0" i="0" dirty="0" smtClean="0">
-                        <a:solidFill>
-                          <a:srgbClr val="0D0D0D"/>
-                        </a:solidFill>
-                        <a:effectLst/>
-                        <a:latin typeface="+mn-lt"/>
-                      </a:endParaRPr>
-                    </a:p>
-                    <a:p>
-                      <a:pPr marL="457200" indent="-457200" algn="l">
-                        <a:buFont typeface="Arial" panose="020B0604020202020204" pitchFamily="34" charset="0"/>
-                        <a:buChar char="•"/>
-                      </a:pPr>
-                      <a:r>
-                        <a:rPr lang="en-US" sz="2400" b="0" i="0" dirty="0" smtClean="0">
-                          <a:solidFill>
-                            <a:srgbClr val="0D0D0D"/>
-                          </a:solidFill>
-                          <a:effectLst/>
-                          <a:latin typeface="+mn-lt"/>
-                        </a:rPr>
-                        <a:t>AMG8833 </a:t>
-                      </a:r>
-                      <a:r>
-                        <a:rPr lang="en-US" sz="2400" b="0" i="0" dirty="0" smtClean="0">
-                          <a:solidFill>
-                            <a:srgbClr val="0D0D0D"/>
-                          </a:solidFill>
-                          <a:effectLst/>
-                          <a:latin typeface="+mn-lt"/>
-                        </a:rPr>
-                        <a:t> - Thermal </a:t>
-                      </a:r>
-                      <a:r>
-                        <a:rPr lang="en-US" sz="2400" b="0" i="0" dirty="0" smtClean="0">
-                          <a:solidFill>
-                            <a:srgbClr val="0D0D0D"/>
-                          </a:solidFill>
-                          <a:effectLst/>
-                          <a:latin typeface="+mn-lt"/>
-                        </a:rPr>
-                        <a:t>camera</a:t>
+                        <a:t>AMG8833  - Thermal camera</a:t>
                       </a:r>
                     </a:p>
                     <a:p>
@@ -3459,13 +3422,6 @@
                         </a:rPr>
                         <a:t>FSR – Force Resistor Sensor</a:t>
                       </a:r>
-                      <a:endParaRPr lang="en-US" sz="2400" b="0" i="0" dirty="0" smtClean="0">
-                        <a:solidFill>
-                          <a:srgbClr val="0D0D0D"/>
-                        </a:solidFill>
-                        <a:effectLst/>
-                        <a:latin typeface="+mn-lt"/>
-                      </a:endParaRPr>
                     </a:p>
                     <a:p>
                       <a:pPr marL="457200" indent="-457200" algn="l">
@@ -3554,13 +3510,6 @@
                         </a:rPr>
                         <a:t> – Analog, PWM and GPIO Multiplexer</a:t>
                       </a:r>
-                      <a:endParaRPr lang="en-US" sz="2400" b="0" i="0" dirty="0" smtClean="0">
-                        <a:solidFill>
-                          <a:srgbClr val="0D0D0D"/>
-                        </a:solidFill>
-                        <a:effectLst/>
-                        <a:latin typeface="+mn-lt"/>
-                      </a:endParaRPr>
                     </a:p>
                     <a:p>
                       <a:pPr marL="0" indent="0" algn="l">
@@ -3575,37 +3524,7 @@
                           <a:effectLst/>
                           <a:latin typeface="+mn-lt"/>
                         </a:rPr>
-                        <a:t>Rigorous testing across the board ensures reliability: gyro and acceleration precision for the IMU, proximity accuracy for the </a:t>
-                      </a:r>
-                      <a:r>
-                        <a:rPr lang="en-US" sz="2400" b="0" i="0" dirty="0" smtClean="0">
-                          <a:solidFill>
-                            <a:srgbClr val="0D0D0D"/>
-                          </a:solidFill>
-                          <a:effectLst/>
-                          <a:latin typeface="+mn-lt"/>
-                        </a:rPr>
-                        <a:t>Proximity Sensor, </a:t>
-                      </a:r>
-                      <a:r>
-                        <a:rPr lang="en-US" sz="2400" b="0" i="0" dirty="0" smtClean="0">
-                          <a:solidFill>
-                            <a:srgbClr val="0D0D0D"/>
-                          </a:solidFill>
-                          <a:effectLst/>
-                          <a:latin typeface="+mn-lt"/>
-                        </a:rPr>
-                        <a:t>heat detection for the </a:t>
-                      </a:r>
-                      <a:r>
-                        <a:rPr lang="en-US" sz="2400" b="0" i="0" dirty="0" smtClean="0">
-                          <a:solidFill>
-                            <a:srgbClr val="0D0D0D"/>
-                          </a:solidFill>
-                          <a:effectLst/>
-                          <a:latin typeface="+mn-lt"/>
-                        </a:rPr>
-                        <a:t>thermal camera</a:t>
+                        <a:t>Rigorous testing across the board ensures reliability: gyro and acceleration precision for the IMU, proximity accuracy for the Proximity Sensor, heat detection for the thermal camera</a:t>
                       </a:r>
                       <a:r>
                         <a:rPr lang="en-US" sz="2400" b="0" i="0" baseline="0" dirty="0" smtClean="0">
@@ -3625,55 +3544,8 @@
                           <a:effectLst/>
                           <a:latin typeface="+mn-lt"/>
                         </a:rPr>
-                        <a:t>and </a:t>
+                        <a:t>and sensitivity for the Force resistor sensor. Output hardware are:</a:t>
                       </a:r>
-                      <a:r>
-                        <a:rPr lang="en-US" sz="2400" b="0" i="0" dirty="0" smtClean="0">
-                          <a:solidFill>
-                            <a:srgbClr val="0D0D0D"/>
-                          </a:solidFill>
-                          <a:effectLst/>
-                          <a:latin typeface="+mn-lt"/>
-                        </a:rPr>
-                        <a:t>sensitivity for the </a:t>
-                      </a:r>
-                      <a:r>
-                        <a:rPr lang="en-US" sz="2400" b="0" i="0" dirty="0" smtClean="0">
-                          <a:solidFill>
-                            <a:srgbClr val="0D0D0D"/>
-                          </a:solidFill>
-                          <a:effectLst/>
-                          <a:latin typeface="+mn-lt"/>
-                        </a:rPr>
-                        <a:t>Force resistor sensor. </a:t>
-                      </a:r>
-                      <a:r>
-                        <a:rPr lang="en-US" sz="2400" b="0" i="0" dirty="0" smtClean="0">
-                          <a:solidFill>
-                            <a:srgbClr val="0D0D0D"/>
-                          </a:solidFill>
-                          <a:effectLst/>
-                          <a:latin typeface="+mn-lt"/>
-                        </a:rPr>
-                        <a:t>Output </a:t>
-                      </a:r>
-                      <a:r>
-                        <a:rPr lang="en-US" sz="2400" b="0" i="0" dirty="0" smtClean="0">
-                          <a:solidFill>
-                            <a:srgbClr val="0D0D0D"/>
-                          </a:solidFill>
-                          <a:effectLst/>
-                          <a:latin typeface="+mn-lt"/>
-                        </a:rPr>
-                        <a:t>hardware are:</a:t>
-                      </a:r>
-                      <a:endParaRPr lang="en-US" sz="2400" b="0" i="0" dirty="0" smtClean="0">
-                        <a:solidFill>
-                          <a:srgbClr val="0D0D0D"/>
-                        </a:solidFill>
-                        <a:effectLst/>
-                        <a:latin typeface="+mn-lt"/>
-                      </a:endParaRPr>
                     </a:p>
                     <a:p>
                       <a:pPr marL="457200" indent="-457200" algn="l">
@@ -3722,13 +3594,6 @@
                         </a:rPr>
                         <a:t>RGB</a:t>
                       </a:r>
-                      <a:endParaRPr lang="en-US" sz="2400" b="0" i="0" dirty="0" smtClean="0">
-                        <a:solidFill>
-                          <a:srgbClr val="0D0D0D"/>
-                        </a:solidFill>
-                        <a:effectLst/>
-                        <a:latin typeface="+mn-lt"/>
-                      </a:endParaRPr>
                     </a:p>
                     <a:p>
                       <a:pPr marL="0" indent="0" algn="l">
@@ -4020,11 +3885,6 @@
                         </a:rPr>
                         <a:t>System Block Diagram and Arduino State Machine</a:t>
                       </a:r>
-                      <a:endParaRPr lang="en-US" sz="1400" b="1" baseline="0" dirty="0" smtClean="0">
-                        <a:effectLst/>
-                        <a:latin typeface="+mn-lt"/>
-                        <a:cs typeface="Open Sans Hebrew" panose="00000500000000000000" pitchFamily="2" charset="-79"/>
-                      </a:endParaRPr>
                     </a:p>
                   </a:txBody>
                   <a:tcPr marL="137160" marR="137160" marT="137160" marB="137160">
@@ -4122,87 +3982,7 @@
                           <a:latin typeface="+mn-lt"/>
                           <a:cs typeface="Open Sans Hebrew" panose="00000500000000000000" pitchFamily="2" charset="-79"/>
                         </a:rPr>
-                        <a:t>Our design utilizes the M5 Stack Core S3 Controller, operating on a 5V supply. It interfaces with the </a:t>
-                      </a:r>
-                      <a:r>
-                        <a:rPr lang="en-US" sz="2400" baseline="0" dirty="0" smtClean="0">
-                          <a:effectLst/>
-                          <a:latin typeface="+mn-lt"/>
-                          <a:cs typeface="Open Sans Hebrew" panose="00000500000000000000" pitchFamily="2" charset="-79"/>
-                        </a:rPr>
-                        <a:t> I2C multiplexer</a:t>
-                      </a:r>
-                      <a:r>
-                        <a:rPr lang="en-US" sz="2400" baseline="0" dirty="0" smtClean="0">
-                          <a:effectLst/>
-                          <a:latin typeface="+mn-lt"/>
-                          <a:cs typeface="Open Sans Hebrew" panose="00000500000000000000" pitchFamily="2" charset="-79"/>
-                        </a:rPr>
-                        <a:t>, linking I2C sensors such as the </a:t>
-                      </a:r>
-                      <a:r>
-                        <a:rPr lang="en-US" sz="2400" baseline="0" dirty="0" smtClean="0">
-                          <a:effectLst/>
-                          <a:latin typeface="+mn-lt"/>
-                          <a:cs typeface="Open Sans Hebrew" panose="00000500000000000000" pitchFamily="2" charset="-79"/>
-                        </a:rPr>
-                        <a:t>distance sensor </a:t>
-                      </a:r>
-                      <a:r>
-                        <a:rPr lang="en-US" sz="2400" baseline="0" dirty="0" smtClean="0">
-                          <a:effectLst/>
-                          <a:latin typeface="+mn-lt"/>
-                          <a:cs typeface="Open Sans Hebrew" panose="00000500000000000000" pitchFamily="2" charset="-79"/>
-                        </a:rPr>
-                        <a:t>and the </a:t>
-                      </a:r>
-                      <a:r>
-                        <a:rPr lang="en-US" sz="2400" baseline="0" dirty="0" smtClean="0">
-                          <a:effectLst/>
-                          <a:latin typeface="+mn-lt"/>
-                          <a:cs typeface="Open Sans Hebrew" panose="00000500000000000000" pitchFamily="2" charset="-79"/>
-                        </a:rPr>
-                        <a:t>Thermal </a:t>
-                      </a:r>
-                      <a:r>
-                        <a:rPr lang="en-US" sz="2400" baseline="0" dirty="0" smtClean="0">
-                          <a:effectLst/>
-                          <a:latin typeface="+mn-lt"/>
-                          <a:cs typeface="Open Sans Hebrew" panose="00000500000000000000" pitchFamily="2" charset="-79"/>
-                        </a:rPr>
-                        <a:t>camera. A stepdown to 3.3V was necessary  to be soldered for compatibility. The </a:t>
-                      </a:r>
-                      <a:r>
-                        <a:rPr lang="en-US" sz="2400" baseline="0" dirty="0" smtClean="0">
-                          <a:effectLst/>
-                          <a:latin typeface="+mn-lt"/>
-                          <a:cs typeface="Open Sans Hebrew" panose="00000500000000000000" pitchFamily="2" charset="-79"/>
-                        </a:rPr>
-                        <a:t>secondary, multiplexer</a:t>
-                      </a:r>
-                      <a:r>
-                        <a:rPr lang="en-US" sz="2400" baseline="0" dirty="0" smtClean="0">
-                          <a:effectLst/>
-                          <a:latin typeface="+mn-lt"/>
-                          <a:cs typeface="Open Sans Hebrew" panose="00000500000000000000" pitchFamily="2" charset="-79"/>
-                        </a:rPr>
-                        <a:t>, manages GPIO, Analog, and PWM inputs, including a built-in ADC, and connects devices like buttons, speakers, and </a:t>
-                      </a:r>
-                      <a:r>
-                        <a:rPr lang="en-US" sz="2400" baseline="0" dirty="0" smtClean="0">
-                          <a:effectLst/>
-                          <a:latin typeface="+mn-lt"/>
-                          <a:cs typeface="Open Sans Hebrew" panose="00000500000000000000" pitchFamily="2" charset="-79"/>
-                        </a:rPr>
-                        <a:t>FSR’s</a:t>
-                      </a:r>
-                      <a:r>
-                        <a:rPr lang="en-US" sz="2400" baseline="0" dirty="0" smtClean="0">
-                          <a:effectLst/>
-                          <a:latin typeface="+mn-lt"/>
-                          <a:cs typeface="Open Sans Hebrew" panose="00000500000000000000" pitchFamily="2" charset="-79"/>
-                        </a:rPr>
-                        <a:t>. For display output, the built-in port B powers an RGB </a:t>
+                        <a:t>Our design utilizes the M5 Stack Core S3 Controller, operating on a 5V supply. It interfaces with the  I2C multiplexer, linking I2C sensors such as the distance sensor and the Thermal camera. A stepdown to 3.3V was necessary  to be soldered for compatibility. The secondary, multiplexer, manages GPIO, Analog, and PWM inputs, including a built-in ADC, and connects devices like buttons, speakers, and FSR’s. For display output, the built-in port B powers an RGB </a:t>
                       </a:r>
                       <a:r>
                         <a:rPr lang="en-US" sz="2400" baseline="0" dirty="0" err="1" smtClean="0">
@@ -4373,37 +4153,7 @@
                           <a:effectLst/>
                           <a:latin typeface="+mn-lt"/>
                         </a:rPr>
-                        <a:t>Post-testing, we applied interpolation techniques to refine the thermal readings obtained with the </a:t>
-                      </a:r>
-                      <a:r>
-                        <a:rPr lang="en-US" sz="2400" b="0" i="0" dirty="0" smtClean="0">
-                          <a:solidFill>
-                            <a:srgbClr val="0D0D0D"/>
-                          </a:solidFill>
-                          <a:effectLst/>
-                          <a:latin typeface="+mn-lt"/>
-                        </a:rPr>
-                        <a:t>thermal </a:t>
-                      </a:r>
-                      <a:r>
-                        <a:rPr lang="en-US" sz="2400" b="0" i="0" dirty="0" smtClean="0">
-                          <a:solidFill>
-                            <a:srgbClr val="0D0D0D"/>
-                          </a:solidFill>
-                          <a:effectLst/>
-                          <a:latin typeface="+mn-lt"/>
-                        </a:rPr>
-                        <a:t>camera, transforming an 8x8 grid into a detailed 256x256 matrix. This upgrade allowed us to test the camera's capability to discern and enhance heat signatures, as demonstrated when a hand was placed in front of the sensor</a:t>
-                      </a:r>
-                      <a:r>
-                        <a:rPr lang="en-US" sz="2400" b="0" i="0" dirty="0" smtClean="0">
-                          <a:solidFill>
-                            <a:srgbClr val="0D0D0D"/>
-                          </a:solidFill>
-                          <a:effectLst/>
-                          <a:latin typeface="+mn-lt"/>
-                        </a:rPr>
-                        <a:t>.</a:t>
+                        <a:t>Post-testing, we applied interpolation techniques to refine the thermal readings obtained with the thermal camera, transforming an 8x8 grid into a detailed 256x256 matrix. This upgrade allowed us to test the camera's capability to discern and enhance heat signatures, as demonstrated when a hand was placed in front of the sensor.</a:t>
                       </a:r>
                     </a:p>
                     <a:p>
@@ -5116,101 +4866,8 @@
                           <a:ea typeface="+mn-ea"/>
                           <a:cs typeface="Open Sans Hebrew" panose="00000500000000000000" pitchFamily="2" charset="-79"/>
                         </a:rPr>
-                        <a:t>For the </a:t>
+                        <a:t>For the distance sensor, we conducted a ‘walk test’ distance. By approaching and then distancing the from the sensor, we observed fluctuations in the mean sensor values, which effectively indicated increases and decreases in the distance.</a:t>
                       </a:r>
-                      <a:r>
-                        <a:rPr lang="en-US" sz="2400" b="0" kern="1200" dirty="0" smtClean="0">
-                          <a:solidFill>
-                            <a:schemeClr val="tx1"/>
-                          </a:solidFill>
-                          <a:effectLst/>
-                          <a:latin typeface="+mn-lt"/>
-                          <a:ea typeface="+mn-ea"/>
-                          <a:cs typeface="Open Sans Hebrew" panose="00000500000000000000" pitchFamily="2" charset="-79"/>
-                        </a:rPr>
-                        <a:t>distance </a:t>
-                      </a:r>
-                      <a:r>
-                        <a:rPr lang="en-US" sz="2400" b="0" kern="1200" dirty="0" smtClean="0">
-                          <a:solidFill>
-                            <a:schemeClr val="tx1"/>
-                          </a:solidFill>
-                          <a:effectLst/>
-                          <a:latin typeface="+mn-lt"/>
-                          <a:ea typeface="+mn-ea"/>
-                          <a:cs typeface="Open Sans Hebrew" panose="00000500000000000000" pitchFamily="2" charset="-79"/>
-                        </a:rPr>
-                        <a:t>sensor, we conducted a </a:t>
-                      </a:r>
-                      <a:r>
-                        <a:rPr lang="en-US" sz="2400" b="0" kern="1200" dirty="0" smtClean="0">
-                          <a:solidFill>
-                            <a:schemeClr val="tx1"/>
-                          </a:solidFill>
-                          <a:effectLst/>
-                          <a:latin typeface="+mn-lt"/>
-                          <a:ea typeface="+mn-ea"/>
-                          <a:cs typeface="Open Sans Hebrew" panose="00000500000000000000" pitchFamily="2" charset="-79"/>
-                        </a:rPr>
-                        <a:t>‘walk test’ </a:t>
-                      </a:r>
-                      <a:r>
-                        <a:rPr lang="en-US" sz="2400" b="0" kern="1200" dirty="0" smtClean="0">
-                          <a:solidFill>
-                            <a:schemeClr val="tx1"/>
-                          </a:solidFill>
-                          <a:effectLst/>
-                          <a:latin typeface="+mn-lt"/>
-                          <a:ea typeface="+mn-ea"/>
-                          <a:cs typeface="Open Sans Hebrew" panose="00000500000000000000" pitchFamily="2" charset="-79"/>
-                        </a:rPr>
-                        <a:t>distance. By approaching and then distancing </a:t>
-                      </a:r>
-                      <a:r>
-                        <a:rPr lang="en-US" sz="2400" b="0" kern="1200" dirty="0" smtClean="0">
-                          <a:solidFill>
-                            <a:schemeClr val="tx1"/>
-                          </a:solidFill>
-                          <a:effectLst/>
-                          <a:latin typeface="+mn-lt"/>
-                          <a:ea typeface="+mn-ea"/>
-                          <a:cs typeface="Open Sans Hebrew" panose="00000500000000000000" pitchFamily="2" charset="-79"/>
-                        </a:rPr>
-                        <a:t>the from the sensor</a:t>
-                      </a:r>
-                      <a:r>
-                        <a:rPr lang="en-US" sz="2400" b="0" kern="1200" dirty="0" smtClean="0">
-                          <a:solidFill>
-                            <a:schemeClr val="tx1"/>
-                          </a:solidFill>
-                          <a:effectLst/>
-                          <a:latin typeface="+mn-lt"/>
-                          <a:ea typeface="+mn-ea"/>
-                          <a:cs typeface="Open Sans Hebrew" panose="00000500000000000000" pitchFamily="2" charset="-79"/>
-                        </a:rPr>
-                        <a:t>, we observed fluctuations in the mean sensor values, which effectively indicated increases and decreases in </a:t>
-                      </a:r>
-                      <a:r>
-                        <a:rPr lang="en-US" sz="2400" b="0" kern="1200" dirty="0" smtClean="0">
-                          <a:solidFill>
-                            <a:schemeClr val="tx1"/>
-                          </a:solidFill>
-                          <a:effectLst/>
-                          <a:latin typeface="+mn-lt"/>
-                          <a:ea typeface="+mn-ea"/>
-                          <a:cs typeface="Open Sans Hebrew" panose="00000500000000000000" pitchFamily="2" charset="-79"/>
-                        </a:rPr>
-                        <a:t>the distance.</a:t>
-                      </a:r>
-                      <a:endParaRPr lang="en-US" sz="2400" b="0" kern="1200" dirty="0" smtClean="0">
-                        <a:solidFill>
-                          <a:schemeClr val="tx1"/>
-                        </a:solidFill>
-                        <a:effectLst/>
-                        <a:latin typeface="+mn-lt"/>
-                        <a:ea typeface="+mn-ea"/>
-                        <a:cs typeface="Open Sans Hebrew" panose="00000500000000000000" pitchFamily="2" charset="-79"/>
-                      </a:endParaRPr>
                     </a:p>
                     <a:p>
                       <a:pPr marL="0" marR="0" lvl="0" indent="0" algn="l" defTabSz="2519995" rtl="0" eaLnBrk="1" fontAlgn="auto" latinLnBrk="0" hangingPunct="1">
@@ -5628,47 +5285,7 @@
                           <a:effectLst/>
                           <a:latin typeface="+mn-lt"/>
                         </a:rPr>
-                        <a:t>We </a:t>
-                      </a:r>
-                      <a:r>
-                        <a:rPr lang="en-US" sz="2400" b="0" i="0" dirty="0" smtClean="0">
-                          <a:solidFill>
-                            <a:srgbClr val="0D0D0D"/>
-                          </a:solidFill>
-                          <a:effectLst/>
-                          <a:latin typeface="+mn-lt"/>
-                        </a:rPr>
-                        <a:t>conducted a series of press tests on the </a:t>
-                      </a:r>
-                      <a:r>
-                        <a:rPr lang="en-US" sz="2400" b="0" i="0" dirty="0" smtClean="0">
-                          <a:solidFill>
-                            <a:srgbClr val="0D0D0D"/>
-                          </a:solidFill>
-                          <a:effectLst/>
-                          <a:latin typeface="+mn-lt"/>
-                        </a:rPr>
-                        <a:t>Force resistor sensor </a:t>
-                      </a:r>
-                      <a:r>
-                        <a:rPr lang="en-US" sz="2400" b="0" i="0" dirty="0" smtClean="0">
-                          <a:solidFill>
-                            <a:srgbClr val="0D0D0D"/>
-                          </a:solidFill>
-                          <a:effectLst/>
-                          <a:latin typeface="+mn-lt"/>
-                        </a:rPr>
-                        <a:t>to evaluate its sensitivity and responsiveness. The sensor was repeatedly compressed and released to verify its ability to consistently register pressure changes</a:t>
-                      </a:r>
-                      <a:r>
-                        <a:rPr lang="en-US" sz="2400" b="0" i="0" dirty="0" smtClean="0">
-                          <a:solidFill>
-                            <a:srgbClr val="0D0D0D"/>
-                          </a:solidFill>
-                          <a:effectLst/>
-                          <a:latin typeface="+mn-lt"/>
-                        </a:rPr>
-                        <a:t>.</a:t>
+                        <a:t>We conducted a series of press tests on the Force resistor sensor to evaluate its sensitivity and responsiveness. The sensor was repeatedly compressed and released to verify its ability to consistently register pressure changes.</a:t>
                       </a:r>
                     </a:p>
                     <a:p>
@@ -6976,15 +6593,6 @@
                         </a:rPr>
                         <a:t>Conclusions</a:t>
                       </a:r>
-                      <a:endParaRPr lang="en-US" sz="2400" b="1" kern="1200" dirty="0" smtClean="0">
-                        <a:solidFill>
-                          <a:schemeClr val="tx1"/>
-                        </a:solidFill>
-                        <a:effectLst/>
-                        <a:latin typeface="+mn-lt"/>
-                        <a:ea typeface="+mn-ea"/>
-                        <a:cs typeface="Open Sans Hebrew" panose="00000500000000000000" pitchFamily="2" charset="-79"/>
-                      </a:endParaRPr>
                     </a:p>
                     <a:p>
                       <a:pPr marL="0" marR="0" lvl="0" indent="0" algn="l" defTabSz="2519995" rtl="0" eaLnBrk="1" fontAlgn="auto" latinLnBrk="0" hangingPunct="1">
@@ -7671,15 +7279,21 @@
           <p:nvPr/>
         </p:nvPicPr>
         <p:blipFill>
-          <a:blip r:embed="rId3"/>
+          <a:blip r:embed="rId3">
+            <a:extLst>
+              <a:ext uri="{28A0092B-C50C-407E-A947-70E740481C1C}">
+                <a14:useLocalDpi xmlns:a14="http://schemas.microsoft.com/office/drawing/2010/main" val="0"/>
+              </a:ext>
+            </a:extLst>
+          </a:blip>
           <a:stretch>
             <a:fillRect/>
           </a:stretch>
         </p:blipFill>
         <p:spPr>
           <a:xfrm>
-            <a:off x="537139" y="18699968"/>
-            <a:ext cx="5764436" cy="3460955"/>
+            <a:off x="609600" y="18699968"/>
+            <a:ext cx="4806131" cy="4166003"/>
           </a:xfrm>
           <a:prstGeom prst="rect">
             <a:avLst/>
@@ -7754,7 +7368,7 @@
         <p:spPr bwMode="auto">
           <a:xfrm>
             <a:off x="6635750" y="18590564"/>
-            <a:ext cx="3937000" cy="3913835"/>
+            <a:ext cx="4438650" cy="4275407"/>
           </a:xfrm>
           <a:prstGeom prst="rect">
             <a:avLst/>

</xml_diff>

<commit_message>
Remade the poster in simcha's spec.
</commit_message>
<xml_diff>
--- a/ProjectDocuments/‏‏Poster_with_software.pptx
+++ b/ProjectDocuments/‏‏Poster_with_software.pptx
@@ -154,7 +154,7 @@
           </a:lstStyle>
           <a:p>
             <a:r>
-              <a:rPr lang="en-US" smtClean="0"/>
+              <a:rPr lang="en-US"/>
               <a:t>Click to edit Master title style</a:t>
             </a:r>
             <a:endParaRPr lang="en-US" dirty="0"/>
@@ -219,7 +219,7 @@
           </a:lstStyle>
           <a:p>
             <a:r>
-              <a:rPr lang="en-US" smtClean="0"/>
+              <a:rPr lang="en-US"/>
               <a:t>Click to edit Master subtitle style</a:t>
             </a:r>
             <a:endParaRPr lang="en-US" dirty="0"/>
@@ -243,7 +243,7 @@
           <a:p>
             <a:fld id="{EBC92114-2DE2-4DBD-88F5-EC34E326FC88}" type="datetimeFigureOut">
               <a:rPr lang="he-IL" smtClean="0"/>
-              <a:t>כ"ח/אדר ב/תשפ"ד</a:t>
+              <a:t>י"ז/ניסן/תשפ"ד</a:t>
             </a:fld>
             <a:endParaRPr lang="he-IL"/>
           </a:p>
@@ -337,7 +337,7 @@
           <a:lstStyle/>
           <a:p>
             <a:r>
-              <a:rPr lang="en-US" smtClean="0"/>
+              <a:rPr lang="en-US"/>
               <a:t>Click to edit Master title style</a:t>
             </a:r>
             <a:endParaRPr lang="en-US" dirty="0"/>
@@ -361,35 +361,35 @@
           <a:p>
             <a:pPr lvl="0"/>
             <a:r>
-              <a:rPr lang="en-US" smtClean="0"/>
+              <a:rPr lang="en-US"/>
               <a:t>Edit Master text styles</a:t>
             </a:r>
           </a:p>
           <a:p>
             <a:pPr lvl="1"/>
             <a:r>
-              <a:rPr lang="en-US" smtClean="0"/>
+              <a:rPr lang="en-US"/>
               <a:t>Second level</a:t>
             </a:r>
           </a:p>
           <a:p>
             <a:pPr lvl="2"/>
             <a:r>
-              <a:rPr lang="en-US" smtClean="0"/>
+              <a:rPr lang="en-US"/>
               <a:t>Third level</a:t>
             </a:r>
           </a:p>
           <a:p>
             <a:pPr lvl="3"/>
             <a:r>
-              <a:rPr lang="en-US" smtClean="0"/>
+              <a:rPr lang="en-US"/>
               <a:t>Fourth level</a:t>
             </a:r>
           </a:p>
           <a:p>
             <a:pPr lvl="4"/>
             <a:r>
-              <a:rPr lang="en-US" smtClean="0"/>
+              <a:rPr lang="en-US"/>
               <a:t>Fifth level</a:t>
             </a:r>
             <a:endParaRPr lang="en-US" dirty="0"/>
@@ -413,7 +413,7 @@
           <a:p>
             <a:fld id="{EBC92114-2DE2-4DBD-88F5-EC34E326FC88}" type="datetimeFigureOut">
               <a:rPr lang="he-IL" smtClean="0"/>
-              <a:t>כ"ח/אדר ב/תשפ"ד</a:t>
+              <a:t>י"ז/ניסן/תשפ"ד</a:t>
             </a:fld>
             <a:endParaRPr lang="he-IL"/>
           </a:p>
@@ -512,7 +512,7 @@
           <a:lstStyle/>
           <a:p>
             <a:r>
-              <a:rPr lang="en-US" smtClean="0"/>
+              <a:rPr lang="en-US"/>
               <a:t>Click to edit Master title style</a:t>
             </a:r>
             <a:endParaRPr lang="en-US" dirty="0"/>
@@ -541,35 +541,35 @@
           <a:p>
             <a:pPr lvl="0"/>
             <a:r>
-              <a:rPr lang="en-US" smtClean="0"/>
+              <a:rPr lang="en-US"/>
               <a:t>Edit Master text styles</a:t>
             </a:r>
           </a:p>
           <a:p>
             <a:pPr lvl="1"/>
             <a:r>
-              <a:rPr lang="en-US" smtClean="0"/>
+              <a:rPr lang="en-US"/>
               <a:t>Second level</a:t>
             </a:r>
           </a:p>
           <a:p>
             <a:pPr lvl="2"/>
             <a:r>
-              <a:rPr lang="en-US" smtClean="0"/>
+              <a:rPr lang="en-US"/>
               <a:t>Third level</a:t>
             </a:r>
           </a:p>
           <a:p>
             <a:pPr lvl="3"/>
             <a:r>
-              <a:rPr lang="en-US" smtClean="0"/>
+              <a:rPr lang="en-US"/>
               <a:t>Fourth level</a:t>
             </a:r>
           </a:p>
           <a:p>
             <a:pPr lvl="4"/>
             <a:r>
-              <a:rPr lang="en-US" smtClean="0"/>
+              <a:rPr lang="en-US"/>
               <a:t>Fifth level</a:t>
             </a:r>
             <a:endParaRPr lang="en-US" dirty="0"/>
@@ -593,7 +593,7 @@
           <a:p>
             <a:fld id="{EBC92114-2DE2-4DBD-88F5-EC34E326FC88}" type="datetimeFigureOut">
               <a:rPr lang="he-IL" smtClean="0"/>
-              <a:t>כ"ח/אדר ב/תשפ"ד</a:t>
+              <a:t>י"ז/ניסן/תשפ"ד</a:t>
             </a:fld>
             <a:endParaRPr lang="he-IL"/>
           </a:p>
@@ -687,7 +687,7 @@
           <a:lstStyle/>
           <a:p>
             <a:r>
-              <a:rPr lang="en-US" smtClean="0"/>
+              <a:rPr lang="en-US"/>
               <a:t>Click to edit Master title style</a:t>
             </a:r>
             <a:endParaRPr lang="en-US" dirty="0"/>
@@ -711,35 +711,35 @@
           <a:p>
             <a:pPr lvl="0"/>
             <a:r>
-              <a:rPr lang="en-US" smtClean="0"/>
+              <a:rPr lang="en-US"/>
               <a:t>Edit Master text styles</a:t>
             </a:r>
           </a:p>
           <a:p>
             <a:pPr lvl="1"/>
             <a:r>
-              <a:rPr lang="en-US" smtClean="0"/>
+              <a:rPr lang="en-US"/>
               <a:t>Second level</a:t>
             </a:r>
           </a:p>
           <a:p>
             <a:pPr lvl="2"/>
             <a:r>
-              <a:rPr lang="en-US" smtClean="0"/>
+              <a:rPr lang="en-US"/>
               <a:t>Third level</a:t>
             </a:r>
           </a:p>
           <a:p>
             <a:pPr lvl="3"/>
             <a:r>
-              <a:rPr lang="en-US" smtClean="0"/>
+              <a:rPr lang="en-US"/>
               <a:t>Fourth level</a:t>
             </a:r>
           </a:p>
           <a:p>
             <a:pPr lvl="4"/>
             <a:r>
-              <a:rPr lang="en-US" smtClean="0"/>
+              <a:rPr lang="en-US"/>
               <a:t>Fifth level</a:t>
             </a:r>
             <a:endParaRPr lang="en-US" dirty="0"/>
@@ -763,7 +763,7 @@
           <a:p>
             <a:fld id="{EBC92114-2DE2-4DBD-88F5-EC34E326FC88}" type="datetimeFigureOut">
               <a:rPr lang="he-IL" smtClean="0"/>
-              <a:t>כ"ח/אדר ב/תשפ"ד</a:t>
+              <a:t>י"ז/ניסן/תשפ"ד</a:t>
             </a:fld>
             <a:endParaRPr lang="he-IL"/>
           </a:p>
@@ -866,7 +866,7 @@
           </a:lstStyle>
           <a:p>
             <a:r>
-              <a:rPr lang="en-US" smtClean="0"/>
+              <a:rPr lang="en-US"/>
               <a:t>Click to edit Master title style</a:t>
             </a:r>
             <a:endParaRPr lang="en-US" dirty="0"/>
@@ -984,7 +984,7 @@
           <a:p>
             <a:pPr lvl="0"/>
             <a:r>
-              <a:rPr lang="en-US" smtClean="0"/>
+              <a:rPr lang="en-US"/>
               <a:t>Edit Master text styles</a:t>
             </a:r>
           </a:p>
@@ -1007,7 +1007,7 @@
           <a:p>
             <a:fld id="{EBC92114-2DE2-4DBD-88F5-EC34E326FC88}" type="datetimeFigureOut">
               <a:rPr lang="he-IL" smtClean="0"/>
-              <a:t>כ"ח/אדר ב/תשפ"ד</a:t>
+              <a:t>י"ז/ניסן/תשפ"ד</a:t>
             </a:fld>
             <a:endParaRPr lang="he-IL"/>
           </a:p>
@@ -1101,7 +1101,7 @@
           <a:lstStyle/>
           <a:p>
             <a:r>
-              <a:rPr lang="en-US" smtClean="0"/>
+              <a:rPr lang="en-US"/>
               <a:t>Click to edit Master title style</a:t>
             </a:r>
             <a:endParaRPr lang="en-US" dirty="0"/>
@@ -1130,35 +1130,35 @@
           <a:p>
             <a:pPr lvl="0"/>
             <a:r>
-              <a:rPr lang="en-US" smtClean="0"/>
+              <a:rPr lang="en-US"/>
               <a:t>Edit Master text styles</a:t>
             </a:r>
           </a:p>
           <a:p>
             <a:pPr lvl="1"/>
             <a:r>
-              <a:rPr lang="en-US" smtClean="0"/>
+              <a:rPr lang="en-US"/>
               <a:t>Second level</a:t>
             </a:r>
           </a:p>
           <a:p>
             <a:pPr lvl="2"/>
             <a:r>
-              <a:rPr lang="en-US" smtClean="0"/>
+              <a:rPr lang="en-US"/>
               <a:t>Third level</a:t>
             </a:r>
           </a:p>
           <a:p>
             <a:pPr lvl="3"/>
             <a:r>
-              <a:rPr lang="en-US" smtClean="0"/>
+              <a:rPr lang="en-US"/>
               <a:t>Fourth level</a:t>
             </a:r>
           </a:p>
           <a:p>
             <a:pPr lvl="4"/>
             <a:r>
-              <a:rPr lang="en-US" smtClean="0"/>
+              <a:rPr lang="en-US"/>
               <a:t>Fifth level</a:t>
             </a:r>
             <a:endParaRPr lang="en-US" dirty="0"/>
@@ -1187,35 +1187,35 @@
           <a:p>
             <a:pPr lvl="0"/>
             <a:r>
-              <a:rPr lang="en-US" smtClean="0"/>
+              <a:rPr lang="en-US"/>
               <a:t>Edit Master text styles</a:t>
             </a:r>
           </a:p>
           <a:p>
             <a:pPr lvl="1"/>
             <a:r>
-              <a:rPr lang="en-US" smtClean="0"/>
+              <a:rPr lang="en-US"/>
               <a:t>Second level</a:t>
             </a:r>
           </a:p>
           <a:p>
             <a:pPr lvl="2"/>
             <a:r>
-              <a:rPr lang="en-US" smtClean="0"/>
+              <a:rPr lang="en-US"/>
               <a:t>Third level</a:t>
             </a:r>
           </a:p>
           <a:p>
             <a:pPr lvl="3"/>
             <a:r>
-              <a:rPr lang="en-US" smtClean="0"/>
+              <a:rPr lang="en-US"/>
               <a:t>Fourth level</a:t>
             </a:r>
           </a:p>
           <a:p>
             <a:pPr lvl="4"/>
             <a:r>
-              <a:rPr lang="en-US" smtClean="0"/>
+              <a:rPr lang="en-US"/>
               <a:t>Fifth level</a:t>
             </a:r>
             <a:endParaRPr lang="en-US" dirty="0"/>
@@ -1239,7 +1239,7 @@
           <a:p>
             <a:fld id="{EBC92114-2DE2-4DBD-88F5-EC34E326FC88}" type="datetimeFigureOut">
               <a:rPr lang="he-IL" smtClean="0"/>
-              <a:t>כ"ח/אדר ב/תשפ"ד</a:t>
+              <a:t>י"ז/ניסן/תשפ"ד</a:t>
             </a:fld>
             <a:endParaRPr lang="he-IL"/>
           </a:p>
@@ -1338,7 +1338,7 @@
           <a:lstStyle/>
           <a:p>
             <a:r>
-              <a:rPr lang="en-US" smtClean="0"/>
+              <a:rPr lang="en-US"/>
               <a:t>Click to edit Master title style</a:t>
             </a:r>
             <a:endParaRPr lang="en-US" dirty="0"/>
@@ -1404,7 +1404,7 @@
           <a:p>
             <a:pPr lvl="0"/>
             <a:r>
-              <a:rPr lang="en-US" smtClean="0"/>
+              <a:rPr lang="en-US"/>
               <a:t>Edit Master text styles</a:t>
             </a:r>
           </a:p>
@@ -1432,35 +1432,35 @@
           <a:p>
             <a:pPr lvl="0"/>
             <a:r>
-              <a:rPr lang="en-US" smtClean="0"/>
+              <a:rPr lang="en-US"/>
               <a:t>Edit Master text styles</a:t>
             </a:r>
           </a:p>
           <a:p>
             <a:pPr lvl="1"/>
             <a:r>
-              <a:rPr lang="en-US" smtClean="0"/>
+              <a:rPr lang="en-US"/>
               <a:t>Second level</a:t>
             </a:r>
           </a:p>
           <a:p>
             <a:pPr lvl="2"/>
             <a:r>
-              <a:rPr lang="en-US" smtClean="0"/>
+              <a:rPr lang="en-US"/>
               <a:t>Third level</a:t>
             </a:r>
           </a:p>
           <a:p>
             <a:pPr lvl="3"/>
             <a:r>
-              <a:rPr lang="en-US" smtClean="0"/>
+              <a:rPr lang="en-US"/>
               <a:t>Fourth level</a:t>
             </a:r>
           </a:p>
           <a:p>
             <a:pPr lvl="4"/>
             <a:r>
-              <a:rPr lang="en-US" smtClean="0"/>
+              <a:rPr lang="en-US"/>
               <a:t>Fifth level</a:t>
             </a:r>
             <a:endParaRPr lang="en-US" dirty="0"/>
@@ -1526,7 +1526,7 @@
           <a:p>
             <a:pPr lvl="0"/>
             <a:r>
-              <a:rPr lang="en-US" smtClean="0"/>
+              <a:rPr lang="en-US"/>
               <a:t>Edit Master text styles</a:t>
             </a:r>
           </a:p>
@@ -1554,35 +1554,35 @@
           <a:p>
             <a:pPr lvl="0"/>
             <a:r>
-              <a:rPr lang="en-US" smtClean="0"/>
+              <a:rPr lang="en-US"/>
               <a:t>Edit Master text styles</a:t>
             </a:r>
           </a:p>
           <a:p>
             <a:pPr lvl="1"/>
             <a:r>
-              <a:rPr lang="en-US" smtClean="0"/>
+              <a:rPr lang="en-US"/>
               <a:t>Second level</a:t>
             </a:r>
           </a:p>
           <a:p>
             <a:pPr lvl="2"/>
             <a:r>
-              <a:rPr lang="en-US" smtClean="0"/>
+              <a:rPr lang="en-US"/>
               <a:t>Third level</a:t>
             </a:r>
           </a:p>
           <a:p>
             <a:pPr lvl="3"/>
             <a:r>
-              <a:rPr lang="en-US" smtClean="0"/>
+              <a:rPr lang="en-US"/>
               <a:t>Fourth level</a:t>
             </a:r>
           </a:p>
           <a:p>
             <a:pPr lvl="4"/>
             <a:r>
-              <a:rPr lang="en-US" smtClean="0"/>
+              <a:rPr lang="en-US"/>
               <a:t>Fifth level</a:t>
             </a:r>
             <a:endParaRPr lang="en-US" dirty="0"/>
@@ -1606,7 +1606,7 @@
           <a:p>
             <a:fld id="{EBC92114-2DE2-4DBD-88F5-EC34E326FC88}" type="datetimeFigureOut">
               <a:rPr lang="he-IL" smtClean="0"/>
-              <a:t>כ"ח/אדר ב/תשפ"ד</a:t>
+              <a:t>י"ז/ניסן/תשפ"ד</a:t>
             </a:fld>
             <a:endParaRPr lang="he-IL"/>
           </a:p>
@@ -1700,7 +1700,7 @@
           <a:lstStyle/>
           <a:p>
             <a:r>
-              <a:rPr lang="en-US" smtClean="0"/>
+              <a:rPr lang="en-US"/>
               <a:t>Click to edit Master title style</a:t>
             </a:r>
             <a:endParaRPr lang="en-US" dirty="0"/>
@@ -1724,7 +1724,7 @@
           <a:p>
             <a:fld id="{EBC92114-2DE2-4DBD-88F5-EC34E326FC88}" type="datetimeFigureOut">
               <a:rPr lang="he-IL" smtClean="0"/>
-              <a:t>כ"ח/אדר ב/תשפ"ד</a:t>
+              <a:t>י"ז/ניסן/תשפ"ד</a:t>
             </a:fld>
             <a:endParaRPr lang="he-IL"/>
           </a:p>
@@ -1819,7 +1819,7 @@
           <a:p>
             <a:fld id="{EBC92114-2DE2-4DBD-88F5-EC34E326FC88}" type="datetimeFigureOut">
               <a:rPr lang="he-IL" smtClean="0"/>
-              <a:t>כ"ח/אדר ב/תשפ"ד</a:t>
+              <a:t>י"ז/ניסן/תשפ"ד</a:t>
             </a:fld>
             <a:endParaRPr lang="he-IL"/>
           </a:p>
@@ -1922,7 +1922,7 @@
           </a:lstStyle>
           <a:p>
             <a:r>
-              <a:rPr lang="en-US" smtClean="0"/>
+              <a:rPr lang="en-US"/>
               <a:t>Click to edit Master title style</a:t>
             </a:r>
             <a:endParaRPr lang="en-US" dirty="0"/>
@@ -1979,35 +1979,35 @@
           <a:p>
             <a:pPr lvl="0"/>
             <a:r>
-              <a:rPr lang="en-US" smtClean="0"/>
+              <a:rPr lang="en-US"/>
               <a:t>Edit Master text styles</a:t>
             </a:r>
           </a:p>
           <a:p>
             <a:pPr lvl="1"/>
             <a:r>
-              <a:rPr lang="en-US" smtClean="0"/>
+              <a:rPr lang="en-US"/>
               <a:t>Second level</a:t>
             </a:r>
           </a:p>
           <a:p>
             <a:pPr lvl="2"/>
             <a:r>
-              <a:rPr lang="en-US" smtClean="0"/>
+              <a:rPr lang="en-US"/>
               <a:t>Third level</a:t>
             </a:r>
           </a:p>
           <a:p>
             <a:pPr lvl="3"/>
             <a:r>
-              <a:rPr lang="en-US" smtClean="0"/>
+              <a:rPr lang="en-US"/>
               <a:t>Fourth level</a:t>
             </a:r>
           </a:p>
           <a:p>
             <a:pPr lvl="4"/>
             <a:r>
-              <a:rPr lang="en-US" smtClean="0"/>
+              <a:rPr lang="en-US"/>
               <a:t>Fifth level</a:t>
             </a:r>
             <a:endParaRPr lang="en-US" dirty="0"/>
@@ -2073,7 +2073,7 @@
           <a:p>
             <a:pPr lvl="0"/>
             <a:r>
-              <a:rPr lang="en-US" smtClean="0"/>
+              <a:rPr lang="en-US"/>
               <a:t>Edit Master text styles</a:t>
             </a:r>
           </a:p>
@@ -2096,7 +2096,7 @@
           <a:p>
             <a:fld id="{EBC92114-2DE2-4DBD-88F5-EC34E326FC88}" type="datetimeFigureOut">
               <a:rPr lang="he-IL" smtClean="0"/>
-              <a:t>כ"ח/אדר ב/תשפ"ד</a:t>
+              <a:t>י"ז/ניסן/תשפ"ד</a:t>
             </a:fld>
             <a:endParaRPr lang="he-IL"/>
           </a:p>
@@ -2199,7 +2199,7 @@
           </a:lstStyle>
           <a:p>
             <a:r>
-              <a:rPr lang="en-US" smtClean="0"/>
+              <a:rPr lang="en-US"/>
               <a:t>Click to edit Master title style</a:t>
             </a:r>
             <a:endParaRPr lang="en-US" dirty="0"/>
@@ -2264,7 +2264,7 @@
           </a:lstStyle>
           <a:p>
             <a:r>
-              <a:rPr lang="en-US" smtClean="0"/>
+              <a:rPr lang="en-US"/>
               <a:t>Click icon to add picture</a:t>
             </a:r>
             <a:endParaRPr lang="en-US" dirty="0"/>
@@ -2330,7 +2330,7 @@
           <a:p>
             <a:pPr lvl="0"/>
             <a:r>
-              <a:rPr lang="en-US" smtClean="0"/>
+              <a:rPr lang="en-US"/>
               <a:t>Edit Master text styles</a:t>
             </a:r>
           </a:p>
@@ -2353,7 +2353,7 @@
           <a:p>
             <a:fld id="{EBC92114-2DE2-4DBD-88F5-EC34E326FC88}" type="datetimeFigureOut">
               <a:rPr lang="he-IL" smtClean="0"/>
-              <a:t>כ"ח/אדר ב/תשפ"ד</a:t>
+              <a:t>י"ז/ניסן/תשפ"ד</a:t>
             </a:fld>
             <a:endParaRPr lang="he-IL"/>
           </a:p>
@@ -2462,7 +2462,7 @@
           <a:lstStyle/>
           <a:p>
             <a:r>
-              <a:rPr lang="en-US" smtClean="0"/>
+              <a:rPr lang="en-US"/>
               <a:t>Click to edit Master title style</a:t>
             </a:r>
             <a:endParaRPr lang="en-US" dirty="0"/>
@@ -2496,35 +2496,35 @@
           <a:p>
             <a:pPr lvl="0"/>
             <a:r>
-              <a:rPr lang="en-US" smtClean="0"/>
+              <a:rPr lang="en-US"/>
               <a:t>Edit Master text styles</a:t>
             </a:r>
           </a:p>
           <a:p>
             <a:pPr lvl="1"/>
             <a:r>
-              <a:rPr lang="en-US" smtClean="0"/>
+              <a:rPr lang="en-US"/>
               <a:t>Second level</a:t>
             </a:r>
           </a:p>
           <a:p>
             <a:pPr lvl="2"/>
             <a:r>
-              <a:rPr lang="en-US" smtClean="0"/>
+              <a:rPr lang="en-US"/>
               <a:t>Third level</a:t>
             </a:r>
           </a:p>
           <a:p>
             <a:pPr lvl="3"/>
             <a:r>
-              <a:rPr lang="en-US" smtClean="0"/>
+              <a:rPr lang="en-US"/>
               <a:t>Fourth level</a:t>
             </a:r>
           </a:p>
           <a:p>
             <a:pPr lvl="4"/>
             <a:r>
-              <a:rPr lang="en-US" smtClean="0"/>
+              <a:rPr lang="en-US"/>
               <a:t>Fifth level</a:t>
             </a:r>
             <a:endParaRPr lang="en-US" dirty="0"/>
@@ -2566,7 +2566,7 @@
           <a:p>
             <a:fld id="{EBC92114-2DE2-4DBD-88F5-EC34E326FC88}" type="datetimeFigureOut">
               <a:rPr lang="he-IL" smtClean="0"/>
-              <a:t>כ"ח/אדר ב/תשפ"ד</a:t>
+              <a:t>י"ז/ניסן/תשפ"ד</a:t>
             </a:fld>
             <a:endParaRPr lang="he-IL"/>
           </a:p>
@@ -2980,14 +2980,14 @@
           <p:nvPr>
             <p:extLst>
               <p:ext uri="{D42A27DB-BD31-4B8C-83A1-F6EECF244321}">
-                <p14:modId xmlns:p14="http://schemas.microsoft.com/office/powerpoint/2010/main" val="1425211158"/>
+                <p14:modId xmlns:p14="http://schemas.microsoft.com/office/powerpoint/2010/main" val="3833155745"/>
               </p:ext>
             </p:extLst>
           </p:nvPr>
         </p:nvGraphicFramePr>
         <p:xfrm>
           <a:off x="307385" y="3698809"/>
-          <a:ext cx="35185420" cy="26060400"/>
+          <a:ext cx="35185420" cy="29352240"/>
         </p:xfrm>
         <a:graphic>
           <a:graphicData uri="http://schemas.openxmlformats.org/drawingml/2006/table">
@@ -3042,7 +3042,7 @@
                         <a:defRPr/>
                       </a:pPr>
                       <a:r>
-                        <a:rPr lang="en-US" sz="2400" b="1" dirty="0" smtClean="0">
+                        <a:rPr lang="en-US" sz="3600" b="1" dirty="0">
                           <a:effectLst/>
                           <a:latin typeface="+mn-lt"/>
                           <a:cs typeface="Open Sans Hebrew" panose="00000500000000000000" pitchFamily="2" charset="-79"/>
@@ -3069,7 +3069,7 @@
                         <a:defRPr/>
                       </a:pPr>
                       <a:r>
-                        <a:rPr lang="en-US" sz="2400" kern="1200" dirty="0" smtClean="0">
+                        <a:rPr lang="en-US" sz="3600" kern="1200" dirty="0">
                           <a:solidFill>
                             <a:schemeClr val="tx1"/>
                           </a:solidFill>
@@ -3100,7 +3100,7 @@
                         <a:defRPr/>
                       </a:pPr>
                       <a:r>
-                        <a:rPr lang="en-US" sz="2400" kern="1200" dirty="0" smtClean="0">
+                        <a:rPr lang="en-US" sz="3600" kern="1200" dirty="0">
                           <a:solidFill>
                             <a:schemeClr val="tx1"/>
                           </a:solidFill>
@@ -3131,107 +3131,7 @@
                         <a:defRPr/>
                       </a:pPr>
                       <a:r>
-                        <a:rPr lang="en-US" sz="2400" kern="1200" dirty="0" smtClean="0">
-                          <a:solidFill>
-                            <a:schemeClr val="tx1"/>
-                          </a:solidFill>
-                          <a:effectLst/>
-                          <a:latin typeface="+mn-lt"/>
-                          <a:ea typeface="+mn-ea"/>
-                          <a:cs typeface="Open Sans Hebrew" panose="00000500000000000000" pitchFamily="2" charset="-79"/>
-                        </a:rPr>
-                        <a:t>Software</a:t>
-                      </a:r>
-                      <a:r>
-                        <a:rPr lang="en-US" sz="2400" kern="1200" baseline="0" dirty="0" smtClean="0">
-                          <a:solidFill>
-                            <a:schemeClr val="tx1"/>
-                          </a:solidFill>
-                          <a:effectLst/>
-                          <a:latin typeface="+mn-lt"/>
-                          <a:ea typeface="+mn-ea"/>
-                          <a:cs typeface="Open Sans Hebrew" panose="00000500000000000000" pitchFamily="2" charset="-79"/>
-                        </a:rPr>
-                        <a:t> running modes - </a:t>
-                      </a:r>
-                      <a:r>
-                        <a:rPr lang="en-US" sz="2400" kern="1200" dirty="0" smtClean="0">
-                          <a:solidFill>
-                            <a:schemeClr val="tx1"/>
-                          </a:solidFill>
-                          <a:effectLst/>
-                          <a:latin typeface="+mn-lt"/>
-                          <a:ea typeface="+mn-ea"/>
-                          <a:cs typeface="Open Sans Hebrew" panose="00000500000000000000" pitchFamily="2" charset="-79"/>
-                        </a:rPr>
-                        <a:t> Standalone or slave mode.</a:t>
-                      </a:r>
-                      <a:r>
-                        <a:rPr lang="en-US" sz="2400" kern="1200" baseline="0" dirty="0" smtClean="0">
-                          <a:solidFill>
-                            <a:schemeClr val="tx1"/>
-                          </a:solidFill>
-                          <a:effectLst/>
-                          <a:latin typeface="+mn-lt"/>
-                          <a:ea typeface="+mn-ea"/>
-                          <a:cs typeface="Open Sans Hebrew" panose="00000500000000000000" pitchFamily="2" charset="-79"/>
-                        </a:rPr>
-                        <a:t> In case of slave mode,</a:t>
-                      </a:r>
-                      <a:r>
-                        <a:rPr lang="en-US" sz="2400" kern="1200" dirty="0" smtClean="0">
-                          <a:solidFill>
-                            <a:schemeClr val="tx1"/>
-                          </a:solidFill>
-                          <a:effectLst/>
-                          <a:latin typeface="+mn-lt"/>
-                          <a:ea typeface="+mn-ea"/>
-                          <a:cs typeface="Open Sans Hebrew" panose="00000500000000000000" pitchFamily="2" charset="-79"/>
-                        </a:rPr>
-                        <a:t> offering robust control through serial and Wi-Fi connectivity</a:t>
-                      </a:r>
-                      <a:r>
-                        <a:rPr lang="en-US" sz="2400" kern="1200" baseline="0" dirty="0" smtClean="0">
-                          <a:solidFill>
-                            <a:schemeClr val="tx1"/>
-                          </a:solidFill>
-                          <a:effectLst/>
-                          <a:latin typeface="+mn-lt"/>
-                          <a:ea typeface="+mn-ea"/>
-                          <a:cs typeface="Open Sans Hebrew" panose="00000500000000000000" pitchFamily="2" charset="-79"/>
-                        </a:rPr>
-                        <a:t> and integration with Raspberry PI.</a:t>
-                      </a:r>
-                      <a:endParaRPr lang="en-US" sz="2400" kern="1200" dirty="0" smtClean="0">
-                        <a:solidFill>
-                          <a:schemeClr val="tx1"/>
-                        </a:solidFill>
-                        <a:effectLst/>
-                        <a:latin typeface="+mn-lt"/>
-                        <a:ea typeface="+mn-ea"/>
-                        <a:cs typeface="Open Sans Hebrew" panose="00000500000000000000" pitchFamily="2" charset="-79"/>
-                      </a:endParaRPr>
-                    </a:p>
-                    <a:p>
-                      <a:pPr marL="457200" marR="0" lvl="0" indent="-457200" algn="l" defTabSz="2519995" rtl="0" eaLnBrk="1" fontAlgn="auto" latinLnBrk="0" hangingPunct="1">
-                        <a:lnSpc>
-                          <a:spcPct val="100000"/>
-                        </a:lnSpc>
-                        <a:spcBef>
-                          <a:spcPts val="0"/>
-                        </a:spcBef>
-                        <a:spcAft>
-                          <a:spcPts val="0"/>
-                        </a:spcAft>
-                        <a:buClrTx/>
-                        <a:buSzTx/>
-                        <a:buFont typeface="Arial" panose="020B0604020202020204" pitchFamily="34" charset="0"/>
-                        <a:buChar char="•"/>
-                        <a:tabLst/>
-                        <a:defRPr/>
-                      </a:pPr>
-                      <a:r>
-                        <a:rPr lang="en-US" sz="2400" kern="1200" baseline="0" dirty="0" smtClean="0">
+                        <a:rPr lang="en-US" sz="3600" kern="1200" baseline="0" dirty="0">
                           <a:solidFill>
                             <a:schemeClr val="tx1"/>
                           </a:solidFill>
@@ -3242,31 +3142,31 @@
                         </a:rPr>
                         <a:t>Accompanying this hardware is a thorough documentation, meticulously detailing the setup procedures and operational guidelines for the custom software we have developed, and regard the hardware and testing.</a:t>
                       </a:r>
-                      <a:endParaRPr lang="en-US" sz="2400" dirty="0" smtClean="0">
-                        <a:effectLst/>
-                        <a:latin typeface="+mn-lt"/>
-                        <a:cs typeface="Open Sans Hebrew" panose="00000500000000000000" pitchFamily="2" charset="-79"/>
-                      </a:endParaRPr>
-                    </a:p>
-                    <a:p>
-                      <a:pPr marL="0" marR="0" lvl="0" indent="0" algn="l" defTabSz="2519995" rtl="0" eaLnBrk="1" fontAlgn="auto" latinLnBrk="0" hangingPunct="1">
-                        <a:lnSpc>
-                          <a:spcPct val="100000"/>
-                        </a:lnSpc>
-                        <a:spcBef>
-                          <a:spcPts val="0"/>
-                        </a:spcBef>
-                        <a:spcAft>
-                          <a:spcPts val="0"/>
-                        </a:spcAft>
-                        <a:buClrTx/>
-                        <a:buSzTx/>
-                        <a:buFontTx/>
-                        <a:buNone/>
-                        <a:tabLst/>
-                        <a:defRPr/>
-                      </a:pPr>
-                      <a:endParaRPr lang="en-US" sz="2400" b="1" kern="1200" dirty="0" smtClean="0">
+                      <a:endParaRPr lang="en-US" sz="3600" dirty="0">
+                        <a:effectLst/>
+                        <a:latin typeface="+mn-lt"/>
+                        <a:cs typeface="Open Sans Hebrew" panose="00000500000000000000" pitchFamily="2" charset="-79"/>
+                      </a:endParaRPr>
+                    </a:p>
+                    <a:p>
+                      <a:pPr marL="0" marR="0" lvl="0" indent="0" algn="l" defTabSz="2519995" rtl="0" eaLnBrk="1" fontAlgn="auto" latinLnBrk="0" hangingPunct="1">
+                        <a:lnSpc>
+                          <a:spcPct val="100000"/>
+                        </a:lnSpc>
+                        <a:spcBef>
+                          <a:spcPts val="0"/>
+                        </a:spcBef>
+                        <a:spcAft>
+                          <a:spcPts val="0"/>
+                        </a:spcAft>
+                        <a:buClrTx/>
+                        <a:buSzTx/>
+                        <a:buFontTx/>
+                        <a:buNone/>
+                        <a:tabLst/>
+                        <a:defRPr/>
+                      </a:pPr>
+                      <a:endParaRPr lang="en-US" sz="3600" b="1" kern="1200" dirty="0">
                         <a:solidFill>
                           <a:schemeClr val="tx1"/>
                         </a:solidFill>
@@ -3295,7 +3195,7 @@
                         <a:defRPr/>
                       </a:pPr>
                       <a:r>
-                        <a:rPr lang="en-US" sz="2400" b="1" kern="1200" dirty="0" smtClean="0">
+                        <a:rPr lang="en-US" sz="3600" b="1" kern="1200" dirty="0">
                           <a:solidFill>
                             <a:schemeClr val="tx1"/>
                           </a:solidFill>
@@ -3306,26 +3206,7 @@
                         </a:rPr>
                         <a:t>Motivation/Objectives</a:t>
                       </a:r>
-                    </a:p>
-                    <a:p>
-                      <a:pPr marL="0" marR="0" lvl="0" indent="0" algn="l" defTabSz="2519995" rtl="0" eaLnBrk="1" fontAlgn="auto" latinLnBrk="0" hangingPunct="1">
-                        <a:lnSpc>
-                          <a:spcPct val="100000"/>
-                        </a:lnSpc>
-                        <a:spcBef>
-                          <a:spcPts val="0"/>
-                        </a:spcBef>
-                        <a:spcAft>
-                          <a:spcPts val="0"/>
-                        </a:spcAft>
-                        <a:buClrTx/>
-                        <a:buSzTx/>
-                        <a:buFontTx/>
-                        <a:buNone/>
-                        <a:tabLst/>
-                        <a:defRPr/>
-                      </a:pPr>
-                      <a:endParaRPr lang="en-US" sz="2400" kern="1200" dirty="0" smtClean="0">
+                      <a:endParaRPr lang="en-US" sz="3600" kern="1200" dirty="0">
                         <a:solidFill>
                           <a:schemeClr val="tx1"/>
                         </a:solidFill>
@@ -3336,179 +3217,67 @@
                       </a:endParaRPr>
                     </a:p>
                     <a:p>
-                      <a:pPr algn="l"/>
+                      <a:pPr marL="571500" indent="-571500" algn="l">
+                        <a:buFont typeface="Arial" panose="020B0604020202020204" pitchFamily="34" charset="0"/>
+                        <a:buChar char="•"/>
+                      </a:pPr>
                       <a:r>
-                        <a:rPr lang="en-US" sz="2400" b="0" i="0" dirty="0" smtClean="0">
+                        <a:rPr lang="en-US" sz="3600" b="0" i="0" dirty="0">
                           <a:solidFill>
                             <a:srgbClr val="0D0D0D"/>
                           </a:solidFill>
                           <a:effectLst/>
                           <a:latin typeface="+mn-lt"/>
                         </a:rPr>
-                        <a:t>A robust framework around the M5 Stack controller with an ESP32 core, featuring</a:t>
+                        <a:t>A robust framework around the M5 Stack controller with an ESP32 core, featuring a variety of sensors and outputs.</a:t>
                       </a:r>
+                    </a:p>
+                    <a:p>
+                      <a:pPr marL="571500" indent="-571500" algn="l">
+                        <a:buFont typeface="Arial" panose="020B0604020202020204" pitchFamily="34" charset="0"/>
+                        <a:buChar char="•"/>
+                      </a:pPr>
                       <a:r>
-                        <a:rPr lang="he-IL" sz="2400" b="0" i="0" dirty="0" smtClean="0">
+                        <a:rPr lang="en-US" sz="3600" b="0" i="0" dirty="0">
                           <a:solidFill>
                             <a:srgbClr val="0D0D0D"/>
                           </a:solidFill>
                           <a:effectLst/>
                           <a:latin typeface="+mn-lt"/>
                         </a:rPr>
-                        <a:t>:</a:t>
+                        <a:t>Rigorous testing across the board ensures reliable results for sensors.</a:t>
                       </a:r>
-                      <a:endParaRPr lang="en-US" sz="2400" b="0" i="0" dirty="0" smtClean="0">
-                        <a:solidFill>
-                          <a:srgbClr val="0D0D0D"/>
-                        </a:solidFill>
-                        <a:effectLst/>
-                        <a:latin typeface="+mn-lt"/>
-                      </a:endParaRPr>
-                    </a:p>
-                    <a:p>
-                      <a:pPr marL="457200" indent="-457200" algn="l">
+                    </a:p>
+                    <a:p>
+                      <a:pPr marL="571500" indent="-571500" algn="l">
                         <a:buFont typeface="Arial" panose="020B0604020202020204" pitchFamily="34" charset="0"/>
                         <a:buChar char="•"/>
                       </a:pPr>
                       <a:r>
-                        <a:rPr lang="en-US" sz="2400" b="0" i="0" dirty="0" err="1" smtClean="0">
+                        <a:rPr lang="en-US" sz="3600" b="0" i="0" dirty="0">
                           <a:solidFill>
                             <a:srgbClr val="0D0D0D"/>
                           </a:solidFill>
                           <a:effectLst/>
                           <a:latin typeface="+mn-lt"/>
                         </a:rPr>
-                        <a:t>ToF</a:t>
+                        <a:t>Embedded documentation facilitates easy adoption, setting a solid foundation for future projects without redundant testing or development.</a:t>
                       </a:r>
+                    </a:p>
+                    <a:p>
+                      <a:pPr marL="571500" indent="-571500" algn="l">
+                        <a:buFont typeface="Arial" panose="020B0604020202020204" pitchFamily="34" charset="0"/>
+                        <a:buChar char="•"/>
+                      </a:pPr>
                       <a:r>
-                        <a:rPr lang="en-US" sz="2400" b="0" i="0" dirty="0" smtClean="0">
+                        <a:rPr lang="en-US" sz="3600" b="0" i="0" dirty="0">
                           <a:solidFill>
                             <a:srgbClr val="0D0D0D"/>
                           </a:solidFill>
                           <a:effectLst/>
                           <a:latin typeface="+mn-lt"/>
                         </a:rPr>
-                        <a:t> sensor – distance Sensor</a:t>
-                      </a:r>
-                    </a:p>
-                    <a:p>
-                      <a:pPr marL="457200" indent="-457200" algn="l">
-                        <a:buFont typeface="Arial" panose="020B0604020202020204" pitchFamily="34" charset="0"/>
-                        <a:buChar char="•"/>
-                      </a:pPr>
-                      <a:r>
-                        <a:rPr lang="en-US" sz="2400" b="0" i="0" dirty="0" smtClean="0">
-                          <a:solidFill>
-                            <a:srgbClr val="0D0D0D"/>
-                          </a:solidFill>
-                          <a:effectLst/>
-                          <a:latin typeface="+mn-lt"/>
-                        </a:rPr>
-                        <a:t>AMG8833  - Thermal camera</a:t>
-                      </a:r>
-                    </a:p>
-                    <a:p>
-                      <a:pPr marL="457200" indent="-457200" algn="l">
-                        <a:buFont typeface="Arial" panose="020B0604020202020204" pitchFamily="34" charset="0"/>
-                        <a:buChar char="•"/>
-                      </a:pPr>
-                      <a:r>
-                        <a:rPr lang="en-US" sz="2400" b="0" i="0" dirty="0" smtClean="0">
-                          <a:solidFill>
-                            <a:srgbClr val="0D0D0D"/>
-                          </a:solidFill>
-                          <a:effectLst/>
-                          <a:latin typeface="+mn-lt"/>
-                        </a:rPr>
-                        <a:t>FSR – Force Resistor Sensor</a:t>
-                      </a:r>
-                    </a:p>
-                    <a:p>
-                      <a:pPr marL="457200" indent="-457200" algn="l">
-                        <a:buFont typeface="Arial" panose="020B0604020202020204" pitchFamily="34" charset="0"/>
-                        <a:buChar char="•"/>
-                      </a:pPr>
-                      <a:r>
-                        <a:rPr lang="en-US" sz="2400" b="0" i="0" dirty="0" smtClean="0">
-                          <a:solidFill>
-                            <a:srgbClr val="0D0D0D"/>
-                          </a:solidFill>
-                          <a:effectLst/>
-                          <a:latin typeface="+mn-lt"/>
-                        </a:rPr>
-                        <a:t>IMU –</a:t>
-                      </a:r>
-                      <a:r>
-                        <a:rPr lang="en-US" sz="2400" b="0" i="0" baseline="0" dirty="0" smtClean="0">
-                          <a:solidFill>
-                            <a:srgbClr val="0D0D0D"/>
-                          </a:solidFill>
-                          <a:effectLst/>
-                          <a:latin typeface="+mn-lt"/>
-                        </a:rPr>
-                        <a:t> Inertial Measurement Unit</a:t>
-                      </a:r>
-                      <a:r>
-                        <a:rPr lang="en-US" sz="2400" b="0" i="0" dirty="0" smtClean="0">
-                          <a:solidFill>
-                            <a:srgbClr val="0D0D0D"/>
-                          </a:solidFill>
-                          <a:effectLst/>
-                          <a:latin typeface="+mn-lt"/>
-                        </a:rPr>
-                        <a:t>. </a:t>
-                      </a:r>
-                    </a:p>
-                    <a:p>
-                      <a:pPr marL="457200" indent="-457200" algn="l">
-                        <a:buFont typeface="Arial" panose="020B0604020202020204" pitchFamily="34" charset="0"/>
-                        <a:buChar char="•"/>
-                      </a:pPr>
-                      <a:r>
-                        <a:rPr lang="en-US" sz="2400" b="0" i="0" dirty="0" err="1" smtClean="0">
-                          <a:solidFill>
-                            <a:srgbClr val="0D0D0D"/>
-                          </a:solidFill>
-                          <a:effectLst/>
-                          <a:latin typeface="+mn-lt"/>
-                        </a:rPr>
-                        <a:t>PaHub</a:t>
-                      </a:r>
-                      <a:r>
-                        <a:rPr lang="en-US" sz="2400" b="0" i="0" dirty="0" smtClean="0">
-                          <a:solidFill>
-                            <a:srgbClr val="0D0D0D"/>
-                          </a:solidFill>
-                          <a:effectLst/>
-                          <a:latin typeface="+mn-lt"/>
-                        </a:rPr>
-                        <a:t> – I2C Multiplexer</a:t>
-                      </a:r>
-                    </a:p>
-                    <a:p>
-                      <a:pPr marL="457200" indent="-457200" algn="l">
-                        <a:buFont typeface="Arial" panose="020B0604020202020204" pitchFamily="34" charset="0"/>
-                        <a:buChar char="•"/>
-                      </a:pPr>
-                      <a:r>
-                        <a:rPr lang="en-US" sz="2400" b="0" i="0" dirty="0" err="1" smtClean="0">
-                          <a:solidFill>
-                            <a:srgbClr val="0D0D0D"/>
-                          </a:solidFill>
-                          <a:effectLst/>
-                          <a:latin typeface="+mn-lt"/>
-                        </a:rPr>
-                        <a:t>PbHub</a:t>
-                      </a:r>
-                      <a:r>
-                        <a:rPr lang="en-US" sz="2400" b="0" i="0" dirty="0" smtClean="0">
-                          <a:solidFill>
-                            <a:srgbClr val="0D0D0D"/>
-                          </a:solidFill>
-                          <a:effectLst/>
-                          <a:latin typeface="+mn-lt"/>
-                        </a:rPr>
-                        <a:t> – Analog, PWM and GPIO Multiplexer</a:t>
+                        <a:t>Cross platform ability enables development on PC and implementation on RPI.</a:t>
                       </a:r>
                     </a:p>
                     <a:p>
@@ -3516,242 +3285,36 @@
                         <a:buFont typeface="Arial" panose="020B0604020202020204" pitchFamily="34" charset="0"/>
                         <a:buNone/>
                       </a:pPr>
+                      <a:endParaRPr lang="en-US" sz="3600" b="1" kern="1200" dirty="0">
+                        <a:solidFill>
+                          <a:schemeClr val="tx1"/>
+                        </a:solidFill>
+                        <a:effectLst/>
+                        <a:latin typeface="+mn-lt"/>
+                        <a:ea typeface="+mn-ea"/>
+                        <a:cs typeface="Open Sans Hebrew" panose="00000500000000000000" pitchFamily="2" charset="-79"/>
+                      </a:endParaRPr>
+                    </a:p>
+                    <a:p>
+                      <a:pPr marL="0" marR="0" lvl="0" indent="0" algn="l" defTabSz="3359963" rtl="0" eaLnBrk="1" fontAlgn="auto" latinLnBrk="0" hangingPunct="1">
+                        <a:lnSpc>
+                          <a:spcPct val="100000"/>
+                        </a:lnSpc>
+                        <a:spcBef>
+                          <a:spcPts val="0"/>
+                        </a:spcBef>
+                        <a:spcAft>
+                          <a:spcPts val="0"/>
+                        </a:spcAft>
+                        <a:buClrTx/>
+                        <a:buSzTx/>
+                        <a:buFontTx/>
+                        <a:buNone/>
+                        <a:tabLst/>
+                        <a:defRPr/>
+                      </a:pPr>
                       <a:r>
-                        <a:rPr lang="en-US" sz="2400" b="0" i="0" dirty="0" smtClean="0">
-                          <a:solidFill>
-                            <a:srgbClr val="0D0D0D"/>
-                          </a:solidFill>
-                          <a:effectLst/>
-                          <a:latin typeface="+mn-lt"/>
-                        </a:rPr>
-                        <a:t>Rigorous testing across the board ensures reliability: gyro and acceleration precision for the IMU, proximity accuracy for the Proximity Sensor, heat detection for the thermal camera</a:t>
-                      </a:r>
-                      <a:r>
-                        <a:rPr lang="en-US" sz="2400" b="0" i="0" baseline="0" dirty="0" smtClean="0">
-                          <a:solidFill>
-                            <a:srgbClr val="0D0D0D"/>
-                          </a:solidFill>
-                          <a:effectLst/>
-                          <a:latin typeface="+mn-lt"/>
-                        </a:rPr>
-                        <a:t> </a:t>
-                      </a:r>
-                      <a:r>
-                        <a:rPr lang="en-US" sz="2400" b="0" i="0" dirty="0" smtClean="0">
-                          <a:solidFill>
-                            <a:srgbClr val="0D0D0D"/>
-                          </a:solidFill>
-                          <a:effectLst/>
-                          <a:latin typeface="+mn-lt"/>
-                        </a:rPr>
-                        <a:t>and sensitivity for the Force resistor sensor. Output hardware are:</a:t>
-                      </a:r>
-                    </a:p>
-                    <a:p>
-                      <a:pPr marL="457200" indent="-457200" algn="l">
-                        <a:buFont typeface="Arial" panose="020B0604020202020204" pitchFamily="34" charset="0"/>
-                        <a:buChar char="•"/>
-                      </a:pPr>
-                      <a:r>
-                        <a:rPr lang="en-US" sz="2400" b="0" i="0" dirty="0" smtClean="0">
-                          <a:solidFill>
-                            <a:srgbClr val="0D0D0D"/>
-                          </a:solidFill>
-                          <a:effectLst/>
-                          <a:latin typeface="+mn-lt"/>
-                        </a:rPr>
-                        <a:t>Button</a:t>
-                      </a:r>
-                    </a:p>
-                    <a:p>
-                      <a:pPr marL="457200" indent="-457200" algn="l">
-                        <a:buFont typeface="Arial" panose="020B0604020202020204" pitchFamily="34" charset="0"/>
-                        <a:buChar char="•"/>
-                      </a:pPr>
-                      <a:r>
-                        <a:rPr lang="en-US" sz="2400" b="0" i="0" dirty="0" smtClean="0">
-                          <a:solidFill>
-                            <a:srgbClr val="0D0D0D"/>
-                          </a:solidFill>
-                          <a:effectLst/>
-                          <a:latin typeface="+mn-lt"/>
-                        </a:rPr>
-                        <a:t>Buzzer</a:t>
-                      </a:r>
-                    </a:p>
-                    <a:p>
-                      <a:pPr marL="457200" indent="-457200" algn="l">
-                        <a:buFont typeface="Arial" panose="020B0604020202020204" pitchFamily="34" charset="0"/>
-                        <a:buChar char="•"/>
-                      </a:pPr>
-                      <a:r>
-                        <a:rPr lang="en-US" sz="2400" b="0" i="0" dirty="0" smtClean="0">
-                          <a:solidFill>
-                            <a:srgbClr val="0D0D0D"/>
-                          </a:solidFill>
-                          <a:effectLst/>
-                          <a:latin typeface="+mn-lt"/>
-                        </a:rPr>
-                        <a:t>RGB</a:t>
-                      </a:r>
-                    </a:p>
-                    <a:p>
-                      <a:pPr marL="0" indent="0" algn="l">
-                        <a:buFont typeface="Arial" panose="020B0604020202020204" pitchFamily="34" charset="0"/>
-                        <a:buNone/>
-                      </a:pPr>
-                      <a:r>
-                        <a:rPr lang="en-US" sz="2400" b="0" i="0" dirty="0" smtClean="0">
-                          <a:solidFill>
-                            <a:srgbClr val="0D0D0D"/>
-                          </a:solidFill>
-                          <a:effectLst/>
-                          <a:latin typeface="+mn-lt"/>
-                        </a:rPr>
-                        <a:t>Embedded documentation facilitates easy adoption, setting a solid foundation for future projects without redundant testing.</a:t>
-                      </a:r>
-                    </a:p>
-                    <a:p>
-                      <a:pPr algn="l"/>
-                      <a:endParaRPr lang="en-US" sz="2400" b="0" i="0" dirty="0" smtClean="0">
-                        <a:solidFill>
-                          <a:srgbClr val="0D0D0D"/>
-                        </a:solidFill>
-                        <a:effectLst/>
-                        <a:latin typeface="+mn-lt"/>
-                      </a:endParaRPr>
-                    </a:p>
-                    <a:p>
-                      <a:pPr algn="l"/>
-                      <a:endParaRPr lang="en-US" sz="2400" b="0" i="0" dirty="0" smtClean="0">
-                        <a:solidFill>
-                          <a:srgbClr val="0D0D0D"/>
-                        </a:solidFill>
-                        <a:effectLst/>
-                        <a:latin typeface="+mn-lt"/>
-                      </a:endParaRPr>
-                    </a:p>
-                    <a:p>
-                      <a:pPr algn="l"/>
-                      <a:endParaRPr lang="en-US" sz="2400" b="0" i="0" dirty="0" smtClean="0">
-                        <a:solidFill>
-                          <a:srgbClr val="0D0D0D"/>
-                        </a:solidFill>
-                        <a:effectLst/>
-                        <a:latin typeface="+mn-lt"/>
-                      </a:endParaRPr>
-                    </a:p>
-                    <a:p>
-                      <a:pPr algn="l"/>
-                      <a:endParaRPr lang="en-US" sz="2400" b="0" i="0" dirty="0" smtClean="0">
-                        <a:solidFill>
-                          <a:srgbClr val="0D0D0D"/>
-                        </a:solidFill>
-                        <a:effectLst/>
-                        <a:latin typeface="+mn-lt"/>
-                      </a:endParaRPr>
-                    </a:p>
-                    <a:p>
-                      <a:pPr algn="l"/>
-                      <a:endParaRPr lang="en-US" sz="2400" b="0" i="0" dirty="0" smtClean="0">
-                        <a:solidFill>
-                          <a:srgbClr val="0D0D0D"/>
-                        </a:solidFill>
-                        <a:effectLst/>
-                        <a:latin typeface="+mn-lt"/>
-                      </a:endParaRPr>
-                    </a:p>
-                    <a:p>
-                      <a:pPr algn="l"/>
-                      <a:endParaRPr lang="en-US" sz="2400" b="0" i="0" dirty="0" smtClean="0">
-                        <a:solidFill>
-                          <a:srgbClr val="0D0D0D"/>
-                        </a:solidFill>
-                        <a:effectLst/>
-                        <a:latin typeface="+mn-lt"/>
-                      </a:endParaRPr>
-                    </a:p>
-                    <a:p>
-                      <a:pPr algn="l"/>
-                      <a:endParaRPr lang="en-US" sz="2400" b="0" i="0" dirty="0" smtClean="0">
-                        <a:solidFill>
-                          <a:srgbClr val="0D0D0D"/>
-                        </a:solidFill>
-                        <a:effectLst/>
-                        <a:latin typeface="+mn-lt"/>
-                      </a:endParaRPr>
-                    </a:p>
-                    <a:p>
-                      <a:pPr algn="l"/>
-                      <a:endParaRPr lang="en-US" sz="2400" b="0" i="0" dirty="0" smtClean="0">
-                        <a:solidFill>
-                          <a:srgbClr val="0D0D0D"/>
-                        </a:solidFill>
-                        <a:effectLst/>
-                        <a:latin typeface="+mn-lt"/>
-                      </a:endParaRPr>
-                    </a:p>
-                    <a:p>
-                      <a:pPr algn="l"/>
-                      <a:endParaRPr lang="en-US" sz="2400" b="0" i="0" dirty="0" smtClean="0">
-                        <a:solidFill>
-                          <a:srgbClr val="0D0D0D"/>
-                        </a:solidFill>
-                        <a:effectLst/>
-                        <a:latin typeface="+mn-lt"/>
-                      </a:endParaRPr>
-                    </a:p>
-                    <a:p>
-                      <a:pPr marL="0" marR="0" lvl="0" indent="0" algn="l" defTabSz="3359963" rtl="0" eaLnBrk="1" fontAlgn="auto" latinLnBrk="0" hangingPunct="1">
-                        <a:lnSpc>
-                          <a:spcPct val="100000"/>
-                        </a:lnSpc>
-                        <a:spcBef>
-                          <a:spcPts val="0"/>
-                        </a:spcBef>
-                        <a:spcAft>
-                          <a:spcPts val="0"/>
-                        </a:spcAft>
-                        <a:buClrTx/>
-                        <a:buSzTx/>
-                        <a:buFontTx/>
-                        <a:buNone/>
-                        <a:tabLst/>
-                        <a:defRPr/>
-                      </a:pPr>
-                      <a:r>
-                        <a:rPr lang="en-US" sz="1400" b="1" kern="1200" dirty="0" smtClean="0">
-                          <a:solidFill>
-                            <a:schemeClr val="tx1"/>
-                          </a:solidFill>
-                          <a:effectLst/>
-                          <a:latin typeface="+mn-lt"/>
-                          <a:ea typeface="+mn-ea"/>
-                          <a:cs typeface="Open Sans Hebrew" panose="00000500000000000000" pitchFamily="2" charset="-79"/>
-                        </a:rPr>
-                        <a:t>System Image</a:t>
-                      </a:r>
-                    </a:p>
-                    <a:p>
-                      <a:pPr marL="0" marR="0" lvl="0" indent="0" algn="l" defTabSz="3359963" rtl="0" eaLnBrk="1" fontAlgn="auto" latinLnBrk="0" hangingPunct="1">
-                        <a:lnSpc>
-                          <a:spcPct val="100000"/>
-                        </a:lnSpc>
-                        <a:spcBef>
-                          <a:spcPts val="0"/>
-                        </a:spcBef>
-                        <a:spcAft>
-                          <a:spcPts val="0"/>
-                        </a:spcAft>
-                        <a:buClrTx/>
-                        <a:buSzTx/>
-                        <a:buFontTx/>
-                        <a:buNone/>
-                        <a:tabLst/>
-                        <a:defRPr/>
-                      </a:pPr>
-                      <a:r>
-                        <a:rPr lang="en-US" sz="2400" b="1" kern="1200" dirty="0" smtClean="0">
+                        <a:rPr lang="en-US" sz="3600" b="1" kern="1200" dirty="0">
                           <a:solidFill>
                             <a:schemeClr val="tx1"/>
                           </a:solidFill>
@@ -3762,7 +3325,7 @@
                         </a:rPr>
                         <a:t>Methods/Implementation</a:t>
                       </a:r>
-                      <a:endParaRPr lang="en-US" sz="2400" b="0" i="0" dirty="0" smtClean="0">
+                      <a:endParaRPr lang="en-US" sz="3600" b="0" i="0" dirty="0">
                         <a:solidFill>
                           <a:srgbClr val="0D0D0D"/>
                         </a:solidFill>
@@ -3771,65 +3334,78 @@
                       </a:endParaRPr>
                     </a:p>
                     <a:p>
-                      <a:pPr algn="l"/>
-                      <a:endParaRPr lang="en-US" sz="2400" b="0" i="0" dirty="0" smtClean="0">
-                        <a:solidFill>
-                          <a:srgbClr val="0D0D0D"/>
-                        </a:solidFill>
-                        <a:effectLst/>
-                        <a:latin typeface="+mn-lt"/>
-                      </a:endParaRPr>
-                    </a:p>
-                    <a:p>
-                      <a:pPr algn="l"/>
-                      <a:endParaRPr lang="en-US" sz="2400" b="0" i="0" dirty="0" smtClean="0">
-                        <a:solidFill>
-                          <a:srgbClr val="0D0D0D"/>
-                        </a:solidFill>
-                        <a:effectLst/>
-                        <a:latin typeface="+mn-lt"/>
-                      </a:endParaRPr>
-                    </a:p>
-                    <a:p>
-                      <a:pPr algn="l"/>
-                      <a:endParaRPr lang="en-US" sz="2400" b="0" i="0" dirty="0" smtClean="0">
-                        <a:solidFill>
-                          <a:srgbClr val="0D0D0D"/>
-                        </a:solidFill>
-                        <a:effectLst/>
-                        <a:latin typeface="+mn-lt"/>
-                      </a:endParaRPr>
-                    </a:p>
-                    <a:p>
-                      <a:pPr algn="l"/>
-                      <a:endParaRPr lang="en-US" sz="2400" b="0" i="0" dirty="0" smtClean="0">
-                        <a:solidFill>
-                          <a:srgbClr val="0D0D0D"/>
-                        </a:solidFill>
-                        <a:effectLst/>
-                        <a:latin typeface="+mn-lt"/>
-                      </a:endParaRPr>
-                    </a:p>
-                    <a:p>
-                      <a:pPr algn="l"/>
+                      <a:pPr marL="571500" indent="-571500" algn="l">
+                        <a:buFont typeface="Arial" panose="020B0604020202020204" pitchFamily="34" charset="0"/>
+                        <a:buChar char="•"/>
+                      </a:pPr>
                       <a:r>
-                        <a:rPr lang="en-US" sz="2400" dirty="0" smtClean="0">
+                        <a:rPr lang="en-US" sz="3600" b="0" i="0" dirty="0">
+                          <a:solidFill>
+                            <a:srgbClr val="0D0D0D"/>
+                          </a:solidFill>
+                          <a:effectLst/>
                           <a:latin typeface="+mn-lt"/>
                         </a:rPr>
-                        <a:t/>
+                        <a:t>System consists of the M5StackCoreS3, integrated sensors, connectible sensors and outputs.</a:t>
                       </a:r>
+                    </a:p>
+                    <a:p>
+                      <a:pPr marL="0" indent="0" algn="l">
+                        <a:buFont typeface="Arial" panose="020B0604020202020204" pitchFamily="34" charset="0"/>
+                        <a:buNone/>
+                      </a:pPr>
+                      <a:endParaRPr lang="en-US" sz="3600" b="0" i="0" dirty="0">
+                        <a:solidFill>
+                          <a:srgbClr val="0D0D0D"/>
+                        </a:solidFill>
+                        <a:effectLst/>
+                        <a:latin typeface="+mn-lt"/>
+                      </a:endParaRPr>
+                    </a:p>
+                    <a:p>
+                      <a:pPr algn="l"/>
+                      <a:endParaRPr lang="en-US" sz="3600" b="0" i="0" dirty="0">
+                        <a:solidFill>
+                          <a:srgbClr val="0D0D0D"/>
+                        </a:solidFill>
+                        <a:effectLst/>
+                        <a:latin typeface="+mn-lt"/>
+                      </a:endParaRPr>
+                    </a:p>
+                    <a:p>
+                      <a:pPr algn="l"/>
+                      <a:endParaRPr lang="en-US" sz="3600" b="0" i="0" dirty="0">
+                        <a:solidFill>
+                          <a:srgbClr val="0D0D0D"/>
+                        </a:solidFill>
+                        <a:effectLst/>
+                        <a:latin typeface="+mn-lt"/>
+                      </a:endParaRPr>
+                    </a:p>
+                    <a:p>
+                      <a:pPr algn="l"/>
+                      <a:endParaRPr lang="en-US" sz="3600" b="0" i="0" dirty="0">
+                        <a:solidFill>
+                          <a:srgbClr val="0D0D0D"/>
+                        </a:solidFill>
+                        <a:effectLst/>
+                        <a:latin typeface="+mn-lt"/>
+                      </a:endParaRPr>
+                    </a:p>
+                    <a:p>
+                      <a:pPr algn="l"/>
                       <a:br>
-                        <a:rPr lang="en-US" sz="2400" dirty="0" smtClean="0">
+                        <a:rPr lang="en-US" sz="3600" dirty="0">
                           <a:latin typeface="+mn-lt"/>
                         </a:rPr>
                       </a:br>
-                      <a:endParaRPr lang="en-US" sz="2400" dirty="0" smtClean="0">
+                      <a:endParaRPr lang="en-US" sz="3600" dirty="0">
                         <a:latin typeface="+mn-lt"/>
                       </a:endParaRPr>
                     </a:p>
                     <a:p>
                       <a:pPr algn="l"/>
-                      <a:endParaRPr lang="he-IL" sz="2400" baseline="0" dirty="0" smtClean="0">
+                      <a:endParaRPr lang="he-IL" sz="3600" baseline="0" dirty="0">
                         <a:effectLst/>
                         <a:latin typeface="+mn-lt"/>
                         <a:cs typeface="Open Sans Hebrew" panose="00000500000000000000" pitchFamily="2" charset="-79"/>
@@ -3837,7 +3413,7 @@
                     </a:p>
                     <a:p>
                       <a:pPr algn="l"/>
-                      <a:endParaRPr lang="he-IL" sz="2400" baseline="0" dirty="0" smtClean="0">
+                      <a:endParaRPr lang="he-IL" sz="3600" baseline="0" dirty="0">
                         <a:effectLst/>
                         <a:latin typeface="+mn-lt"/>
                         <a:cs typeface="Open Sans Hebrew" panose="00000500000000000000" pitchFamily="2" charset="-79"/>
@@ -3845,7 +3421,7 @@
                     </a:p>
                     <a:p>
                       <a:pPr algn="l"/>
-                      <a:endParaRPr lang="he-IL" sz="2400" baseline="0" dirty="0" smtClean="0">
+                      <a:endParaRPr lang="he-IL" sz="3600" baseline="0" dirty="0">
                         <a:effectLst/>
                         <a:latin typeface="+mn-lt"/>
                         <a:cs typeface="Open Sans Hebrew" panose="00000500000000000000" pitchFamily="2" charset="-79"/>
@@ -3853,7 +3429,7 @@
                     </a:p>
                     <a:p>
                       <a:pPr algn="l"/>
-                      <a:endParaRPr lang="he-IL" sz="2400" baseline="0" dirty="0" smtClean="0">
+                      <a:endParaRPr lang="he-IL" sz="3600" baseline="0" dirty="0">
                         <a:effectLst/>
                         <a:latin typeface="+mn-lt"/>
                         <a:cs typeface="Open Sans Hebrew" panose="00000500000000000000" pitchFamily="2" charset="-79"/>
@@ -3861,7 +3437,7 @@
                     </a:p>
                     <a:p>
                       <a:pPr algn="l"/>
-                      <a:endParaRPr lang="he-IL" sz="2400" baseline="0" dirty="0" smtClean="0">
+                      <a:endParaRPr lang="he-IL" sz="3600" baseline="0" dirty="0">
                         <a:effectLst/>
                         <a:latin typeface="+mn-lt"/>
                         <a:cs typeface="Open Sans Hebrew" panose="00000500000000000000" pitchFamily="2" charset="-79"/>
@@ -3869,22 +3445,11 @@
                     </a:p>
                     <a:p>
                       <a:pPr algn="l"/>
-                      <a:endParaRPr lang="he-IL" sz="2400" baseline="0" dirty="0" smtClean="0">
-                        <a:effectLst/>
-                        <a:latin typeface="+mn-lt"/>
-                        <a:cs typeface="Open Sans Hebrew" panose="00000500000000000000" pitchFamily="2" charset="-79"/>
-                      </a:endParaRPr>
-                    </a:p>
-                    <a:p>
-                      <a:pPr algn="l"/>
-                      <a:r>
-                        <a:rPr lang="en-US" sz="1400" b="1" baseline="0" dirty="0" smtClean="0">
-                          <a:effectLst/>
-                          <a:latin typeface="+mn-lt"/>
-                          <a:cs typeface="Open Sans Hebrew" panose="00000500000000000000" pitchFamily="2" charset="-79"/>
-                        </a:rPr>
-                        <a:t>System Block Diagram and Arduino State Machine</a:t>
-                      </a:r>
+                      <a:endParaRPr lang="he-IL" sz="3600" baseline="0" dirty="0">
+                        <a:effectLst/>
+                        <a:latin typeface="+mn-lt"/>
+                        <a:cs typeface="Open Sans Hebrew" panose="00000500000000000000" pitchFamily="2" charset="-79"/>
+                      </a:endParaRPr>
                     </a:p>
                   </a:txBody>
                   <a:tcPr marL="137160" marR="137160" marT="137160" marB="137160">
@@ -3948,7 +3513,7 @@
                         <a:tabLst/>
                         <a:defRPr/>
                       </a:pPr>
-                      <a:endParaRPr lang="en-US" sz="2400" b="1" kern="1200" dirty="0" smtClean="0">
+                      <a:endParaRPr lang="en-US" sz="3600" b="1" kern="1200" dirty="0">
                         <a:solidFill>
                           <a:schemeClr val="tx1"/>
                         </a:solidFill>
@@ -3977,145 +3542,254 @@
                         <a:defRPr/>
                       </a:pPr>
                       <a:r>
-                        <a:rPr lang="en-US" sz="2400" baseline="0" dirty="0" smtClean="0">
+                        <a:rPr lang="en-US" sz="3600" baseline="0" dirty="0">
                           <a:effectLst/>
                           <a:latin typeface="+mn-lt"/>
                           <a:cs typeface="Open Sans Hebrew" panose="00000500000000000000" pitchFamily="2" charset="-79"/>
                         </a:rPr>
-                        <a:t>Our design utilizes the M5 Stack Core S3 Controller, operating on a 5V supply. It interfaces with the  I2C multiplexer, linking I2C sensors such as the distance sensor and the Thermal camera. A stepdown to 3.3V was necessary  to be soldered for compatibility. The secondary, multiplexer, manages GPIO, Analog, and PWM inputs, including a built-in ADC, and connects devices like buttons, speakers, and FSR’s. For display output, the built-in port B powers an RGB </a:t>
+                        <a:t>Our design utilizes a modular styled API that supports different sensors and extendibility, built over a robust state machine in two different modes.</a:t>
                       </a:r>
+                    </a:p>
+                    <a:p>
+                      <a:pPr marL="0" marR="0" lvl="0" indent="0" algn="l" defTabSz="2519995" rtl="0" eaLnBrk="1" fontAlgn="auto" latinLnBrk="0" hangingPunct="1">
+                        <a:lnSpc>
+                          <a:spcPct val="100000"/>
+                        </a:lnSpc>
+                        <a:spcBef>
+                          <a:spcPts val="0"/>
+                        </a:spcBef>
+                        <a:spcAft>
+                          <a:spcPts val="0"/>
+                        </a:spcAft>
+                        <a:buClrTx/>
+                        <a:buSzTx/>
+                        <a:buFontTx/>
+                        <a:buNone/>
+                        <a:tabLst/>
+                        <a:defRPr/>
+                      </a:pPr>
+                      <a:endParaRPr lang="en-US" sz="3600" baseline="0" dirty="0">
+                        <a:effectLst/>
+                        <a:latin typeface="+mn-lt"/>
+                        <a:cs typeface="Open Sans Hebrew" panose="00000500000000000000" pitchFamily="2" charset="-79"/>
+                      </a:endParaRPr>
+                    </a:p>
+                    <a:p>
+                      <a:pPr marL="0" marR="0" lvl="0" indent="0" algn="l" defTabSz="2519995" rtl="0" eaLnBrk="1" fontAlgn="auto" latinLnBrk="0" hangingPunct="1">
+                        <a:lnSpc>
+                          <a:spcPct val="100000"/>
+                        </a:lnSpc>
+                        <a:spcBef>
+                          <a:spcPts val="0"/>
+                        </a:spcBef>
+                        <a:spcAft>
+                          <a:spcPts val="0"/>
+                        </a:spcAft>
+                        <a:buClrTx/>
+                        <a:buSzTx/>
+                        <a:buFontTx/>
+                        <a:buNone/>
+                        <a:tabLst/>
+                        <a:defRPr/>
+                      </a:pPr>
+                      <a:endParaRPr lang="en-US" sz="3600" b="1" kern="1200" dirty="0">
+                        <a:solidFill>
+                          <a:schemeClr val="tx1"/>
+                        </a:solidFill>
+                        <a:effectLst/>
+                        <a:latin typeface="+mn-lt"/>
+                        <a:ea typeface="+mn-ea"/>
+                        <a:cs typeface="Open Sans Hebrew" panose="00000500000000000000" pitchFamily="2" charset="-79"/>
+                      </a:endParaRPr>
+                    </a:p>
+                    <a:p>
+                      <a:pPr marL="0" marR="0" lvl="0" indent="0" algn="l" defTabSz="2519995" rtl="0" eaLnBrk="1" fontAlgn="auto" latinLnBrk="0" hangingPunct="1">
+                        <a:lnSpc>
+                          <a:spcPct val="100000"/>
+                        </a:lnSpc>
+                        <a:spcBef>
+                          <a:spcPts val="0"/>
+                        </a:spcBef>
+                        <a:spcAft>
+                          <a:spcPts val="0"/>
+                        </a:spcAft>
+                        <a:buClrTx/>
+                        <a:buSzTx/>
+                        <a:buFontTx/>
+                        <a:buNone/>
+                        <a:tabLst/>
+                        <a:defRPr/>
+                      </a:pPr>
+                      <a:endParaRPr lang="en-US" sz="3600" b="1" kern="1200" dirty="0">
+                        <a:solidFill>
+                          <a:schemeClr val="tx1"/>
+                        </a:solidFill>
+                        <a:effectLst/>
+                        <a:latin typeface="+mn-lt"/>
+                        <a:ea typeface="+mn-ea"/>
+                        <a:cs typeface="Open Sans Hebrew" panose="00000500000000000000" pitchFamily="2" charset="-79"/>
+                      </a:endParaRPr>
+                    </a:p>
+                    <a:p>
+                      <a:pPr marL="0" marR="0" lvl="0" indent="0" algn="l" defTabSz="2519995" rtl="0" eaLnBrk="1" fontAlgn="auto" latinLnBrk="0" hangingPunct="1">
+                        <a:lnSpc>
+                          <a:spcPct val="100000"/>
+                        </a:lnSpc>
+                        <a:spcBef>
+                          <a:spcPts val="0"/>
+                        </a:spcBef>
+                        <a:spcAft>
+                          <a:spcPts val="0"/>
+                        </a:spcAft>
+                        <a:buClrTx/>
+                        <a:buSzTx/>
+                        <a:buFontTx/>
+                        <a:buNone/>
+                        <a:tabLst/>
+                        <a:defRPr/>
+                      </a:pPr>
+                      <a:endParaRPr lang="en-US" sz="3600" b="1" kern="1200" dirty="0">
+                        <a:solidFill>
+                          <a:schemeClr val="tx1"/>
+                        </a:solidFill>
+                        <a:effectLst/>
+                        <a:latin typeface="+mn-lt"/>
+                        <a:ea typeface="+mn-ea"/>
+                        <a:cs typeface="Open Sans Hebrew" panose="00000500000000000000" pitchFamily="2" charset="-79"/>
+                      </a:endParaRPr>
+                    </a:p>
+                    <a:p>
+                      <a:pPr marL="0" marR="0" lvl="0" indent="0" algn="l" defTabSz="2519995" rtl="0" eaLnBrk="1" fontAlgn="auto" latinLnBrk="0" hangingPunct="1">
+                        <a:lnSpc>
+                          <a:spcPct val="100000"/>
+                        </a:lnSpc>
+                        <a:spcBef>
+                          <a:spcPts val="0"/>
+                        </a:spcBef>
+                        <a:spcAft>
+                          <a:spcPts val="0"/>
+                        </a:spcAft>
+                        <a:buClrTx/>
+                        <a:buSzTx/>
+                        <a:buFontTx/>
+                        <a:buNone/>
+                        <a:tabLst/>
+                        <a:defRPr/>
+                      </a:pPr>
+                      <a:endParaRPr lang="en-US" sz="3600" b="1" kern="1200" dirty="0">
+                        <a:solidFill>
+                          <a:schemeClr val="tx1"/>
+                        </a:solidFill>
+                        <a:effectLst/>
+                        <a:latin typeface="+mn-lt"/>
+                        <a:ea typeface="+mn-ea"/>
+                        <a:cs typeface="Open Sans Hebrew" panose="00000500000000000000" pitchFamily="2" charset="-79"/>
+                      </a:endParaRPr>
+                    </a:p>
+                    <a:p>
+                      <a:pPr marL="0" marR="0" lvl="0" indent="0" algn="l" defTabSz="2519995" rtl="0" eaLnBrk="1" fontAlgn="auto" latinLnBrk="0" hangingPunct="1">
+                        <a:lnSpc>
+                          <a:spcPct val="100000"/>
+                        </a:lnSpc>
+                        <a:spcBef>
+                          <a:spcPts val="0"/>
+                        </a:spcBef>
+                        <a:spcAft>
+                          <a:spcPts val="0"/>
+                        </a:spcAft>
+                        <a:buClrTx/>
+                        <a:buSzTx/>
+                        <a:buFontTx/>
+                        <a:buNone/>
+                        <a:tabLst/>
+                        <a:defRPr/>
+                      </a:pPr>
+                      <a:endParaRPr lang="en-US" sz="3600" b="1" kern="1200" dirty="0">
+                        <a:solidFill>
+                          <a:schemeClr val="tx1"/>
+                        </a:solidFill>
+                        <a:effectLst/>
+                        <a:latin typeface="+mn-lt"/>
+                        <a:ea typeface="+mn-ea"/>
+                        <a:cs typeface="Open Sans Hebrew" panose="00000500000000000000" pitchFamily="2" charset="-79"/>
+                      </a:endParaRPr>
+                    </a:p>
+                    <a:p>
+                      <a:pPr marL="0" marR="0" lvl="0" indent="0" algn="l" defTabSz="2519995" rtl="0" eaLnBrk="1" fontAlgn="auto" latinLnBrk="0" hangingPunct="1">
+                        <a:lnSpc>
+                          <a:spcPct val="100000"/>
+                        </a:lnSpc>
+                        <a:spcBef>
+                          <a:spcPts val="0"/>
+                        </a:spcBef>
+                        <a:spcAft>
+                          <a:spcPts val="0"/>
+                        </a:spcAft>
+                        <a:buClrTx/>
+                        <a:buSzTx/>
+                        <a:buFontTx/>
+                        <a:buNone/>
+                        <a:tabLst/>
+                        <a:defRPr/>
+                      </a:pPr>
+                      <a:endParaRPr lang="en-US" sz="3600" b="1" kern="1200" dirty="0">
+                        <a:solidFill>
+                          <a:schemeClr val="tx1"/>
+                        </a:solidFill>
+                        <a:effectLst/>
+                        <a:latin typeface="+mn-lt"/>
+                        <a:ea typeface="+mn-ea"/>
+                        <a:cs typeface="Open Sans Hebrew" panose="00000500000000000000" pitchFamily="2" charset="-79"/>
+                      </a:endParaRPr>
+                    </a:p>
+                    <a:p>
+                      <a:pPr marL="0" marR="0" lvl="0" indent="0" algn="l" defTabSz="2519995" rtl="0" eaLnBrk="1" fontAlgn="auto" latinLnBrk="0" hangingPunct="1">
+                        <a:lnSpc>
+                          <a:spcPct val="100000"/>
+                        </a:lnSpc>
+                        <a:spcBef>
+                          <a:spcPts val="0"/>
+                        </a:spcBef>
+                        <a:spcAft>
+                          <a:spcPts val="0"/>
+                        </a:spcAft>
+                        <a:buClrTx/>
+                        <a:buSzTx/>
+                        <a:buFontTx/>
+                        <a:buNone/>
+                        <a:tabLst/>
+                        <a:defRPr/>
+                      </a:pPr>
+                      <a:endParaRPr lang="en-US" sz="3600" b="1" kern="1200" dirty="0">
+                        <a:solidFill>
+                          <a:schemeClr val="tx1"/>
+                        </a:solidFill>
+                        <a:effectLst/>
+                        <a:latin typeface="+mn-lt"/>
+                        <a:ea typeface="+mn-ea"/>
+                        <a:cs typeface="Open Sans Hebrew" panose="00000500000000000000" pitchFamily="2" charset="-79"/>
+                      </a:endParaRPr>
+                    </a:p>
+                    <a:p>
+                      <a:pPr marL="0" marR="0" lvl="0" indent="0" algn="l" defTabSz="2519995" rtl="0" eaLnBrk="1" fontAlgn="auto" latinLnBrk="0" hangingPunct="1">
+                        <a:lnSpc>
+                          <a:spcPct val="100000"/>
+                        </a:lnSpc>
+                        <a:spcBef>
+                          <a:spcPts val="0"/>
+                        </a:spcBef>
+                        <a:spcAft>
+                          <a:spcPts val="0"/>
+                        </a:spcAft>
+                        <a:buClrTx/>
+                        <a:buSzTx/>
+                        <a:buFontTx/>
+                        <a:buNone/>
+                        <a:tabLst/>
+                        <a:defRPr/>
+                      </a:pPr>
                       <a:r>
-                        <a:rPr lang="en-US" sz="2400" baseline="0" dirty="0" err="1" smtClean="0">
-                          <a:effectLst/>
-                          <a:latin typeface="+mn-lt"/>
-                          <a:cs typeface="Open Sans Hebrew" panose="00000500000000000000" pitchFamily="2" charset="-79"/>
-                        </a:rPr>
-                        <a:t>Neopixel</a:t>
-                      </a:r>
-                      <a:r>
-                        <a:rPr lang="en-US" sz="2400" baseline="0" dirty="0" smtClean="0">
-                          <a:effectLst/>
-                          <a:latin typeface="+mn-lt"/>
-                          <a:cs typeface="Open Sans Hebrew" panose="00000500000000000000" pitchFamily="2" charset="-79"/>
-                        </a:rPr>
-                        <a:t>.</a:t>
-                      </a:r>
-                    </a:p>
-                    <a:p>
-                      <a:pPr marL="0" marR="0" lvl="0" indent="0" algn="l" defTabSz="2519995" rtl="0" eaLnBrk="1" fontAlgn="auto" latinLnBrk="0" hangingPunct="1">
-                        <a:lnSpc>
-                          <a:spcPct val="100000"/>
-                        </a:lnSpc>
-                        <a:spcBef>
-                          <a:spcPts val="0"/>
-                        </a:spcBef>
-                        <a:spcAft>
-                          <a:spcPts val="0"/>
-                        </a:spcAft>
-                        <a:buClrTx/>
-                        <a:buSzTx/>
-                        <a:buFontTx/>
-                        <a:buNone/>
-                        <a:tabLst/>
-                        <a:defRPr/>
-                      </a:pPr>
-                      <a:endParaRPr lang="en-US" sz="2400" baseline="0" dirty="0" smtClean="0">
-                        <a:effectLst/>
-                        <a:latin typeface="+mn-lt"/>
-                        <a:cs typeface="Open Sans Hebrew" panose="00000500000000000000" pitchFamily="2" charset="-79"/>
-                      </a:endParaRPr>
-                    </a:p>
-                    <a:p>
-                      <a:pPr marL="0" marR="0" lvl="0" indent="0" algn="l" defTabSz="2519995" rtl="0" eaLnBrk="1" fontAlgn="auto" latinLnBrk="0" hangingPunct="1">
-                        <a:lnSpc>
-                          <a:spcPct val="100000"/>
-                        </a:lnSpc>
-                        <a:spcBef>
-                          <a:spcPts val="0"/>
-                        </a:spcBef>
-                        <a:spcAft>
-                          <a:spcPts val="0"/>
-                        </a:spcAft>
-                        <a:buClrTx/>
-                        <a:buSzTx/>
-                        <a:buFontTx/>
-                        <a:buNone/>
-                        <a:tabLst/>
-                        <a:defRPr/>
-                      </a:pPr>
-                      <a:r>
-                        <a:rPr lang="en-US" sz="2400" baseline="0" dirty="0" smtClean="0">
-                          <a:effectLst/>
-                          <a:latin typeface="+mn-lt"/>
-                          <a:cs typeface="Open Sans Hebrew" panose="00000500000000000000" pitchFamily="2" charset="-79"/>
-                        </a:rPr>
-                        <a:t>We’ve engineered two operational modes: a standalone mode that displays sensor readings on an LCD, and a slave mode which leverages a Python API for sensor data output and command input to peripherals, such as speakers or vibration motors. Outputs can be exported as </a:t>
-                      </a:r>
-                      <a:r>
-                        <a:rPr lang="en-US" sz="2400" baseline="0" dirty="0" err="1" smtClean="0">
-                          <a:effectLst/>
-                          <a:latin typeface="+mn-lt"/>
-                          <a:cs typeface="Open Sans Hebrew" panose="00000500000000000000" pitchFamily="2" charset="-79"/>
-                        </a:rPr>
-                        <a:t>numpy</a:t>
-                      </a:r>
-                      <a:r>
-                        <a:rPr lang="en-US" sz="2400" baseline="0" dirty="0" smtClean="0">
-                          <a:effectLst/>
-                          <a:latin typeface="+mn-lt"/>
-                          <a:cs typeface="Open Sans Hebrew" panose="00000500000000000000" pitchFamily="2" charset="-79"/>
-                        </a:rPr>
-                        <a:t> matrices for in-depth analysis. To ease integration, we've compiled documentation covering installation, usage, and tutorials for extending the API's capabilities.</a:t>
-                      </a:r>
-                    </a:p>
-                    <a:p>
-                      <a:pPr marL="0" marR="0" lvl="0" indent="0" algn="l" defTabSz="2519995" rtl="0" eaLnBrk="1" fontAlgn="auto" latinLnBrk="0" hangingPunct="1">
-                        <a:lnSpc>
-                          <a:spcPct val="100000"/>
-                        </a:lnSpc>
-                        <a:spcBef>
-                          <a:spcPts val="0"/>
-                        </a:spcBef>
-                        <a:spcAft>
-                          <a:spcPts val="0"/>
-                        </a:spcAft>
-                        <a:buClrTx/>
-                        <a:buSzTx/>
-                        <a:buFontTx/>
-                        <a:buNone/>
-                        <a:tabLst/>
-                        <a:defRPr/>
-                      </a:pPr>
-                      <a:endParaRPr lang="en-US" sz="2400" b="1" kern="1200" dirty="0" smtClean="0">
-                        <a:solidFill>
-                          <a:schemeClr val="tx1"/>
-                        </a:solidFill>
-                        <a:effectLst/>
-                        <a:latin typeface="+mn-lt"/>
-                        <a:ea typeface="+mn-ea"/>
-                        <a:cs typeface="Open Sans Hebrew" panose="00000500000000000000" pitchFamily="2" charset="-79"/>
-                      </a:endParaRPr>
-                    </a:p>
-                    <a:p>
-                      <a:pPr marL="0" marR="0" lvl="0" indent="0" algn="l" defTabSz="2519995" rtl="0" eaLnBrk="1" fontAlgn="auto" latinLnBrk="0" hangingPunct="1">
-                        <a:lnSpc>
-                          <a:spcPct val="100000"/>
-                        </a:lnSpc>
-                        <a:spcBef>
-                          <a:spcPts val="0"/>
-                        </a:spcBef>
-                        <a:spcAft>
-                          <a:spcPts val="0"/>
-                        </a:spcAft>
-                        <a:buClrTx/>
-                        <a:buSzTx/>
-                        <a:buFontTx/>
-                        <a:buNone/>
-                        <a:tabLst/>
-                        <a:defRPr/>
-                      </a:pPr>
-                      <a:r>
-                        <a:rPr lang="en-US" sz="2400" b="1" kern="1200" dirty="0" smtClean="0">
+                        <a:rPr lang="en-US" sz="3600" b="1" kern="1200" dirty="0">
                           <a:solidFill>
                             <a:schemeClr val="tx1"/>
                           </a:solidFill>
@@ -4146,35 +3820,73 @@
                         <a:defRPr/>
                       </a:pPr>
                       <a:r>
-                        <a:rPr lang="en-US" sz="2400" b="0" i="0" dirty="0" smtClean="0">
+                        <a:rPr lang="en-US" sz="3600" b="0" i="0" dirty="0">
                           <a:solidFill>
                             <a:srgbClr val="0D0D0D"/>
                           </a:solidFill>
                           <a:effectLst/>
                           <a:latin typeface="+mn-lt"/>
                         </a:rPr>
-                        <a:t>Post-testing, we applied interpolation techniques to refine the thermal readings obtained with the thermal camera, transforming an 8x8 grid into a detailed 256x256 matrix. This upgrade allowed us to test the camera's capability to discern and enhance heat signatures, as demonstrated when a hand was placed in front of the sensor.</a:t>
+                        <a:t>The finished device supports a myriad of sensors. Below is</a:t>
                       </a:r>
-                    </a:p>
-                    <a:p>
-                      <a:pPr marL="0" marR="0" lvl="0" indent="0" algn="l" defTabSz="2519995" rtl="0" eaLnBrk="1" fontAlgn="auto" latinLnBrk="0" hangingPunct="1">
-                        <a:lnSpc>
-                          <a:spcPct val="100000"/>
-                        </a:lnSpc>
-                        <a:spcBef>
-                          <a:spcPts val="0"/>
-                        </a:spcBef>
-                        <a:spcAft>
-                          <a:spcPts val="0"/>
-                        </a:spcAft>
-                        <a:buClrTx/>
-                        <a:buSzTx/>
-                        <a:buFontTx/>
-                        <a:buNone/>
-                        <a:tabLst/>
-                        <a:defRPr/>
-                      </a:pPr>
-                      <a:endParaRPr lang="en-US" sz="2400" kern="1200" baseline="0" dirty="0" smtClean="0">
+                      <a:br>
+                        <a:rPr lang="en-US" sz="3600" b="0" i="0" dirty="0">
+                          <a:solidFill>
+                            <a:srgbClr val="0D0D0D"/>
+                          </a:solidFill>
+                          <a:effectLst/>
+                          <a:latin typeface="+mn-lt"/>
+                        </a:rPr>
+                      </a:br>
+                      <a:r>
+                        <a:rPr lang="en-US" sz="3600" b="0" i="0" dirty="0">
+                          <a:solidFill>
+                            <a:srgbClr val="0D0D0D"/>
+                          </a:solidFill>
+                          <a:effectLst/>
+                          <a:latin typeface="+mn-lt"/>
+                        </a:rPr>
+                        <a:t>example of the AMG thermal 8X8 camera being used to</a:t>
+                      </a:r>
+                      <a:br>
+                        <a:rPr lang="en-US" sz="3600" b="0" i="0" dirty="0">
+                          <a:solidFill>
+                            <a:srgbClr val="0D0D0D"/>
+                          </a:solidFill>
+                          <a:effectLst/>
+                          <a:latin typeface="+mn-lt"/>
+                        </a:rPr>
+                      </a:br>
+                      <a:r>
+                        <a:rPr lang="en-US" sz="3600" b="0" i="0" dirty="0">
+                          <a:solidFill>
+                            <a:srgbClr val="0D0D0D"/>
+                          </a:solidFill>
+                          <a:effectLst/>
+                          <a:latin typeface="+mn-lt"/>
+                        </a:rPr>
+                        <a:t>visualize the hand of one of our testers.</a:t>
+                      </a:r>
+                    </a:p>
+                    <a:p>
+                      <a:pPr marL="0" marR="0" lvl="0" indent="0" algn="l" defTabSz="2519995" rtl="0" eaLnBrk="1" fontAlgn="auto" latinLnBrk="0" hangingPunct="1">
+                        <a:lnSpc>
+                          <a:spcPct val="100000"/>
+                        </a:lnSpc>
+                        <a:spcBef>
+                          <a:spcPts val="0"/>
+                        </a:spcBef>
+                        <a:spcAft>
+                          <a:spcPts val="0"/>
+                        </a:spcAft>
+                        <a:buClrTx/>
+                        <a:buSzTx/>
+                        <a:buFontTx/>
+                        <a:buNone/>
+                        <a:tabLst/>
+                        <a:defRPr/>
+                      </a:pPr>
+                      <a:endParaRPr lang="en-US" sz="3600" kern="1200" baseline="0" dirty="0">
                         <a:solidFill>
                           <a:schemeClr val="tx1"/>
                         </a:solidFill>
@@ -4202,7 +3914,7 @@
                         <a:tabLst/>
                         <a:defRPr/>
                       </a:pPr>
-                      <a:endParaRPr lang="en-US" sz="2400" kern="1200" baseline="0" dirty="0" smtClean="0">
+                      <a:endParaRPr lang="en-US" sz="3600" kern="1200" baseline="0" dirty="0">
                         <a:solidFill>
                           <a:schemeClr val="tx1"/>
                         </a:solidFill>
@@ -4230,7 +3942,7 @@
                         <a:tabLst/>
                         <a:defRPr/>
                       </a:pPr>
-                      <a:endParaRPr lang="en-US" sz="2400" kern="1200" baseline="0" dirty="0" smtClean="0">
+                      <a:endParaRPr lang="en-US" sz="3600" kern="1200" baseline="0" dirty="0">
                         <a:solidFill>
                           <a:schemeClr val="tx1"/>
                         </a:solidFill>
@@ -4258,7 +3970,7 @@
                         <a:tabLst/>
                         <a:defRPr/>
                       </a:pPr>
-                      <a:endParaRPr lang="en-US" sz="2400" kern="1200" baseline="0" dirty="0" smtClean="0">
+                      <a:endParaRPr lang="en-US" sz="3600" kern="1200" baseline="0" dirty="0">
                         <a:solidFill>
                           <a:schemeClr val="tx1"/>
                         </a:solidFill>
@@ -4286,7 +3998,7 @@
                         <a:tabLst/>
                         <a:defRPr/>
                       </a:pPr>
-                      <a:endParaRPr lang="en-US" sz="2400" kern="1200" baseline="0" dirty="0" smtClean="0">
+                      <a:endParaRPr lang="en-US" sz="3600" kern="1200" baseline="0" dirty="0">
                         <a:solidFill>
                           <a:schemeClr val="tx1"/>
                         </a:solidFill>
@@ -4314,7 +4026,7 @@
                         <a:tabLst/>
                         <a:defRPr/>
                       </a:pPr>
-                      <a:endParaRPr lang="en-US" sz="2400" kern="1200" baseline="0" dirty="0" smtClean="0">
+                      <a:endParaRPr lang="en-US" sz="3600" kern="1200" baseline="0" dirty="0">
                         <a:solidFill>
                           <a:schemeClr val="tx1"/>
                         </a:solidFill>
@@ -4342,7 +4054,7 @@
                         <a:tabLst/>
                         <a:defRPr/>
                       </a:pPr>
-                      <a:endParaRPr lang="en-US" sz="2400" kern="1200" baseline="0" dirty="0" smtClean="0">
+                      <a:endParaRPr lang="en-US" sz="3600" kern="1200" baseline="0" dirty="0">
                         <a:solidFill>
                           <a:schemeClr val="tx1"/>
                         </a:solidFill>
@@ -4370,7 +4082,7 @@
                         <a:tabLst/>
                         <a:defRPr/>
                       </a:pPr>
-                      <a:endParaRPr lang="en-US" sz="1200" kern="1200" baseline="0" dirty="0" smtClean="0">
+                      <a:endParaRPr lang="en-US" sz="3600" kern="1200" baseline="0" dirty="0">
                         <a:solidFill>
                           <a:schemeClr val="tx1"/>
                         </a:solidFill>
@@ -4398,8 +4110,232 @@
                         <a:tabLst/>
                         <a:defRPr/>
                       </a:pPr>
+                      <a:endParaRPr lang="en-US" sz="3600" b="1" kern="1200" baseline="0" dirty="0">
+                        <a:solidFill>
+                          <a:schemeClr val="tx1"/>
+                        </a:solidFill>
+                        <a:effectLst/>
+                        <a:latin typeface="+mn-lt"/>
+                        <a:ea typeface="+mn-ea"/>
+                        <a:cs typeface="Open Sans Hebrew" panose="00000500000000000000" pitchFamily="2" charset="-79"/>
+                      </a:endParaRPr>
+                    </a:p>
+                    <a:p>
+                      <a:pPr marL="0" marR="0" lvl="0" indent="0" algn="l" defTabSz="2519995" rtl="0" eaLnBrk="1" fontAlgn="auto" latinLnBrk="0" hangingPunct="1">
+                        <a:lnSpc>
+                          <a:spcPct val="100000"/>
+                        </a:lnSpc>
+                        <a:spcBef>
+                          <a:spcPts val="0"/>
+                        </a:spcBef>
+                        <a:spcAft>
+                          <a:spcPts val="0"/>
+                        </a:spcAft>
+                        <a:buClrTx/>
+                        <a:buSzTx/>
+                        <a:buFontTx/>
+                        <a:buNone/>
+                        <a:tabLst/>
+                        <a:defRPr/>
+                      </a:pPr>
+                      <a:endParaRPr lang="en-US" sz="3600" b="1" kern="1200" baseline="0" dirty="0">
+                        <a:solidFill>
+                          <a:schemeClr val="tx1"/>
+                        </a:solidFill>
+                        <a:effectLst/>
+                        <a:latin typeface="+mn-lt"/>
+                        <a:ea typeface="+mn-ea"/>
+                        <a:cs typeface="Open Sans Hebrew" panose="00000500000000000000" pitchFamily="2" charset="-79"/>
+                      </a:endParaRPr>
+                    </a:p>
+                    <a:p>
+                      <a:pPr marL="0" marR="0" lvl="0" indent="0" algn="l" defTabSz="2519995" rtl="0" eaLnBrk="1" fontAlgn="auto" latinLnBrk="0" hangingPunct="1">
+                        <a:lnSpc>
+                          <a:spcPct val="100000"/>
+                        </a:lnSpc>
+                        <a:spcBef>
+                          <a:spcPts val="0"/>
+                        </a:spcBef>
+                        <a:spcAft>
+                          <a:spcPts val="0"/>
+                        </a:spcAft>
+                        <a:buClrTx/>
+                        <a:buSzTx/>
+                        <a:buFontTx/>
+                        <a:buNone/>
+                        <a:tabLst/>
+                        <a:defRPr/>
+                      </a:pPr>
+                      <a:endParaRPr lang="en-US" sz="3600" b="1" kern="1200" baseline="0" dirty="0">
+                        <a:solidFill>
+                          <a:schemeClr val="tx1"/>
+                        </a:solidFill>
+                        <a:effectLst/>
+                        <a:latin typeface="+mn-lt"/>
+                        <a:ea typeface="+mn-ea"/>
+                        <a:cs typeface="Open Sans Hebrew" panose="00000500000000000000" pitchFamily="2" charset="-79"/>
+                      </a:endParaRPr>
+                    </a:p>
+                    <a:p>
+                      <a:pPr marL="0" marR="0" lvl="0" indent="0" algn="l" defTabSz="2519995" rtl="0" eaLnBrk="1" fontAlgn="auto" latinLnBrk="0" hangingPunct="1">
+                        <a:lnSpc>
+                          <a:spcPct val="100000"/>
+                        </a:lnSpc>
+                        <a:spcBef>
+                          <a:spcPts val="0"/>
+                        </a:spcBef>
+                        <a:spcAft>
+                          <a:spcPts val="0"/>
+                        </a:spcAft>
+                        <a:buClrTx/>
+                        <a:buSzTx/>
+                        <a:buFontTx/>
+                        <a:buNone/>
+                        <a:tabLst/>
+                        <a:defRPr/>
+                      </a:pPr>
+                      <a:endParaRPr lang="en-US" sz="3600" b="1" kern="1200" baseline="0" dirty="0">
+                        <a:solidFill>
+                          <a:schemeClr val="tx1"/>
+                        </a:solidFill>
+                        <a:effectLst/>
+                        <a:latin typeface="+mn-lt"/>
+                        <a:ea typeface="+mn-ea"/>
+                        <a:cs typeface="Open Sans Hebrew" panose="00000500000000000000" pitchFamily="2" charset="-79"/>
+                      </a:endParaRPr>
+                    </a:p>
+                    <a:p>
+                      <a:pPr marL="0" marR="0" lvl="0" indent="0" algn="l" defTabSz="2519995" rtl="0" eaLnBrk="1" fontAlgn="auto" latinLnBrk="0" hangingPunct="1">
+                        <a:lnSpc>
+                          <a:spcPct val="100000"/>
+                        </a:lnSpc>
+                        <a:spcBef>
+                          <a:spcPts val="0"/>
+                        </a:spcBef>
+                        <a:spcAft>
+                          <a:spcPts val="0"/>
+                        </a:spcAft>
+                        <a:buClrTx/>
+                        <a:buSzTx/>
+                        <a:buFontTx/>
+                        <a:buNone/>
+                        <a:tabLst/>
+                        <a:defRPr/>
+                      </a:pPr>
+                      <a:endParaRPr lang="en-US" sz="3600" b="1" kern="1200" baseline="0" dirty="0">
+                        <a:solidFill>
+                          <a:schemeClr val="tx1"/>
+                        </a:solidFill>
+                        <a:effectLst/>
+                        <a:latin typeface="+mn-lt"/>
+                        <a:ea typeface="+mn-ea"/>
+                        <a:cs typeface="Open Sans Hebrew" panose="00000500000000000000" pitchFamily="2" charset="-79"/>
+                      </a:endParaRPr>
+                    </a:p>
+                    <a:p>
+                      <a:pPr marL="0" marR="0" lvl="0" indent="0" algn="l" defTabSz="2519995" rtl="0" eaLnBrk="1" fontAlgn="auto" latinLnBrk="0" hangingPunct="1">
+                        <a:lnSpc>
+                          <a:spcPct val="100000"/>
+                        </a:lnSpc>
+                        <a:spcBef>
+                          <a:spcPts val="0"/>
+                        </a:spcBef>
+                        <a:spcAft>
+                          <a:spcPts val="0"/>
+                        </a:spcAft>
+                        <a:buClrTx/>
+                        <a:buSzTx/>
+                        <a:buFontTx/>
+                        <a:buNone/>
+                        <a:tabLst/>
+                        <a:defRPr/>
+                      </a:pPr>
+                      <a:endParaRPr lang="en-US" sz="3600" b="1" kern="1200" baseline="0" dirty="0">
+                        <a:solidFill>
+                          <a:schemeClr val="tx1"/>
+                        </a:solidFill>
+                        <a:effectLst/>
+                        <a:latin typeface="+mn-lt"/>
+                        <a:ea typeface="+mn-ea"/>
+                        <a:cs typeface="Open Sans Hebrew" panose="00000500000000000000" pitchFamily="2" charset="-79"/>
+                      </a:endParaRPr>
+                    </a:p>
+                    <a:p>
+                      <a:pPr marL="0" marR="0" lvl="0" indent="0" algn="l" defTabSz="2519995" rtl="0" eaLnBrk="1" fontAlgn="auto" latinLnBrk="0" hangingPunct="1">
+                        <a:lnSpc>
+                          <a:spcPct val="100000"/>
+                        </a:lnSpc>
+                        <a:spcBef>
+                          <a:spcPts val="0"/>
+                        </a:spcBef>
+                        <a:spcAft>
+                          <a:spcPts val="0"/>
+                        </a:spcAft>
+                        <a:buClrTx/>
+                        <a:buSzTx/>
+                        <a:buFontTx/>
+                        <a:buNone/>
+                        <a:tabLst/>
+                        <a:defRPr/>
+                      </a:pPr>
+                      <a:endParaRPr lang="en-US" sz="3600" b="1" kern="1200" baseline="0" dirty="0">
+                        <a:solidFill>
+                          <a:schemeClr val="tx1"/>
+                        </a:solidFill>
+                        <a:effectLst/>
+                        <a:latin typeface="+mn-lt"/>
+                        <a:ea typeface="+mn-ea"/>
+                        <a:cs typeface="Open Sans Hebrew" panose="00000500000000000000" pitchFamily="2" charset="-79"/>
+                      </a:endParaRPr>
+                    </a:p>
+                    <a:p>
+                      <a:pPr marL="0" marR="0" lvl="0" indent="0" algn="l" defTabSz="2519995" rtl="0" eaLnBrk="1" fontAlgn="auto" latinLnBrk="0" hangingPunct="1">
+                        <a:lnSpc>
+                          <a:spcPct val="100000"/>
+                        </a:lnSpc>
+                        <a:spcBef>
+                          <a:spcPts val="0"/>
+                        </a:spcBef>
+                        <a:spcAft>
+                          <a:spcPts val="0"/>
+                        </a:spcAft>
+                        <a:buClrTx/>
+                        <a:buSzTx/>
+                        <a:buFontTx/>
+                        <a:buNone/>
+                        <a:tabLst/>
+                        <a:defRPr/>
+                      </a:pPr>
+                      <a:endParaRPr lang="en-US" sz="3600" b="1" kern="1200" baseline="0" dirty="0">
+                        <a:solidFill>
+                          <a:schemeClr val="tx1"/>
+                        </a:solidFill>
+                        <a:effectLst/>
+                        <a:latin typeface="+mn-lt"/>
+                        <a:ea typeface="+mn-ea"/>
+                        <a:cs typeface="Open Sans Hebrew" panose="00000500000000000000" pitchFamily="2" charset="-79"/>
+                      </a:endParaRPr>
+                    </a:p>
+                    <a:p>
+                      <a:pPr marL="0" marR="0" lvl="0" indent="0" algn="l" defTabSz="2519995" rtl="0" eaLnBrk="1" fontAlgn="auto" latinLnBrk="0" hangingPunct="1">
+                        <a:lnSpc>
+                          <a:spcPct val="100000"/>
+                        </a:lnSpc>
+                        <a:spcBef>
+                          <a:spcPts val="0"/>
+                        </a:spcBef>
+                        <a:spcAft>
+                          <a:spcPts val="0"/>
+                        </a:spcAft>
+                        <a:buClrTx/>
+                        <a:buSzTx/>
+                        <a:buFontTx/>
+                        <a:buNone/>
+                        <a:tabLst/>
+                        <a:defRPr/>
+                      </a:pPr>
                       <a:r>
-                        <a:rPr lang="en-US" sz="1200" b="1" kern="1200" baseline="0" dirty="0" smtClean="0">
+                        <a:rPr lang="en-US" sz="3600" b="1" kern="1200" baseline="0" dirty="0">
                           <a:solidFill>
                             <a:schemeClr val="tx1"/>
                           </a:solidFill>
@@ -4410,774 +4346,26 @@
                         </a:rPr>
                         <a:t>Image above shows the enhanced output of a thermal camera after a hand was placed in view, with the original 8x8 data expanded to a clearer 256x256 resolution</a:t>
                       </a:r>
-                      <a:endParaRPr lang="en-US" sz="2400" b="1" kern="1200" baseline="0" dirty="0" smtClean="0">
-                        <a:solidFill>
-                          <a:schemeClr val="tx1"/>
-                        </a:solidFill>
-                        <a:effectLst/>
-                        <a:latin typeface="+mn-lt"/>
-                        <a:ea typeface="+mn-ea"/>
-                        <a:cs typeface="Open Sans Hebrew" panose="00000500000000000000" pitchFamily="2" charset="-79"/>
-                      </a:endParaRPr>
-                    </a:p>
-                    <a:p>
-                      <a:pPr marL="0" marR="0" lvl="0" indent="0" algn="l" defTabSz="2519995" rtl="0" eaLnBrk="1" fontAlgn="auto" latinLnBrk="0" hangingPunct="1">
-                        <a:lnSpc>
-                          <a:spcPct val="100000"/>
-                        </a:lnSpc>
-                        <a:spcBef>
-                          <a:spcPts val="0"/>
-                        </a:spcBef>
-                        <a:spcAft>
-                          <a:spcPts val="0"/>
-                        </a:spcAft>
-                        <a:buClrTx/>
-                        <a:buSzTx/>
-                        <a:buFontTx/>
-                        <a:buNone/>
-                        <a:tabLst/>
-                        <a:defRPr/>
-                      </a:pPr>
-                      <a:endParaRPr lang="en-US" sz="2400" kern="1200" baseline="0" dirty="0" smtClean="0">
-                        <a:solidFill>
-                          <a:schemeClr val="tx1"/>
-                        </a:solidFill>
-                        <a:effectLst/>
-                        <a:latin typeface="+mn-lt"/>
-                        <a:ea typeface="+mn-ea"/>
-                        <a:cs typeface="Open Sans Hebrew" panose="00000500000000000000" pitchFamily="2" charset="-79"/>
-                      </a:endParaRPr>
-                    </a:p>
-                    <a:p>
-                      <a:pPr marL="0" marR="0" lvl="0" indent="0" algn="l" defTabSz="2519995" rtl="0" eaLnBrk="1" fontAlgn="auto" latinLnBrk="0" hangingPunct="1">
-                        <a:lnSpc>
-                          <a:spcPct val="100000"/>
-                        </a:lnSpc>
-                        <a:spcBef>
-                          <a:spcPts val="0"/>
-                        </a:spcBef>
-                        <a:spcAft>
-                          <a:spcPts val="0"/>
-                        </a:spcAft>
-                        <a:buClrTx/>
-                        <a:buSzTx/>
-                        <a:buFontTx/>
-                        <a:buNone/>
-                        <a:tabLst/>
-                        <a:defRPr/>
-                      </a:pPr>
-                      <a:r>
-                        <a:rPr lang="en-US" sz="2400" b="0" i="0" dirty="0" smtClean="0">
-                          <a:solidFill>
-                            <a:srgbClr val="0D0D0D"/>
-                          </a:solidFill>
-                          <a:effectLst/>
-                          <a:latin typeface="+mn-lt"/>
-                        </a:rPr>
-                        <a:t>The graph presents results from advanced testing of the IMU's gyroscope and acceleration sensors, measuring the Earth’s gravitational force.</a:t>
-                      </a:r>
-                      <a:endParaRPr lang="en-US" sz="2400" b="0" kern="1200" baseline="0" dirty="0" smtClean="0">
-                        <a:solidFill>
-                          <a:schemeClr val="tx1"/>
-                        </a:solidFill>
-                        <a:effectLst/>
-                        <a:latin typeface="+mn-lt"/>
-                        <a:ea typeface="+mn-ea"/>
-                        <a:cs typeface="Open Sans Hebrew" panose="00000500000000000000" pitchFamily="2" charset="-79"/>
-                      </a:endParaRPr>
-                    </a:p>
-                    <a:p>
-                      <a:pPr marL="0" marR="0" lvl="0" indent="0" algn="l" defTabSz="2519995" rtl="0" eaLnBrk="1" fontAlgn="auto" latinLnBrk="0" hangingPunct="1">
-                        <a:lnSpc>
-                          <a:spcPct val="100000"/>
-                        </a:lnSpc>
-                        <a:spcBef>
-                          <a:spcPts val="0"/>
-                        </a:spcBef>
-                        <a:spcAft>
-                          <a:spcPts val="0"/>
-                        </a:spcAft>
-                        <a:buClrTx/>
-                        <a:buSzTx/>
-                        <a:buFontTx/>
-                        <a:buNone/>
-                        <a:tabLst/>
-                        <a:defRPr/>
-                      </a:pPr>
-                      <a:endParaRPr lang="en-US" sz="2400" b="0" kern="1200" baseline="0" dirty="0" smtClean="0">
-                        <a:solidFill>
-                          <a:schemeClr val="tx1"/>
-                        </a:solidFill>
-                        <a:effectLst/>
-                        <a:latin typeface="+mn-lt"/>
-                        <a:ea typeface="+mn-ea"/>
-                        <a:cs typeface="Open Sans Hebrew" panose="00000500000000000000" pitchFamily="2" charset="-79"/>
-                      </a:endParaRPr>
-                    </a:p>
-                    <a:p>
-                      <a:pPr marL="0" marR="0" lvl="0" indent="0" algn="l" defTabSz="2519995" rtl="0" eaLnBrk="1" fontAlgn="auto" latinLnBrk="0" hangingPunct="1">
-                        <a:lnSpc>
-                          <a:spcPct val="100000"/>
-                        </a:lnSpc>
-                        <a:spcBef>
-                          <a:spcPts val="0"/>
-                        </a:spcBef>
-                        <a:spcAft>
-                          <a:spcPts val="0"/>
-                        </a:spcAft>
-                        <a:buClrTx/>
-                        <a:buSzTx/>
-                        <a:buFontTx/>
-                        <a:buNone/>
-                        <a:tabLst/>
-                        <a:defRPr/>
-                      </a:pPr>
-                      <a:endParaRPr lang="en-US" sz="2400" b="0" kern="1200" baseline="0" dirty="0" smtClean="0">
-                        <a:solidFill>
-                          <a:schemeClr val="tx1"/>
-                        </a:solidFill>
-                        <a:effectLst/>
-                        <a:latin typeface="+mn-lt"/>
-                        <a:ea typeface="+mn-ea"/>
-                        <a:cs typeface="Open Sans Hebrew" panose="00000500000000000000" pitchFamily="2" charset="-79"/>
-                      </a:endParaRPr>
-                    </a:p>
-                    <a:p>
-                      <a:pPr marL="0" marR="0" lvl="0" indent="0" algn="l" defTabSz="2519995" rtl="0" eaLnBrk="1" fontAlgn="auto" latinLnBrk="0" hangingPunct="1">
-                        <a:lnSpc>
-                          <a:spcPct val="100000"/>
-                        </a:lnSpc>
-                        <a:spcBef>
-                          <a:spcPts val="0"/>
-                        </a:spcBef>
-                        <a:spcAft>
-                          <a:spcPts val="0"/>
-                        </a:spcAft>
-                        <a:buClrTx/>
-                        <a:buSzTx/>
-                        <a:buFontTx/>
-                        <a:buNone/>
-                        <a:tabLst/>
-                        <a:defRPr/>
-                      </a:pPr>
-                      <a:endParaRPr lang="en-US" sz="2400" b="0" kern="1200" baseline="0" dirty="0" smtClean="0">
-                        <a:solidFill>
-                          <a:schemeClr val="tx1"/>
-                        </a:solidFill>
-                        <a:effectLst/>
-                        <a:latin typeface="+mn-lt"/>
-                        <a:ea typeface="+mn-ea"/>
-                        <a:cs typeface="Open Sans Hebrew" panose="00000500000000000000" pitchFamily="2" charset="-79"/>
-                      </a:endParaRPr>
-                    </a:p>
-                    <a:p>
-                      <a:pPr marL="0" marR="0" lvl="0" indent="0" algn="l" defTabSz="2519995" rtl="0" eaLnBrk="1" fontAlgn="auto" latinLnBrk="0" hangingPunct="1">
-                        <a:lnSpc>
-                          <a:spcPct val="100000"/>
-                        </a:lnSpc>
-                        <a:spcBef>
-                          <a:spcPts val="0"/>
-                        </a:spcBef>
-                        <a:spcAft>
-                          <a:spcPts val="0"/>
-                        </a:spcAft>
-                        <a:buClrTx/>
-                        <a:buSzTx/>
-                        <a:buFontTx/>
-                        <a:buNone/>
-                        <a:tabLst/>
-                        <a:defRPr/>
-                      </a:pPr>
-                      <a:endParaRPr lang="en-US" sz="2400" b="0" kern="1200" baseline="0" dirty="0" smtClean="0">
-                        <a:solidFill>
-                          <a:schemeClr val="tx1"/>
-                        </a:solidFill>
-                        <a:effectLst/>
-                        <a:latin typeface="+mn-lt"/>
-                        <a:ea typeface="+mn-ea"/>
-                        <a:cs typeface="Open Sans Hebrew" panose="00000500000000000000" pitchFamily="2" charset="-79"/>
-                      </a:endParaRPr>
-                    </a:p>
-                    <a:p>
-                      <a:pPr marL="0" marR="0" lvl="0" indent="0" algn="l" defTabSz="2519995" rtl="0" eaLnBrk="1" fontAlgn="auto" latinLnBrk="0" hangingPunct="1">
-                        <a:lnSpc>
-                          <a:spcPct val="100000"/>
-                        </a:lnSpc>
-                        <a:spcBef>
-                          <a:spcPts val="0"/>
-                        </a:spcBef>
-                        <a:spcAft>
-                          <a:spcPts val="0"/>
-                        </a:spcAft>
-                        <a:buClrTx/>
-                        <a:buSzTx/>
-                        <a:buFontTx/>
-                        <a:buNone/>
-                        <a:tabLst/>
-                        <a:defRPr/>
-                      </a:pPr>
-                      <a:endParaRPr lang="en-US" sz="2400" b="0" kern="1200" baseline="0" dirty="0" smtClean="0">
-                        <a:solidFill>
-                          <a:schemeClr val="tx1"/>
-                        </a:solidFill>
-                        <a:effectLst/>
-                        <a:latin typeface="+mn-lt"/>
-                        <a:ea typeface="+mn-ea"/>
-                        <a:cs typeface="Open Sans Hebrew" panose="00000500000000000000" pitchFamily="2" charset="-79"/>
-                      </a:endParaRPr>
-                    </a:p>
-                    <a:p>
-                      <a:pPr marL="0" marR="0" lvl="0" indent="0" algn="l" defTabSz="2519995" rtl="0" eaLnBrk="1" fontAlgn="auto" latinLnBrk="0" hangingPunct="1">
-                        <a:lnSpc>
-                          <a:spcPct val="100000"/>
-                        </a:lnSpc>
-                        <a:spcBef>
-                          <a:spcPts val="0"/>
-                        </a:spcBef>
-                        <a:spcAft>
-                          <a:spcPts val="0"/>
-                        </a:spcAft>
-                        <a:buClrTx/>
-                        <a:buSzTx/>
-                        <a:buFontTx/>
-                        <a:buNone/>
-                        <a:tabLst/>
-                        <a:defRPr/>
-                      </a:pPr>
-                      <a:endParaRPr lang="en-US" sz="2400" b="0" kern="1200" baseline="0" dirty="0" smtClean="0">
-                        <a:solidFill>
-                          <a:schemeClr val="tx1"/>
-                        </a:solidFill>
-                        <a:effectLst/>
-                        <a:latin typeface="+mn-lt"/>
-                        <a:ea typeface="+mn-ea"/>
-                        <a:cs typeface="Open Sans Hebrew" panose="00000500000000000000" pitchFamily="2" charset="-79"/>
-                      </a:endParaRPr>
-                    </a:p>
-                    <a:p>
-                      <a:pPr marL="0" marR="0" lvl="0" indent="0" algn="l" defTabSz="2519995" rtl="0" eaLnBrk="1" fontAlgn="auto" latinLnBrk="0" hangingPunct="1">
-                        <a:lnSpc>
-                          <a:spcPct val="100000"/>
-                        </a:lnSpc>
-                        <a:spcBef>
-                          <a:spcPts val="0"/>
-                        </a:spcBef>
-                        <a:spcAft>
-                          <a:spcPts val="0"/>
-                        </a:spcAft>
-                        <a:buClrTx/>
-                        <a:buSzTx/>
-                        <a:buFontTx/>
-                        <a:buNone/>
-                        <a:tabLst/>
-                        <a:defRPr/>
-                      </a:pPr>
-                      <a:endParaRPr lang="en-US" sz="1200" b="1" i="0" dirty="0" smtClean="0">
-                        <a:solidFill>
-                          <a:srgbClr val="0D0D0D"/>
-                        </a:solidFill>
-                        <a:effectLst/>
-                        <a:latin typeface="+mn-lt"/>
-                      </a:endParaRPr>
-                    </a:p>
-                    <a:p>
-                      <a:pPr marL="0" marR="0" lvl="0" indent="0" algn="l" defTabSz="2519995" rtl="0" eaLnBrk="1" fontAlgn="auto" latinLnBrk="0" hangingPunct="1">
-                        <a:lnSpc>
-                          <a:spcPct val="100000"/>
-                        </a:lnSpc>
-                        <a:spcBef>
-                          <a:spcPts val="0"/>
-                        </a:spcBef>
-                        <a:spcAft>
-                          <a:spcPts val="0"/>
-                        </a:spcAft>
-                        <a:buClrTx/>
-                        <a:buSzTx/>
-                        <a:buFontTx/>
-                        <a:buNone/>
-                        <a:tabLst/>
-                        <a:defRPr/>
-                      </a:pPr>
-                      <a:endParaRPr lang="en-US" sz="1200" b="1" i="0" dirty="0" smtClean="0">
-                        <a:solidFill>
-                          <a:srgbClr val="0D0D0D"/>
-                        </a:solidFill>
-                        <a:effectLst/>
-                        <a:latin typeface="+mn-lt"/>
-                      </a:endParaRPr>
-                    </a:p>
-                    <a:p>
-                      <a:pPr marL="0" marR="0" lvl="0" indent="0" algn="l" defTabSz="2519995" rtl="0" eaLnBrk="1" fontAlgn="auto" latinLnBrk="0" hangingPunct="1">
-                        <a:lnSpc>
-                          <a:spcPct val="100000"/>
-                        </a:lnSpc>
-                        <a:spcBef>
-                          <a:spcPts val="0"/>
-                        </a:spcBef>
-                        <a:spcAft>
-                          <a:spcPts val="0"/>
-                        </a:spcAft>
-                        <a:buClrTx/>
-                        <a:buSzTx/>
-                        <a:buFontTx/>
-                        <a:buNone/>
-                        <a:tabLst/>
-                        <a:defRPr/>
-                      </a:pPr>
-                      <a:endParaRPr lang="en-US" sz="1200" b="1" i="0" dirty="0" smtClean="0">
-                        <a:solidFill>
-                          <a:srgbClr val="0D0D0D"/>
-                        </a:solidFill>
-                        <a:effectLst/>
-                        <a:latin typeface="+mn-lt"/>
-                      </a:endParaRPr>
-                    </a:p>
-                    <a:p>
-                      <a:pPr marL="0" marR="0" lvl="0" indent="0" algn="l" defTabSz="2519995" rtl="0" eaLnBrk="1" fontAlgn="auto" latinLnBrk="0" hangingPunct="1">
-                        <a:lnSpc>
-                          <a:spcPct val="100000"/>
-                        </a:lnSpc>
-                        <a:spcBef>
-                          <a:spcPts val="0"/>
-                        </a:spcBef>
-                        <a:spcAft>
-                          <a:spcPts val="0"/>
-                        </a:spcAft>
-                        <a:buClrTx/>
-                        <a:buSzTx/>
-                        <a:buFontTx/>
-                        <a:buNone/>
-                        <a:tabLst/>
-                        <a:defRPr/>
-                      </a:pPr>
-                      <a:r>
-                        <a:rPr lang="en-US" sz="1200" b="1" i="0" dirty="0" smtClean="0">
-                          <a:solidFill>
-                            <a:srgbClr val="0D0D0D"/>
-                          </a:solidFill>
-                          <a:effectLst/>
-                          <a:latin typeface="+mn-lt"/>
-                        </a:rPr>
-                        <a:t>Graph depicting the IMU's acceleration output across a series of samples, orange line represents the z-axis acceleration, closely matching the predicted value and confirming Earth's gravitational pull at approximately 9.81 m/s².</a:t>
-                      </a:r>
-                    </a:p>
-                    <a:p>
-                      <a:pPr marL="0" marR="0" lvl="0" indent="0" algn="l" defTabSz="2519995" rtl="0" eaLnBrk="1" fontAlgn="auto" latinLnBrk="0" hangingPunct="1">
-                        <a:lnSpc>
-                          <a:spcPct val="100000"/>
-                        </a:lnSpc>
-                        <a:spcBef>
-                          <a:spcPts val="0"/>
-                        </a:spcBef>
-                        <a:spcAft>
-                          <a:spcPts val="0"/>
-                        </a:spcAft>
-                        <a:buClrTx/>
-                        <a:buSzTx/>
-                        <a:buFontTx/>
-                        <a:buNone/>
-                        <a:tabLst/>
-                        <a:defRPr/>
-                      </a:pPr>
-                      <a:r>
-                        <a:rPr lang="en-US" sz="1200" b="1" i="0" dirty="0" smtClean="0">
-                          <a:solidFill>
-                            <a:srgbClr val="0D0D0D"/>
-                          </a:solidFill>
-                          <a:effectLst/>
-                          <a:latin typeface="+mn-lt"/>
-                        </a:rPr>
-                        <a:t>The blue </a:t>
-                      </a:r>
-                      <a:r>
-                        <a:rPr lang="en-US" sz="1200" b="1" i="0" smtClean="0">
-                          <a:solidFill>
-                            <a:srgbClr val="0D0D0D"/>
-                          </a:solidFill>
-                          <a:effectLst/>
-                          <a:latin typeface="+mn-lt"/>
-                        </a:rPr>
-                        <a:t>and green </a:t>
-                      </a:r>
-                      <a:r>
-                        <a:rPr lang="en-US" sz="1200" b="1" i="0" dirty="0" smtClean="0">
-                          <a:solidFill>
-                            <a:srgbClr val="0D0D0D"/>
-                          </a:solidFill>
-                          <a:effectLst/>
-                          <a:latin typeface="+mn-lt"/>
-                        </a:rPr>
-                        <a:t>lines depict the stable x-axis and y-axis accelerations, respectively.</a:t>
-                      </a:r>
-                    </a:p>
-                    <a:p>
-                      <a:pPr marL="0" marR="0" lvl="0" indent="0" algn="l" defTabSz="2519995" rtl="0" eaLnBrk="1" fontAlgn="auto" latinLnBrk="0" hangingPunct="1">
-                        <a:lnSpc>
-                          <a:spcPct val="100000"/>
-                        </a:lnSpc>
-                        <a:spcBef>
-                          <a:spcPts val="0"/>
-                        </a:spcBef>
-                        <a:spcAft>
-                          <a:spcPts val="0"/>
-                        </a:spcAft>
-                        <a:buClrTx/>
-                        <a:buSzTx/>
-                        <a:buFontTx/>
-                        <a:buNone/>
-                        <a:tabLst/>
-                        <a:defRPr/>
-                      </a:pPr>
-                      <a:endParaRPr lang="en-US" sz="2400" b="0" kern="1200" baseline="0" dirty="0" smtClean="0">
-                        <a:solidFill>
-                          <a:schemeClr val="tx1"/>
-                        </a:solidFill>
-                        <a:effectLst/>
-                        <a:latin typeface="+mn-lt"/>
-                        <a:ea typeface="+mn-ea"/>
-                        <a:cs typeface="Open Sans Hebrew" panose="00000500000000000000" pitchFamily="2" charset="-79"/>
-                      </a:endParaRPr>
-                    </a:p>
-                    <a:p>
-                      <a:pPr marL="0" marR="0" lvl="0" indent="0" algn="l" defTabSz="2519995" rtl="0" eaLnBrk="1" fontAlgn="auto" latinLnBrk="0" hangingPunct="1">
-                        <a:lnSpc>
-                          <a:spcPct val="100000"/>
-                        </a:lnSpc>
-                        <a:spcBef>
-                          <a:spcPts val="0"/>
-                        </a:spcBef>
-                        <a:spcAft>
-                          <a:spcPts val="0"/>
-                        </a:spcAft>
-                        <a:buClrTx/>
-                        <a:buSzTx/>
-                        <a:buFontTx/>
-                        <a:buNone/>
-                        <a:tabLst/>
-                        <a:defRPr/>
-                      </a:pPr>
-                      <a:r>
-                        <a:rPr lang="en-US" sz="2400" b="0" kern="1200" dirty="0" smtClean="0">
-                          <a:solidFill>
-                            <a:schemeClr val="tx1"/>
-                          </a:solidFill>
-                          <a:effectLst/>
-                          <a:latin typeface="+mn-lt"/>
-                          <a:ea typeface="+mn-ea"/>
-                          <a:cs typeface="Open Sans Hebrew" panose="00000500000000000000" pitchFamily="2" charset="-79"/>
-                        </a:rPr>
-                        <a:t>For the distance sensor, we conducted a ‘walk test’ distance. By approaching and then distancing the from the sensor, we observed fluctuations in the mean sensor values, which effectively indicated increases and decreases in the distance.</a:t>
-                      </a:r>
-                    </a:p>
-                    <a:p>
-                      <a:pPr marL="0" marR="0" lvl="0" indent="0" algn="l" defTabSz="2519995" rtl="0" eaLnBrk="1" fontAlgn="auto" latinLnBrk="0" hangingPunct="1">
-                        <a:lnSpc>
-                          <a:spcPct val="100000"/>
-                        </a:lnSpc>
-                        <a:spcBef>
-                          <a:spcPts val="0"/>
-                        </a:spcBef>
-                        <a:spcAft>
-                          <a:spcPts val="0"/>
-                        </a:spcAft>
-                        <a:buClrTx/>
-                        <a:buSzTx/>
-                        <a:buFontTx/>
-                        <a:buNone/>
-                        <a:tabLst/>
-                        <a:defRPr/>
-                      </a:pPr>
-                      <a:endParaRPr lang="en-US" sz="2400" b="0" kern="1200" baseline="0" dirty="0" smtClean="0">
-                        <a:solidFill>
-                          <a:schemeClr val="tx1"/>
-                        </a:solidFill>
-                        <a:effectLst/>
-                        <a:latin typeface="+mn-lt"/>
-                        <a:ea typeface="+mn-ea"/>
-                        <a:cs typeface="Open Sans Hebrew" panose="00000500000000000000" pitchFamily="2" charset="-79"/>
-                      </a:endParaRPr>
-                    </a:p>
-                    <a:p>
-                      <a:pPr marL="0" marR="0" lvl="0" indent="0" algn="l" defTabSz="2519995" rtl="0" eaLnBrk="1" fontAlgn="auto" latinLnBrk="0" hangingPunct="1">
-                        <a:lnSpc>
-                          <a:spcPct val="100000"/>
-                        </a:lnSpc>
-                        <a:spcBef>
-                          <a:spcPts val="0"/>
-                        </a:spcBef>
-                        <a:spcAft>
-                          <a:spcPts val="0"/>
-                        </a:spcAft>
-                        <a:buClrTx/>
-                        <a:buSzTx/>
-                        <a:buFontTx/>
-                        <a:buNone/>
-                        <a:tabLst/>
-                        <a:defRPr/>
-                      </a:pPr>
-                      <a:endParaRPr lang="en-US" sz="2400" b="0" kern="1200" baseline="0" dirty="0" smtClean="0">
-                        <a:solidFill>
-                          <a:schemeClr val="tx1"/>
-                        </a:solidFill>
-                        <a:effectLst/>
-                        <a:latin typeface="+mn-lt"/>
-                        <a:ea typeface="+mn-ea"/>
-                        <a:cs typeface="Open Sans Hebrew" panose="00000500000000000000" pitchFamily="2" charset="-79"/>
-                      </a:endParaRPr>
-                    </a:p>
-                    <a:p>
-                      <a:pPr marL="0" marR="0" lvl="0" indent="0" algn="l" defTabSz="2519995" rtl="0" eaLnBrk="1" fontAlgn="auto" latinLnBrk="0" hangingPunct="1">
-                        <a:lnSpc>
-                          <a:spcPct val="100000"/>
-                        </a:lnSpc>
-                        <a:spcBef>
-                          <a:spcPts val="0"/>
-                        </a:spcBef>
-                        <a:spcAft>
-                          <a:spcPts val="0"/>
-                        </a:spcAft>
-                        <a:buClrTx/>
-                        <a:buSzTx/>
-                        <a:buFontTx/>
-                        <a:buNone/>
-                        <a:tabLst/>
-                        <a:defRPr/>
-                      </a:pPr>
-                      <a:endParaRPr lang="en-US" sz="2400" b="0" kern="1200" baseline="0" dirty="0" smtClean="0">
-                        <a:solidFill>
-                          <a:schemeClr val="tx1"/>
-                        </a:solidFill>
-                        <a:effectLst/>
-                        <a:latin typeface="+mn-lt"/>
-                        <a:ea typeface="+mn-ea"/>
-                        <a:cs typeface="Open Sans Hebrew" panose="00000500000000000000" pitchFamily="2" charset="-79"/>
-                      </a:endParaRPr>
-                    </a:p>
-                    <a:p>
-                      <a:pPr marL="0" marR="0" lvl="0" indent="0" algn="l" defTabSz="2519995" rtl="0" eaLnBrk="1" fontAlgn="auto" latinLnBrk="0" hangingPunct="1">
-                        <a:lnSpc>
-                          <a:spcPct val="100000"/>
-                        </a:lnSpc>
-                        <a:spcBef>
-                          <a:spcPts val="0"/>
-                        </a:spcBef>
-                        <a:spcAft>
-                          <a:spcPts val="0"/>
-                        </a:spcAft>
-                        <a:buClrTx/>
-                        <a:buSzTx/>
-                        <a:buFontTx/>
-                        <a:buNone/>
-                        <a:tabLst/>
-                        <a:defRPr/>
-                      </a:pPr>
-                      <a:endParaRPr lang="en-US" sz="2400" b="0" kern="1200" baseline="0" dirty="0" smtClean="0">
-                        <a:solidFill>
-                          <a:schemeClr val="tx1"/>
-                        </a:solidFill>
-                        <a:effectLst/>
-                        <a:latin typeface="+mn-lt"/>
-                        <a:ea typeface="+mn-ea"/>
-                        <a:cs typeface="Open Sans Hebrew" panose="00000500000000000000" pitchFamily="2" charset="-79"/>
-                      </a:endParaRPr>
-                    </a:p>
-                    <a:p>
-                      <a:pPr marL="0" marR="0" lvl="0" indent="0" algn="l" defTabSz="2519995" rtl="0" eaLnBrk="1" fontAlgn="auto" latinLnBrk="0" hangingPunct="1">
-                        <a:lnSpc>
-                          <a:spcPct val="100000"/>
-                        </a:lnSpc>
-                        <a:spcBef>
-                          <a:spcPts val="0"/>
-                        </a:spcBef>
-                        <a:spcAft>
-                          <a:spcPts val="0"/>
-                        </a:spcAft>
-                        <a:buClrTx/>
-                        <a:buSzTx/>
-                        <a:buFontTx/>
-                        <a:buNone/>
-                        <a:tabLst/>
-                        <a:defRPr/>
-                      </a:pPr>
-                      <a:endParaRPr lang="en-US" sz="2400" b="0" kern="1200" baseline="0" dirty="0" smtClean="0">
-                        <a:solidFill>
-                          <a:schemeClr val="tx1"/>
-                        </a:solidFill>
-                        <a:effectLst/>
-                        <a:latin typeface="+mn-lt"/>
-                        <a:ea typeface="+mn-ea"/>
-                        <a:cs typeface="Open Sans Hebrew" panose="00000500000000000000" pitchFamily="2" charset="-79"/>
-                      </a:endParaRPr>
-                    </a:p>
-                    <a:p>
-                      <a:pPr marL="0" marR="0" lvl="0" indent="0" algn="l" defTabSz="2519995" rtl="0" eaLnBrk="1" fontAlgn="auto" latinLnBrk="0" hangingPunct="1">
-                        <a:lnSpc>
-                          <a:spcPct val="100000"/>
-                        </a:lnSpc>
-                        <a:spcBef>
-                          <a:spcPts val="0"/>
-                        </a:spcBef>
-                        <a:spcAft>
-                          <a:spcPts val="0"/>
-                        </a:spcAft>
-                        <a:buClrTx/>
-                        <a:buSzTx/>
-                        <a:buFontTx/>
-                        <a:buNone/>
-                        <a:tabLst/>
-                        <a:defRPr/>
-                      </a:pPr>
-                      <a:endParaRPr lang="en-US" sz="2400" b="0" kern="1200" baseline="0" dirty="0" smtClean="0">
-                        <a:solidFill>
-                          <a:schemeClr val="tx1"/>
-                        </a:solidFill>
-                        <a:effectLst/>
-                        <a:latin typeface="+mn-lt"/>
-                        <a:ea typeface="+mn-ea"/>
-                        <a:cs typeface="Open Sans Hebrew" panose="00000500000000000000" pitchFamily="2" charset="-79"/>
-                      </a:endParaRPr>
-                    </a:p>
-                    <a:p>
-                      <a:pPr marL="0" marR="0" lvl="0" indent="0" algn="l" defTabSz="2519995" rtl="0" eaLnBrk="1" fontAlgn="auto" latinLnBrk="0" hangingPunct="1">
-                        <a:lnSpc>
-                          <a:spcPct val="100000"/>
-                        </a:lnSpc>
-                        <a:spcBef>
-                          <a:spcPts val="0"/>
-                        </a:spcBef>
-                        <a:spcAft>
-                          <a:spcPts val="0"/>
-                        </a:spcAft>
-                        <a:buClrTx/>
-                        <a:buSzTx/>
-                        <a:buFontTx/>
-                        <a:buNone/>
-                        <a:tabLst/>
-                        <a:defRPr/>
-                      </a:pPr>
-                      <a:endParaRPr lang="en-US" sz="2400" b="0" kern="1200" baseline="0" dirty="0" smtClean="0">
-                        <a:solidFill>
-                          <a:schemeClr val="tx1"/>
-                        </a:solidFill>
-                        <a:effectLst/>
-                        <a:latin typeface="+mn-lt"/>
-                        <a:ea typeface="+mn-ea"/>
-                        <a:cs typeface="Open Sans Hebrew" panose="00000500000000000000" pitchFamily="2" charset="-79"/>
-                      </a:endParaRPr>
-                    </a:p>
-                    <a:p>
-                      <a:pPr marL="0" marR="0" lvl="0" indent="0" algn="l" defTabSz="2519995" rtl="0" eaLnBrk="1" fontAlgn="auto" latinLnBrk="0" hangingPunct="1">
-                        <a:lnSpc>
-                          <a:spcPct val="100000"/>
-                        </a:lnSpc>
-                        <a:spcBef>
-                          <a:spcPts val="0"/>
-                        </a:spcBef>
-                        <a:spcAft>
-                          <a:spcPts val="0"/>
-                        </a:spcAft>
-                        <a:buClrTx/>
-                        <a:buSzTx/>
-                        <a:buFontTx/>
-                        <a:buNone/>
-                        <a:tabLst/>
-                        <a:defRPr/>
-                      </a:pPr>
-                      <a:endParaRPr lang="en-US" sz="2400" b="0" kern="1200" baseline="0" dirty="0" smtClean="0">
-                        <a:solidFill>
-                          <a:schemeClr val="tx1"/>
-                        </a:solidFill>
-                        <a:effectLst/>
-                        <a:latin typeface="+mn-lt"/>
-                        <a:ea typeface="+mn-ea"/>
-                        <a:cs typeface="Open Sans Hebrew" panose="00000500000000000000" pitchFamily="2" charset="-79"/>
-                      </a:endParaRPr>
-                    </a:p>
-                    <a:p>
-                      <a:pPr marL="0" marR="0" lvl="0" indent="0" algn="l" defTabSz="2519995" rtl="0" eaLnBrk="1" fontAlgn="auto" latinLnBrk="0" hangingPunct="1">
-                        <a:lnSpc>
-                          <a:spcPct val="100000"/>
-                        </a:lnSpc>
-                        <a:spcBef>
-                          <a:spcPts val="0"/>
-                        </a:spcBef>
-                        <a:spcAft>
-                          <a:spcPts val="0"/>
-                        </a:spcAft>
-                        <a:buClrTx/>
-                        <a:buSzTx/>
-                        <a:buFontTx/>
-                        <a:buNone/>
-                        <a:tabLst/>
-                        <a:defRPr/>
-                      </a:pPr>
-                      <a:endParaRPr lang="en-US" sz="2400" b="0" kern="1200" baseline="0" dirty="0" smtClean="0">
-                        <a:solidFill>
-                          <a:schemeClr val="tx1"/>
-                        </a:solidFill>
-                        <a:effectLst/>
-                        <a:latin typeface="+mn-lt"/>
-                        <a:ea typeface="+mn-ea"/>
-                        <a:cs typeface="Open Sans Hebrew" panose="00000500000000000000" pitchFamily="2" charset="-79"/>
-                      </a:endParaRPr>
-                    </a:p>
-                    <a:p>
-                      <a:pPr marL="0" marR="0" lvl="0" indent="0" algn="l" defTabSz="2519995" rtl="0" eaLnBrk="1" fontAlgn="auto" latinLnBrk="0" hangingPunct="1">
-                        <a:lnSpc>
-                          <a:spcPct val="100000"/>
-                        </a:lnSpc>
-                        <a:spcBef>
-                          <a:spcPts val="0"/>
-                        </a:spcBef>
-                        <a:spcAft>
-                          <a:spcPts val="0"/>
-                        </a:spcAft>
-                        <a:buClrTx/>
-                        <a:buSzTx/>
-                        <a:buFontTx/>
-                        <a:buNone/>
-                        <a:tabLst/>
-                        <a:defRPr/>
-                      </a:pPr>
-                      <a:endParaRPr lang="en-US" sz="2400" b="0" kern="1200" baseline="0" dirty="0" smtClean="0">
-                        <a:solidFill>
-                          <a:schemeClr val="tx1"/>
-                        </a:solidFill>
-                        <a:effectLst/>
-                        <a:latin typeface="+mn-lt"/>
-                        <a:ea typeface="+mn-ea"/>
-                        <a:cs typeface="Open Sans Hebrew" panose="00000500000000000000" pitchFamily="2" charset="-79"/>
-                      </a:endParaRPr>
-                    </a:p>
-                    <a:p>
-                      <a:pPr marL="0" marR="0" lvl="0" indent="0" algn="l" defTabSz="2519995" rtl="0" eaLnBrk="1" fontAlgn="auto" latinLnBrk="0" hangingPunct="1">
-                        <a:lnSpc>
-                          <a:spcPct val="100000"/>
-                        </a:lnSpc>
-                        <a:spcBef>
-                          <a:spcPts val="0"/>
-                        </a:spcBef>
-                        <a:spcAft>
-                          <a:spcPts val="0"/>
-                        </a:spcAft>
-                        <a:buClrTx/>
-                        <a:buSzTx/>
-                        <a:buFontTx/>
-                        <a:buNone/>
-                        <a:tabLst/>
-                        <a:defRPr/>
-                      </a:pPr>
-                      <a:r>
-                        <a:rPr lang="en-US" sz="1200" b="1" i="0" dirty="0" smtClean="0">
-                          <a:solidFill>
-                            <a:srgbClr val="0D0D0D"/>
-                          </a:solidFill>
-                          <a:effectLst/>
-                          <a:latin typeface="+mn-lt"/>
-                        </a:rPr>
-                        <a:t>The chart illustrates the average output from a distance sensor during a movement test, with distance measurements in millimeters over a sequence of samples. Fluctuations in the data reflect the subject moving closer to or further from the sensor, based on the mean result from a 64-pixel (8x8 grid) array of the distance sensor</a:t>
-                      </a:r>
-                      <a:endParaRPr lang="en-US" sz="2400" b="0" kern="1200" baseline="0" dirty="0" smtClean="0">
+                    </a:p>
+                    <a:p>
+                      <a:pPr marL="0" marR="0" lvl="0" indent="0" algn="l" defTabSz="2519995" rtl="0" eaLnBrk="1" fontAlgn="auto" latinLnBrk="0" hangingPunct="1">
+                        <a:lnSpc>
+                          <a:spcPct val="100000"/>
+                        </a:lnSpc>
+                        <a:spcBef>
+                          <a:spcPts val="0"/>
+                        </a:spcBef>
+                        <a:spcAft>
+                          <a:spcPts val="0"/>
+                        </a:spcAft>
+                        <a:buClrTx/>
+                        <a:buSzTx/>
+                        <a:buFontTx/>
+                        <a:buNone/>
+                        <a:tabLst/>
+                        <a:defRPr/>
+                      </a:pPr>
+                      <a:endParaRPr lang="en-US" sz="3600" kern="1200" baseline="0" dirty="0">
                         <a:solidFill>
                           <a:schemeClr val="tx1"/>
                         </a:solidFill>
@@ -5249,7 +4437,7 @@
                         <a:tabLst/>
                         <a:defRPr/>
                       </a:pPr>
-                      <a:endParaRPr lang="en-US" sz="2400" b="1" kern="1200" dirty="0" smtClean="0">
+                      <a:endParaRPr lang="en-US" sz="3600" b="1" kern="1200" dirty="0">
                         <a:solidFill>
                           <a:schemeClr val="tx1"/>
                         </a:solidFill>
@@ -5278,14 +4466,14 @@
                         <a:defRPr/>
                       </a:pPr>
                       <a:r>
-                        <a:rPr lang="en-US" sz="2400" b="0" i="0" dirty="0" smtClean="0">
+                        <a:rPr lang="en-US" sz="3600" b="0" i="0" dirty="0">
                           <a:solidFill>
                             <a:srgbClr val="0D0D0D"/>
                           </a:solidFill>
                           <a:effectLst/>
                           <a:latin typeface="+mn-lt"/>
                         </a:rPr>
-                        <a:t>We conducted a series of press tests on the Force resistor sensor to evaluate its sensitivity and responsiveness. The sensor was repeatedly compressed and released to verify its ability to consistently register pressure changes.</a:t>
+                        <a:t>Similar test results can be seen in the documentation.</a:t>
                       </a:r>
                     </a:p>
                     <a:p>
@@ -5306,7 +4494,7 @@
                         <a:tabLst/>
                         <a:defRPr/>
                       </a:pPr>
-                      <a:endParaRPr lang="en-US" sz="2400" b="0" i="0" kern="1200" dirty="0" smtClean="0">
+                      <a:endParaRPr lang="en-US" sz="3600" b="0" i="0" kern="1200" dirty="0">
                         <a:solidFill>
                           <a:srgbClr val="0D0D0D"/>
                         </a:solidFill>
@@ -5334,7 +4522,7 @@
                         <a:tabLst/>
                         <a:defRPr/>
                       </a:pPr>
-                      <a:endParaRPr lang="en-US" sz="2400" b="1" kern="1200" dirty="0" smtClean="0">
+                      <a:endParaRPr lang="en-US" sz="3600" b="1" kern="1200" dirty="0">
                         <a:solidFill>
                           <a:schemeClr val="tx1"/>
                         </a:solidFill>
@@ -5362,7 +4550,7 @@
                         <a:tabLst/>
                         <a:defRPr/>
                       </a:pPr>
-                      <a:endParaRPr lang="en-US" sz="2400" b="1" kern="1200" dirty="0" smtClean="0">
+                      <a:endParaRPr lang="en-US" sz="3600" b="1" kern="1200" dirty="0">
                         <a:solidFill>
                           <a:schemeClr val="tx1"/>
                         </a:solidFill>
@@ -5390,7 +4578,7 @@
                         <a:tabLst/>
                         <a:defRPr/>
                       </a:pPr>
-                      <a:endParaRPr lang="en-US" sz="2400" b="1" kern="1200" dirty="0" smtClean="0">
+                      <a:endParaRPr lang="en-US" sz="3600" b="1" kern="1200" dirty="0">
                         <a:solidFill>
                           <a:schemeClr val="tx1"/>
                         </a:solidFill>
@@ -5418,7 +4606,7 @@
                         <a:tabLst/>
                         <a:defRPr/>
                       </a:pPr>
-                      <a:endParaRPr lang="en-US" sz="2400" b="1" kern="1200" dirty="0" smtClean="0">
+                      <a:endParaRPr lang="en-US" sz="3600" b="1" kern="1200" dirty="0">
                         <a:solidFill>
                           <a:schemeClr val="tx1"/>
                         </a:solidFill>
@@ -5446,7 +4634,7 @@
                         <a:tabLst/>
                         <a:defRPr/>
                       </a:pPr>
-                      <a:endParaRPr lang="en-US" sz="2400" b="1" kern="1200" dirty="0" smtClean="0">
+                      <a:endParaRPr lang="en-US" sz="3600" b="1" kern="1200" dirty="0">
                         <a:solidFill>
                           <a:schemeClr val="tx1"/>
                         </a:solidFill>
@@ -5474,7 +4662,7 @@
                         <a:tabLst/>
                         <a:defRPr/>
                       </a:pPr>
-                      <a:endParaRPr lang="en-US" sz="2400" b="1" kern="1200" dirty="0" smtClean="0">
+                      <a:endParaRPr lang="en-US" sz="3600" b="1" kern="1200" dirty="0">
                         <a:solidFill>
                           <a:schemeClr val="tx1"/>
                         </a:solidFill>
@@ -5502,7 +4690,7 @@
                         <a:tabLst/>
                         <a:defRPr/>
                       </a:pPr>
-                      <a:endParaRPr lang="en-US" sz="2400" b="1" kern="1200" dirty="0" smtClean="0">
+                      <a:endParaRPr lang="en-US" sz="3600" b="0" kern="1200" dirty="0">
                         <a:solidFill>
                           <a:schemeClr val="tx1"/>
                         </a:solidFill>
@@ -5530,120 +4718,8 @@
                         <a:tabLst/>
                         <a:defRPr/>
                       </a:pPr>
-                      <a:endParaRPr lang="en-US" sz="2400" b="1" kern="1200" dirty="0" smtClean="0">
-                        <a:solidFill>
-                          <a:schemeClr val="tx1"/>
-                        </a:solidFill>
-                        <a:effectLst/>
-                        <a:latin typeface="+mn-lt"/>
-                        <a:ea typeface="+mn-ea"/>
-                        <a:cs typeface="Open Sans Hebrew" panose="00000500000000000000" pitchFamily="2" charset="-79"/>
-                      </a:endParaRPr>
-                    </a:p>
-                    <a:p>
-                      <a:pPr marL="0" marR="0" lvl="0" indent="0" algn="l" defTabSz="2519995" rtl="0" eaLnBrk="1" fontAlgn="auto" latinLnBrk="0" hangingPunct="1">
-                        <a:lnSpc>
-                          <a:spcPct val="100000"/>
-                        </a:lnSpc>
-                        <a:spcBef>
-                          <a:spcPts val="0"/>
-                        </a:spcBef>
-                        <a:spcAft>
-                          <a:spcPts val="0"/>
-                        </a:spcAft>
-                        <a:buClrTx/>
-                        <a:buSzTx/>
-                        <a:buFontTx/>
-                        <a:buNone/>
-                        <a:tabLst/>
-                        <a:defRPr/>
-                      </a:pPr>
-                      <a:endParaRPr lang="en-US" sz="2400" b="1" kern="1200" dirty="0" smtClean="0">
-                        <a:solidFill>
-                          <a:schemeClr val="tx1"/>
-                        </a:solidFill>
-                        <a:effectLst/>
-                        <a:latin typeface="+mn-lt"/>
-                        <a:ea typeface="+mn-ea"/>
-                        <a:cs typeface="Open Sans Hebrew" panose="00000500000000000000" pitchFamily="2" charset="-79"/>
-                      </a:endParaRPr>
-                    </a:p>
-                    <a:p>
-                      <a:pPr marL="0" marR="0" lvl="0" indent="0" algn="l" defTabSz="2519995" rtl="0" eaLnBrk="1" fontAlgn="auto" latinLnBrk="0" hangingPunct="1">
-                        <a:lnSpc>
-                          <a:spcPct val="100000"/>
-                        </a:lnSpc>
-                        <a:spcBef>
-                          <a:spcPts val="0"/>
-                        </a:spcBef>
-                        <a:spcAft>
-                          <a:spcPts val="0"/>
-                        </a:spcAft>
-                        <a:buClrTx/>
-                        <a:buSzTx/>
-                        <a:buFontTx/>
-                        <a:buNone/>
-                        <a:tabLst/>
-                        <a:defRPr/>
-                      </a:pPr>
-                      <a:endParaRPr lang="en-US" sz="2400" b="0" kern="1200" dirty="0" smtClean="0">
-                        <a:solidFill>
-                          <a:schemeClr val="tx1"/>
-                        </a:solidFill>
-                        <a:effectLst/>
-                        <a:latin typeface="+mn-lt"/>
-                        <a:ea typeface="+mn-ea"/>
-                        <a:cs typeface="Open Sans Hebrew" panose="00000500000000000000" pitchFamily="2" charset="-79"/>
-                      </a:endParaRPr>
-                    </a:p>
-                    <a:p>
-                      <a:pPr marL="0" marR="0" lvl="0" indent="0" algn="l" defTabSz="2519995" rtl="0" eaLnBrk="1" fontAlgn="auto" latinLnBrk="0" hangingPunct="1">
-                        <a:lnSpc>
-                          <a:spcPct val="100000"/>
-                        </a:lnSpc>
-                        <a:spcBef>
-                          <a:spcPts val="0"/>
-                        </a:spcBef>
-                        <a:spcAft>
-                          <a:spcPts val="0"/>
-                        </a:spcAft>
-                        <a:buClrTx/>
-                        <a:buSzTx/>
-                        <a:buFontTx/>
-                        <a:buNone/>
-                        <a:tabLst/>
-                        <a:defRPr/>
-                      </a:pPr>
-                      <a:endParaRPr lang="en-US" sz="2400" b="0" kern="1200" dirty="0" smtClean="0">
-                        <a:solidFill>
-                          <a:schemeClr val="tx1"/>
-                        </a:solidFill>
-                        <a:effectLst/>
-                        <a:latin typeface="+mn-lt"/>
-                        <a:ea typeface="+mn-ea"/>
-                        <a:cs typeface="Open Sans Hebrew" panose="00000500000000000000" pitchFamily="2" charset="-79"/>
-                      </a:endParaRPr>
-                    </a:p>
-                    <a:p>
-                      <a:pPr marL="0" marR="0" lvl="0" indent="0" algn="l" defTabSz="2519995" rtl="0" eaLnBrk="1" fontAlgn="auto" latinLnBrk="0" hangingPunct="1">
-                        <a:lnSpc>
-                          <a:spcPct val="100000"/>
-                        </a:lnSpc>
-                        <a:spcBef>
-                          <a:spcPts val="0"/>
-                        </a:spcBef>
-                        <a:spcAft>
-                          <a:spcPts val="0"/>
-                        </a:spcAft>
-                        <a:buClrTx/>
-                        <a:buSzTx/>
-                        <a:buFontTx/>
-                        <a:buNone/>
-                        <a:tabLst/>
-                        <a:defRPr/>
-                      </a:pPr>
                       <a:r>
-                        <a:rPr lang="en-US" sz="1200" b="1" kern="1200" dirty="0" smtClean="0">
+                        <a:rPr lang="en-US" sz="3600" b="1" kern="1200" dirty="0">
                           <a:solidFill>
                             <a:schemeClr val="tx1"/>
                           </a:solidFill>
@@ -5652,7 +4728,7 @@
                           <a:ea typeface="+mn-ea"/>
                           <a:cs typeface="Open Sans Hebrew" panose="00000500000000000000" pitchFamily="2" charset="-79"/>
                         </a:rPr>
-                        <a:t>The graph displays the force resistor sensor readings across multiple samples, illustrating the cyclical application and removal of force on the sensor.</a:t>
+                        <a:t>The above graphs display samples of tests done on several of the sensors in the system.</a:t>
                       </a:r>
                     </a:p>
                     <a:p>
@@ -5673,7 +4749,7 @@
                         <a:tabLst/>
                         <a:defRPr/>
                       </a:pPr>
-                      <a:endParaRPr lang="en-US" sz="2400" b="0" kern="1200" dirty="0" smtClean="0">
+                      <a:endParaRPr lang="en-US" sz="3600" b="0" kern="1200" dirty="0">
                         <a:solidFill>
                           <a:schemeClr val="tx1"/>
                         </a:solidFill>
@@ -5702,7 +4778,38 @@
                         <a:defRPr/>
                       </a:pPr>
                       <a:r>
-                        <a:rPr lang="en-US" sz="2400" b="0" kern="1200" dirty="0" smtClean="0">
+                        <a:rPr lang="en-US" sz="3600" b="1" u="none" kern="1200" dirty="0">
+                          <a:solidFill>
+                            <a:schemeClr val="tx1"/>
+                          </a:solidFill>
+                          <a:effectLst/>
+                          <a:latin typeface="+mn-lt"/>
+                          <a:ea typeface="+mn-ea"/>
+                          <a:cs typeface="Open Sans Hebrew" panose="00000500000000000000" pitchFamily="2" charset="-79"/>
+                        </a:rPr>
+                        <a:t>Software</a:t>
+                      </a:r>
+                    </a:p>
+                    <a:p>
+                      <a:pPr marL="0" marR="0" lvl="0" indent="0" algn="l" defTabSz="2519995" rtl="0" eaLnBrk="1" fontAlgn="auto" latinLnBrk="0" hangingPunct="1">
+                        <a:lnSpc>
+                          <a:spcPct val="100000"/>
+                        </a:lnSpc>
+                        <a:spcBef>
+                          <a:spcPts val="0"/>
+                        </a:spcBef>
+                        <a:spcAft>
+                          <a:spcPts val="0"/>
+                        </a:spcAft>
+                        <a:buClrTx/>
+                        <a:buSzTx/>
+                        <a:buFontTx/>
+                        <a:buNone/>
+                        <a:tabLst/>
+                        <a:defRPr/>
+                      </a:pPr>
+                      <a:r>
+                        <a:rPr lang="en-US" sz="3600" b="0" kern="1200" dirty="0">
                           <a:solidFill>
                             <a:schemeClr val="tx1"/>
                           </a:solidFill>
@@ -5732,7 +4839,7 @@
                         <a:tabLst/>
                         <a:defRPr/>
                       </a:pPr>
-                      <a:endParaRPr lang="en-US" sz="2400" b="0" kern="1200" baseline="0" dirty="0" smtClean="0">
+                      <a:endParaRPr lang="en-US" sz="3600" b="0" kern="1200" baseline="0" dirty="0">
                         <a:solidFill>
                           <a:schemeClr val="tx1"/>
                         </a:solidFill>
@@ -5760,7 +4867,7 @@
                         <a:tabLst/>
                         <a:defRPr/>
                       </a:pPr>
-                      <a:endParaRPr lang="en-US" sz="2400" b="0" kern="1200" dirty="0" smtClean="0">
+                      <a:endParaRPr lang="en-US" sz="3600" b="0" kern="1200" dirty="0">
                         <a:solidFill>
                           <a:schemeClr val="tx1"/>
                         </a:solidFill>
@@ -5788,7 +4895,7 @@
                         <a:tabLst/>
                         <a:defRPr/>
                       </a:pPr>
-                      <a:endParaRPr lang="en-US" sz="2400" b="0" kern="1200" dirty="0" smtClean="0">
+                      <a:endParaRPr lang="en-US" sz="3600" b="0" kern="1200" dirty="0">
                         <a:solidFill>
                           <a:schemeClr val="tx1"/>
                         </a:solidFill>
@@ -5816,7 +4923,7 @@
                         <a:tabLst/>
                         <a:defRPr/>
                       </a:pPr>
-                      <a:endParaRPr lang="en-US" sz="2400" b="0" kern="1200" dirty="0" smtClean="0">
+                      <a:endParaRPr lang="en-US" sz="3600" b="0" kern="1200" dirty="0">
                         <a:solidFill>
                           <a:schemeClr val="tx1"/>
                         </a:solidFill>
@@ -5844,7 +4951,7 @@
                         <a:tabLst/>
                         <a:defRPr/>
                       </a:pPr>
-                      <a:endParaRPr lang="en-US" sz="2400" b="0" kern="1200" dirty="0" smtClean="0">
+                      <a:endParaRPr lang="en-US" sz="3600" b="0" kern="1200" dirty="0">
                         <a:solidFill>
                           <a:schemeClr val="tx1"/>
                         </a:solidFill>
@@ -5872,7 +4979,7 @@
                         <a:tabLst/>
                         <a:defRPr/>
                       </a:pPr>
-                      <a:endParaRPr lang="en-US" sz="2400" b="1" kern="1200" dirty="0" smtClean="0">
+                      <a:endParaRPr lang="en-US" sz="3600" b="1" kern="1200" dirty="0">
                         <a:solidFill>
                           <a:schemeClr val="tx1"/>
                         </a:solidFill>
@@ -5900,7 +5007,7 @@
                         <a:tabLst/>
                         <a:defRPr/>
                       </a:pPr>
-                      <a:endParaRPr lang="en-US" sz="2400" b="1" kern="1200" dirty="0" smtClean="0">
+                      <a:endParaRPr lang="en-US" sz="3600" b="1" kern="1200" dirty="0">
                         <a:solidFill>
                           <a:schemeClr val="tx1"/>
                         </a:solidFill>
@@ -5928,7 +5035,7 @@
                         <a:tabLst/>
                         <a:defRPr/>
                       </a:pPr>
-                      <a:endParaRPr lang="he-IL" sz="2400" b="1" kern="1200" dirty="0" smtClean="0">
+                      <a:endParaRPr lang="en-US" sz="3600" b="1" kern="1200" dirty="0">
                         <a:solidFill>
                           <a:schemeClr val="tx1"/>
                         </a:solidFill>
@@ -5956,120 +5063,8 @@
                         <a:tabLst/>
                         <a:defRPr/>
                       </a:pPr>
-                      <a:endParaRPr lang="he-IL" sz="2400" b="1" kern="1200" dirty="0" smtClean="0">
-                        <a:solidFill>
-                          <a:schemeClr val="tx1"/>
-                        </a:solidFill>
-                        <a:effectLst/>
-                        <a:latin typeface="+mn-lt"/>
-                        <a:ea typeface="+mn-ea"/>
-                        <a:cs typeface="Open Sans Hebrew" panose="00000500000000000000" pitchFamily="2" charset="-79"/>
-                      </a:endParaRPr>
-                    </a:p>
-                    <a:p>
-                      <a:pPr marL="0" marR="0" lvl="0" indent="0" algn="l" defTabSz="2519995" rtl="0" eaLnBrk="1" fontAlgn="auto" latinLnBrk="0" hangingPunct="1">
-                        <a:lnSpc>
-                          <a:spcPct val="100000"/>
-                        </a:lnSpc>
-                        <a:spcBef>
-                          <a:spcPts val="0"/>
-                        </a:spcBef>
-                        <a:spcAft>
-                          <a:spcPts val="0"/>
-                        </a:spcAft>
-                        <a:buClrTx/>
-                        <a:buSzTx/>
-                        <a:buFontTx/>
-                        <a:buNone/>
-                        <a:tabLst/>
-                        <a:defRPr/>
-                      </a:pPr>
-                      <a:endParaRPr lang="he-IL" sz="2400" b="1" kern="1200" dirty="0" smtClean="0">
-                        <a:solidFill>
-                          <a:schemeClr val="tx1"/>
-                        </a:solidFill>
-                        <a:effectLst/>
-                        <a:latin typeface="+mn-lt"/>
-                        <a:ea typeface="+mn-ea"/>
-                        <a:cs typeface="Open Sans Hebrew" panose="00000500000000000000" pitchFamily="2" charset="-79"/>
-                      </a:endParaRPr>
-                    </a:p>
-                    <a:p>
-                      <a:pPr marL="0" marR="0" lvl="0" indent="0" algn="l" defTabSz="2519995" rtl="0" eaLnBrk="1" fontAlgn="auto" latinLnBrk="0" hangingPunct="1">
-                        <a:lnSpc>
-                          <a:spcPct val="100000"/>
-                        </a:lnSpc>
-                        <a:spcBef>
-                          <a:spcPts val="0"/>
-                        </a:spcBef>
-                        <a:spcAft>
-                          <a:spcPts val="0"/>
-                        </a:spcAft>
-                        <a:buClrTx/>
-                        <a:buSzTx/>
-                        <a:buFontTx/>
-                        <a:buNone/>
-                        <a:tabLst/>
-                        <a:defRPr/>
-                      </a:pPr>
-                      <a:endParaRPr lang="en-US" sz="2400" b="1" kern="1200" dirty="0" smtClean="0">
-                        <a:solidFill>
-                          <a:schemeClr val="tx1"/>
-                        </a:solidFill>
-                        <a:effectLst/>
-                        <a:latin typeface="+mn-lt"/>
-                        <a:ea typeface="+mn-ea"/>
-                        <a:cs typeface="Open Sans Hebrew" panose="00000500000000000000" pitchFamily="2" charset="-79"/>
-                      </a:endParaRPr>
-                    </a:p>
-                    <a:p>
-                      <a:pPr marL="0" marR="0" lvl="0" indent="0" algn="l" defTabSz="2519995" rtl="0" eaLnBrk="1" fontAlgn="auto" latinLnBrk="0" hangingPunct="1">
-                        <a:lnSpc>
-                          <a:spcPct val="100000"/>
-                        </a:lnSpc>
-                        <a:spcBef>
-                          <a:spcPts val="0"/>
-                        </a:spcBef>
-                        <a:spcAft>
-                          <a:spcPts val="0"/>
-                        </a:spcAft>
-                        <a:buClrTx/>
-                        <a:buSzTx/>
-                        <a:buFontTx/>
-                        <a:buNone/>
-                        <a:tabLst/>
-                        <a:defRPr/>
-                      </a:pPr>
-                      <a:endParaRPr lang="en-US" sz="2400" b="1" kern="1200" dirty="0" smtClean="0">
-                        <a:solidFill>
-                          <a:schemeClr val="tx1"/>
-                        </a:solidFill>
-                        <a:effectLst/>
-                        <a:latin typeface="+mn-lt"/>
-                        <a:ea typeface="+mn-ea"/>
-                        <a:cs typeface="Open Sans Hebrew" panose="00000500000000000000" pitchFamily="2" charset="-79"/>
-                      </a:endParaRPr>
-                    </a:p>
-                    <a:p>
-                      <a:pPr marL="0" marR="0" lvl="0" indent="0" algn="l" defTabSz="2519995" rtl="0" eaLnBrk="1" fontAlgn="auto" latinLnBrk="0" hangingPunct="1">
-                        <a:lnSpc>
-                          <a:spcPct val="100000"/>
-                        </a:lnSpc>
-                        <a:spcBef>
-                          <a:spcPts val="0"/>
-                        </a:spcBef>
-                        <a:spcAft>
-                          <a:spcPts val="0"/>
-                        </a:spcAft>
-                        <a:buClrTx/>
-                        <a:buSzTx/>
-                        <a:buFontTx/>
-                        <a:buNone/>
-                        <a:tabLst/>
-                        <a:defRPr/>
-                      </a:pPr>
                       <a:r>
-                        <a:rPr lang="en-US" sz="1200" b="1" kern="1200" dirty="0" smtClean="0">
+                        <a:rPr lang="en-US" sz="3600" b="1" kern="1200" dirty="0">
                           <a:solidFill>
                             <a:schemeClr val="tx1"/>
                           </a:solidFill>
@@ -6099,7 +5094,7 @@
                         <a:tabLst/>
                         <a:defRPr/>
                       </a:pPr>
-                      <a:endParaRPr lang="en-US" sz="2400" b="0" kern="1200" dirty="0" smtClean="0">
+                      <a:endParaRPr lang="en-US" sz="3600" b="1" kern="1200" dirty="0">
                         <a:solidFill>
                           <a:schemeClr val="tx1"/>
                         </a:solidFill>
@@ -6128,461 +5123,7 @@
                         <a:defRPr/>
                       </a:pPr>
                       <a:r>
-                        <a:rPr lang="en-US" sz="2400" b="0" kern="1200" dirty="0" smtClean="0">
-                          <a:solidFill>
-                            <a:schemeClr val="tx1"/>
-                          </a:solidFill>
-                          <a:effectLst/>
-                          <a:latin typeface="+mn-lt"/>
-                          <a:ea typeface="+mn-ea"/>
-                          <a:cs typeface="Open Sans Hebrew" panose="00000500000000000000" pitchFamily="2" charset="-79"/>
-                        </a:rPr>
-                        <a:t>The software's documentation and usage guidelines, including detailed installation instructions and tutorials, are available on GitHub</a:t>
-                      </a:r>
-                    </a:p>
-                    <a:p>
-                      <a:pPr marL="0" marR="0" lvl="0" indent="0" algn="l" defTabSz="2519995" rtl="0" eaLnBrk="1" fontAlgn="auto" latinLnBrk="0" hangingPunct="1">
-                        <a:lnSpc>
-                          <a:spcPct val="100000"/>
-                        </a:lnSpc>
-                        <a:spcBef>
-                          <a:spcPts val="0"/>
-                        </a:spcBef>
-                        <a:spcAft>
-                          <a:spcPts val="0"/>
-                        </a:spcAft>
-                        <a:buClrTx/>
-                        <a:buSzTx/>
-                        <a:buFontTx/>
-                        <a:buNone/>
-                        <a:tabLst/>
-                        <a:defRPr/>
-                      </a:pPr>
-                      <a:endParaRPr lang="en-US" sz="2400" b="0" kern="1200" dirty="0" smtClean="0">
-                        <a:solidFill>
-                          <a:schemeClr val="tx1"/>
-                        </a:solidFill>
-                        <a:effectLst/>
-                        <a:latin typeface="+mn-lt"/>
-                        <a:ea typeface="+mn-ea"/>
-                        <a:cs typeface="Open Sans Hebrew" panose="00000500000000000000" pitchFamily="2" charset="-79"/>
-                      </a:endParaRPr>
-                    </a:p>
-                    <a:p>
-                      <a:pPr marL="0" marR="0" lvl="0" indent="0" algn="l" defTabSz="2519995" rtl="0" eaLnBrk="1" fontAlgn="auto" latinLnBrk="0" hangingPunct="1">
-                        <a:lnSpc>
-                          <a:spcPct val="100000"/>
-                        </a:lnSpc>
-                        <a:spcBef>
-                          <a:spcPts val="0"/>
-                        </a:spcBef>
-                        <a:spcAft>
-                          <a:spcPts val="0"/>
-                        </a:spcAft>
-                        <a:buClrTx/>
-                        <a:buSzTx/>
-                        <a:buFontTx/>
-                        <a:buNone/>
-                        <a:tabLst/>
-                        <a:defRPr/>
-                      </a:pPr>
-                      <a:endParaRPr lang="en-US" sz="2400" b="0" kern="1200" dirty="0" smtClean="0">
-                        <a:solidFill>
-                          <a:schemeClr val="tx1"/>
-                        </a:solidFill>
-                        <a:effectLst/>
-                        <a:latin typeface="+mn-lt"/>
-                        <a:ea typeface="+mn-ea"/>
-                        <a:cs typeface="Open Sans Hebrew" panose="00000500000000000000" pitchFamily="2" charset="-79"/>
-                      </a:endParaRPr>
-                    </a:p>
-                    <a:p>
-                      <a:pPr marL="0" marR="0" lvl="0" indent="0" algn="l" defTabSz="2519995" rtl="0" eaLnBrk="1" fontAlgn="auto" latinLnBrk="0" hangingPunct="1">
-                        <a:lnSpc>
-                          <a:spcPct val="100000"/>
-                        </a:lnSpc>
-                        <a:spcBef>
-                          <a:spcPts val="0"/>
-                        </a:spcBef>
-                        <a:spcAft>
-                          <a:spcPts val="0"/>
-                        </a:spcAft>
-                        <a:buClrTx/>
-                        <a:buSzTx/>
-                        <a:buFontTx/>
-                        <a:buNone/>
-                        <a:tabLst/>
-                        <a:defRPr/>
-                      </a:pPr>
-                      <a:endParaRPr lang="en-US" sz="2400" b="0" kern="1200" dirty="0" smtClean="0">
-                        <a:solidFill>
-                          <a:schemeClr val="tx1"/>
-                        </a:solidFill>
-                        <a:effectLst/>
-                        <a:latin typeface="+mn-lt"/>
-                        <a:ea typeface="+mn-ea"/>
-                        <a:cs typeface="Open Sans Hebrew" panose="00000500000000000000" pitchFamily="2" charset="-79"/>
-                      </a:endParaRPr>
-                    </a:p>
-                    <a:p>
-                      <a:pPr marL="0" marR="0" lvl="0" indent="0" algn="l" defTabSz="2519995" rtl="0" eaLnBrk="1" fontAlgn="auto" latinLnBrk="0" hangingPunct="1">
-                        <a:lnSpc>
-                          <a:spcPct val="100000"/>
-                        </a:lnSpc>
-                        <a:spcBef>
-                          <a:spcPts val="0"/>
-                        </a:spcBef>
-                        <a:spcAft>
-                          <a:spcPts val="0"/>
-                        </a:spcAft>
-                        <a:buClrTx/>
-                        <a:buSzTx/>
-                        <a:buFontTx/>
-                        <a:buNone/>
-                        <a:tabLst/>
-                        <a:defRPr/>
-                      </a:pPr>
-                      <a:endParaRPr lang="en-US" sz="2400" b="1" kern="1200" dirty="0" smtClean="0">
-                        <a:solidFill>
-                          <a:schemeClr val="tx1"/>
-                        </a:solidFill>
-                        <a:effectLst/>
-                        <a:latin typeface="+mn-lt"/>
-                        <a:ea typeface="+mn-ea"/>
-                        <a:cs typeface="Open Sans Hebrew" panose="00000500000000000000" pitchFamily="2" charset="-79"/>
-                      </a:endParaRPr>
-                    </a:p>
-                    <a:p>
-                      <a:pPr marL="0" marR="0" lvl="0" indent="0" algn="l" defTabSz="2519995" rtl="0" eaLnBrk="1" fontAlgn="auto" latinLnBrk="0" hangingPunct="1">
-                        <a:lnSpc>
-                          <a:spcPct val="100000"/>
-                        </a:lnSpc>
-                        <a:spcBef>
-                          <a:spcPts val="0"/>
-                        </a:spcBef>
-                        <a:spcAft>
-                          <a:spcPts val="0"/>
-                        </a:spcAft>
-                        <a:buClrTx/>
-                        <a:buSzTx/>
-                        <a:buFontTx/>
-                        <a:buNone/>
-                        <a:tabLst/>
-                        <a:defRPr/>
-                      </a:pPr>
-                      <a:endParaRPr lang="en-US" sz="2400" b="1" kern="1200" dirty="0" smtClean="0">
-                        <a:solidFill>
-                          <a:schemeClr val="tx1"/>
-                        </a:solidFill>
-                        <a:effectLst/>
-                        <a:latin typeface="+mn-lt"/>
-                        <a:ea typeface="+mn-ea"/>
-                        <a:cs typeface="Open Sans Hebrew" panose="00000500000000000000" pitchFamily="2" charset="-79"/>
-                      </a:endParaRPr>
-                    </a:p>
-                    <a:p>
-                      <a:pPr marL="0" marR="0" lvl="0" indent="0" algn="l" defTabSz="2519995" rtl="0" eaLnBrk="1" fontAlgn="auto" latinLnBrk="0" hangingPunct="1">
-                        <a:lnSpc>
-                          <a:spcPct val="100000"/>
-                        </a:lnSpc>
-                        <a:spcBef>
-                          <a:spcPts val="0"/>
-                        </a:spcBef>
-                        <a:spcAft>
-                          <a:spcPts val="0"/>
-                        </a:spcAft>
-                        <a:buClrTx/>
-                        <a:buSzTx/>
-                        <a:buFontTx/>
-                        <a:buNone/>
-                        <a:tabLst/>
-                        <a:defRPr/>
-                      </a:pPr>
-                      <a:endParaRPr lang="en-US" sz="2400" b="1" kern="1200" dirty="0" smtClean="0">
-                        <a:solidFill>
-                          <a:schemeClr val="tx1"/>
-                        </a:solidFill>
-                        <a:effectLst/>
-                        <a:latin typeface="+mn-lt"/>
-                        <a:ea typeface="+mn-ea"/>
-                        <a:cs typeface="Open Sans Hebrew" panose="00000500000000000000" pitchFamily="2" charset="-79"/>
-                      </a:endParaRPr>
-                    </a:p>
-                    <a:p>
-                      <a:pPr marL="0" marR="0" lvl="0" indent="0" algn="l" defTabSz="2519995" rtl="0" eaLnBrk="1" fontAlgn="auto" latinLnBrk="0" hangingPunct="1">
-                        <a:lnSpc>
-                          <a:spcPct val="100000"/>
-                        </a:lnSpc>
-                        <a:spcBef>
-                          <a:spcPts val="0"/>
-                        </a:spcBef>
-                        <a:spcAft>
-                          <a:spcPts val="0"/>
-                        </a:spcAft>
-                        <a:buClrTx/>
-                        <a:buSzTx/>
-                        <a:buFontTx/>
-                        <a:buNone/>
-                        <a:tabLst/>
-                        <a:defRPr/>
-                      </a:pPr>
-                      <a:endParaRPr lang="en-US" sz="2400" b="1" kern="1200" dirty="0" smtClean="0">
-                        <a:solidFill>
-                          <a:schemeClr val="tx1"/>
-                        </a:solidFill>
-                        <a:effectLst/>
-                        <a:latin typeface="+mn-lt"/>
-                        <a:ea typeface="+mn-ea"/>
-                        <a:cs typeface="Open Sans Hebrew" panose="00000500000000000000" pitchFamily="2" charset="-79"/>
-                      </a:endParaRPr>
-                    </a:p>
-                    <a:p>
-                      <a:pPr marL="0" marR="0" lvl="0" indent="0" algn="l" defTabSz="2519995" rtl="0" eaLnBrk="1" fontAlgn="auto" latinLnBrk="0" hangingPunct="1">
-                        <a:lnSpc>
-                          <a:spcPct val="100000"/>
-                        </a:lnSpc>
-                        <a:spcBef>
-                          <a:spcPts val="0"/>
-                        </a:spcBef>
-                        <a:spcAft>
-                          <a:spcPts val="0"/>
-                        </a:spcAft>
-                        <a:buClrTx/>
-                        <a:buSzTx/>
-                        <a:buFontTx/>
-                        <a:buNone/>
-                        <a:tabLst/>
-                        <a:defRPr/>
-                      </a:pPr>
-                      <a:endParaRPr lang="en-US" sz="2400" b="1" kern="1200" dirty="0" smtClean="0">
-                        <a:solidFill>
-                          <a:schemeClr val="tx1"/>
-                        </a:solidFill>
-                        <a:effectLst/>
-                        <a:latin typeface="+mn-lt"/>
-                        <a:ea typeface="+mn-ea"/>
-                        <a:cs typeface="Open Sans Hebrew" panose="00000500000000000000" pitchFamily="2" charset="-79"/>
-                      </a:endParaRPr>
-                    </a:p>
-                    <a:p>
-                      <a:pPr marL="0" marR="0" lvl="0" indent="0" algn="l" defTabSz="2519995" rtl="0" eaLnBrk="1" fontAlgn="auto" latinLnBrk="0" hangingPunct="1">
-                        <a:lnSpc>
-                          <a:spcPct val="100000"/>
-                        </a:lnSpc>
-                        <a:spcBef>
-                          <a:spcPts val="0"/>
-                        </a:spcBef>
-                        <a:spcAft>
-                          <a:spcPts val="0"/>
-                        </a:spcAft>
-                        <a:buClrTx/>
-                        <a:buSzTx/>
-                        <a:buFontTx/>
-                        <a:buNone/>
-                        <a:tabLst/>
-                        <a:defRPr/>
-                      </a:pPr>
-                      <a:endParaRPr lang="en-US" sz="2400" b="1" kern="1200" dirty="0" smtClean="0">
-                        <a:solidFill>
-                          <a:schemeClr val="tx1"/>
-                        </a:solidFill>
-                        <a:effectLst/>
-                        <a:latin typeface="+mn-lt"/>
-                        <a:ea typeface="+mn-ea"/>
-                        <a:cs typeface="Open Sans Hebrew" panose="00000500000000000000" pitchFamily="2" charset="-79"/>
-                      </a:endParaRPr>
-                    </a:p>
-                    <a:p>
-                      <a:pPr marL="0" marR="0" lvl="0" indent="0" algn="l" defTabSz="2519995" rtl="0" eaLnBrk="1" fontAlgn="auto" latinLnBrk="0" hangingPunct="1">
-                        <a:lnSpc>
-                          <a:spcPct val="100000"/>
-                        </a:lnSpc>
-                        <a:spcBef>
-                          <a:spcPts val="0"/>
-                        </a:spcBef>
-                        <a:spcAft>
-                          <a:spcPts val="0"/>
-                        </a:spcAft>
-                        <a:buClrTx/>
-                        <a:buSzTx/>
-                        <a:buFontTx/>
-                        <a:buNone/>
-                        <a:tabLst/>
-                        <a:defRPr/>
-                      </a:pPr>
-                      <a:endParaRPr lang="en-US" sz="2400" b="1" kern="1200" dirty="0" smtClean="0">
-                        <a:solidFill>
-                          <a:schemeClr val="tx1"/>
-                        </a:solidFill>
-                        <a:effectLst/>
-                        <a:latin typeface="+mn-lt"/>
-                        <a:ea typeface="+mn-ea"/>
-                        <a:cs typeface="Open Sans Hebrew" panose="00000500000000000000" pitchFamily="2" charset="-79"/>
-                      </a:endParaRPr>
-                    </a:p>
-                    <a:p>
-                      <a:pPr marL="0" marR="0" lvl="0" indent="0" algn="l" defTabSz="2519995" rtl="0" eaLnBrk="1" fontAlgn="auto" latinLnBrk="0" hangingPunct="1">
-                        <a:lnSpc>
-                          <a:spcPct val="100000"/>
-                        </a:lnSpc>
-                        <a:spcBef>
-                          <a:spcPts val="0"/>
-                        </a:spcBef>
-                        <a:spcAft>
-                          <a:spcPts val="0"/>
-                        </a:spcAft>
-                        <a:buClrTx/>
-                        <a:buSzTx/>
-                        <a:buFontTx/>
-                        <a:buNone/>
-                        <a:tabLst/>
-                        <a:defRPr/>
-                      </a:pPr>
-                      <a:endParaRPr lang="en-US" sz="2400" b="1" kern="1200" dirty="0" smtClean="0">
-                        <a:solidFill>
-                          <a:schemeClr val="tx1"/>
-                        </a:solidFill>
-                        <a:effectLst/>
-                        <a:latin typeface="+mn-lt"/>
-                        <a:ea typeface="+mn-ea"/>
-                        <a:cs typeface="Open Sans Hebrew" panose="00000500000000000000" pitchFamily="2" charset="-79"/>
-                      </a:endParaRPr>
-                    </a:p>
-                    <a:p>
-                      <a:pPr marL="0" marR="0" lvl="0" indent="0" algn="l" defTabSz="2519995" rtl="0" eaLnBrk="1" fontAlgn="auto" latinLnBrk="0" hangingPunct="1">
-                        <a:lnSpc>
-                          <a:spcPct val="100000"/>
-                        </a:lnSpc>
-                        <a:spcBef>
-                          <a:spcPts val="0"/>
-                        </a:spcBef>
-                        <a:spcAft>
-                          <a:spcPts val="0"/>
-                        </a:spcAft>
-                        <a:buClrTx/>
-                        <a:buSzTx/>
-                        <a:buFontTx/>
-                        <a:buNone/>
-                        <a:tabLst/>
-                        <a:defRPr/>
-                      </a:pPr>
-                      <a:endParaRPr lang="en-US" sz="2400" b="1" kern="1200" dirty="0" smtClean="0">
-                        <a:solidFill>
-                          <a:schemeClr val="tx1"/>
-                        </a:solidFill>
-                        <a:effectLst/>
-                        <a:latin typeface="+mn-lt"/>
-                        <a:ea typeface="+mn-ea"/>
-                        <a:cs typeface="Open Sans Hebrew" panose="00000500000000000000" pitchFamily="2" charset="-79"/>
-                      </a:endParaRPr>
-                    </a:p>
-                    <a:p>
-                      <a:pPr marL="0" marR="0" lvl="0" indent="0" algn="l" defTabSz="2519995" rtl="0" eaLnBrk="1" fontAlgn="auto" latinLnBrk="0" hangingPunct="1">
-                        <a:lnSpc>
-                          <a:spcPct val="100000"/>
-                        </a:lnSpc>
-                        <a:spcBef>
-                          <a:spcPts val="0"/>
-                        </a:spcBef>
-                        <a:spcAft>
-                          <a:spcPts val="0"/>
-                        </a:spcAft>
-                        <a:buClrTx/>
-                        <a:buSzTx/>
-                        <a:buFontTx/>
-                        <a:buNone/>
-                        <a:tabLst/>
-                        <a:defRPr/>
-                      </a:pPr>
-                      <a:r>
-                        <a:rPr lang="en-US" sz="1200" b="1" i="0" kern="1200" dirty="0" smtClean="0">
-                          <a:solidFill>
-                            <a:schemeClr val="tx1"/>
-                          </a:solidFill>
-                          <a:effectLst/>
-                          <a:latin typeface="+mn-lt"/>
-                          <a:ea typeface="+mn-ea"/>
-                          <a:cs typeface="+mn-cs"/>
-                        </a:rPr>
-                        <a:t>GitHub repository page of the project</a:t>
-                      </a:r>
-                    </a:p>
-                    <a:p>
-                      <a:pPr marL="0" marR="0" lvl="0" indent="0" algn="l" defTabSz="2519995" rtl="0" eaLnBrk="1" fontAlgn="auto" latinLnBrk="0" hangingPunct="1">
-                        <a:lnSpc>
-                          <a:spcPct val="100000"/>
-                        </a:lnSpc>
-                        <a:spcBef>
-                          <a:spcPts val="0"/>
-                        </a:spcBef>
-                        <a:spcAft>
-                          <a:spcPts val="0"/>
-                        </a:spcAft>
-                        <a:buClrTx/>
-                        <a:buSzTx/>
-                        <a:buFontTx/>
-                        <a:buNone/>
-                        <a:tabLst/>
-                        <a:defRPr/>
-                      </a:pPr>
-                      <a:endParaRPr lang="en-US" sz="1200" b="1" i="0" kern="1200" dirty="0" smtClean="0">
-                        <a:solidFill>
-                          <a:schemeClr val="tx1"/>
-                        </a:solidFill>
-                        <a:effectLst/>
-                        <a:latin typeface="+mn-lt"/>
-                        <a:ea typeface="+mn-ea"/>
-                        <a:cs typeface="+mn-cs"/>
-                      </a:endParaRPr>
-                    </a:p>
-                    <a:p>
-                      <a:pPr marL="0" marR="0" lvl="0" indent="0" algn="l" defTabSz="2519995" rtl="0" eaLnBrk="1" fontAlgn="auto" latinLnBrk="0" hangingPunct="1">
-                        <a:lnSpc>
-                          <a:spcPct val="100000"/>
-                        </a:lnSpc>
-                        <a:spcBef>
-                          <a:spcPts val="0"/>
-                        </a:spcBef>
-                        <a:spcAft>
-                          <a:spcPts val="0"/>
-                        </a:spcAft>
-                        <a:buClrTx/>
-                        <a:buSzTx/>
-                        <a:buFontTx/>
-                        <a:buNone/>
-                        <a:tabLst/>
-                        <a:defRPr/>
-                      </a:pPr>
-                      <a:endParaRPr lang="en-US" sz="1200" b="1" kern="1200" dirty="0" smtClean="0">
-                        <a:solidFill>
-                          <a:schemeClr val="tx1"/>
-                        </a:solidFill>
-                        <a:effectLst/>
-                        <a:latin typeface="+mn-lt"/>
-                        <a:ea typeface="+mn-ea"/>
-                        <a:cs typeface="Open Sans Hebrew" panose="00000500000000000000" pitchFamily="2" charset="-79"/>
-                      </a:endParaRPr>
-                    </a:p>
-                    <a:p>
-                      <a:pPr marL="0" marR="0" lvl="0" indent="0" algn="l" defTabSz="2519995" rtl="0" eaLnBrk="1" fontAlgn="auto" latinLnBrk="0" hangingPunct="1">
-                        <a:lnSpc>
-                          <a:spcPct val="100000"/>
-                        </a:lnSpc>
-                        <a:spcBef>
-                          <a:spcPts val="0"/>
-                        </a:spcBef>
-                        <a:spcAft>
-                          <a:spcPts val="0"/>
-                        </a:spcAft>
-                        <a:buClrTx/>
-                        <a:buSzTx/>
-                        <a:buFontTx/>
-                        <a:buNone/>
-                        <a:tabLst/>
-                        <a:defRPr/>
-                      </a:pPr>
-                      <a:r>
-                        <a:rPr lang="en-US" sz="2400" b="1" kern="1200" dirty="0" smtClean="0">
+                        <a:rPr lang="en-US" sz="3600" b="1" kern="1200" dirty="0">
                           <a:solidFill>
                             <a:schemeClr val="tx1"/>
                           </a:solidFill>
@@ -6613,7 +5154,7 @@
                         <a:defRPr/>
                       </a:pPr>
                       <a:r>
-                        <a:rPr lang="en-US" sz="2400" kern="1200" dirty="0" smtClean="0">
+                        <a:rPr lang="en-US" sz="3600" kern="1200" dirty="0">
                           <a:solidFill>
                             <a:schemeClr val="tx1"/>
                           </a:solidFill>
@@ -6624,7 +5165,7 @@
                         </a:rPr>
                         <a:t>The developed infrastructure successfully integrates a range of sensor inputs and outputs, along with visual and auditory elements, to create a comprehensive monitoring and interaction environment. This cohesive setup demonstrates a significant advancement in creating versatile and adaptable systems for various applications, from environmental monitoring to interactive installations.</a:t>
                       </a:r>
-                      <a:endParaRPr lang="en-US" sz="2400" kern="1200" baseline="0" dirty="0" smtClean="0">
+                      <a:endParaRPr lang="en-US" sz="3600" kern="1200" baseline="0" dirty="0">
                         <a:solidFill>
                           <a:schemeClr val="tx1"/>
                         </a:solidFill>
@@ -6652,7 +5193,7 @@
                         <a:tabLst/>
                         <a:defRPr/>
                       </a:pPr>
-                      <a:endParaRPr lang="en-US" sz="2400" kern="1200" baseline="0" dirty="0" smtClean="0">
+                      <a:endParaRPr lang="en-US" sz="3600" kern="1200" baseline="0" dirty="0">
                         <a:solidFill>
                           <a:schemeClr val="tx1"/>
                         </a:solidFill>
@@ -6680,7 +5221,7 @@
                         <a:tabLst/>
                         <a:defRPr/>
                       </a:pPr>
-                      <a:endParaRPr lang="en-US" sz="2400" kern="1200" baseline="0" dirty="0" smtClean="0">
+                      <a:endParaRPr lang="en-US" sz="3600" kern="1200" baseline="0" dirty="0">
                         <a:solidFill>
                           <a:schemeClr val="tx1"/>
                         </a:solidFill>
@@ -6708,7 +5249,7 @@
                         <a:tabLst/>
                         <a:defRPr/>
                       </a:pPr>
-                      <a:endParaRPr lang="en-US" sz="2400" kern="1200" dirty="0" smtClean="0">
+                      <a:endParaRPr lang="en-US" sz="3600" kern="1200" dirty="0">
                         <a:solidFill>
                           <a:schemeClr val="tx1"/>
                         </a:solidFill>
@@ -6736,7 +5277,7 @@
                         <a:tabLst/>
                         <a:defRPr/>
                       </a:pPr>
-                      <a:endParaRPr lang="en-US" sz="2400" b="1" kern="1200" dirty="0" smtClean="0">
+                      <a:endParaRPr lang="en-US" sz="3600" b="1" kern="1200" dirty="0">
                         <a:solidFill>
                           <a:schemeClr val="tx1"/>
                         </a:solidFill>
@@ -6764,7 +5305,7 @@
                         <a:tabLst/>
                         <a:defRPr/>
                       </a:pPr>
-                      <a:endParaRPr lang="en-US" sz="2400" b="1" kern="1200" dirty="0" smtClean="0">
+                      <a:endParaRPr lang="en-US" sz="3600" b="1" kern="1200" dirty="0">
                         <a:solidFill>
                           <a:schemeClr val="tx1"/>
                         </a:solidFill>
@@ -6792,7 +5333,7 @@
                         <a:tabLst/>
                         <a:defRPr/>
                       </a:pPr>
-                      <a:endParaRPr lang="en-US" sz="2400" b="1" kern="1200" dirty="0" smtClean="0">
+                      <a:endParaRPr lang="en-US" sz="3600" b="1" kern="1200" dirty="0">
                         <a:solidFill>
                           <a:schemeClr val="tx1"/>
                         </a:solidFill>
@@ -6820,7 +5361,7 @@
                         <a:tabLst/>
                         <a:defRPr/>
                       </a:pPr>
-                      <a:endParaRPr lang="en-US" sz="2400" b="1" kern="1200" dirty="0" smtClean="0">
+                      <a:endParaRPr lang="en-US" sz="3600" b="1" kern="1200" dirty="0">
                         <a:solidFill>
                           <a:schemeClr val="tx1"/>
                         </a:solidFill>
@@ -6848,7 +5389,7 @@
                         <a:tabLst/>
                         <a:defRPr/>
                       </a:pPr>
-                      <a:endParaRPr lang="en-US" sz="2400" b="1" kern="1200" dirty="0" smtClean="0">
+                      <a:endParaRPr lang="en-US" sz="3600" b="1" kern="1200" dirty="0">
                         <a:solidFill>
                           <a:schemeClr val="tx1"/>
                         </a:solidFill>
@@ -6876,7 +5417,7 @@
                         <a:tabLst/>
                         <a:defRPr/>
                       </a:pPr>
-                      <a:endParaRPr lang="en-US" sz="2400" b="1" kern="1200" dirty="0" smtClean="0">
+                      <a:endParaRPr lang="en-US" sz="3600" b="1" kern="1200" dirty="0">
                         <a:solidFill>
                           <a:schemeClr val="tx1"/>
                         </a:solidFill>
@@ -6904,7 +5445,7 @@
                         <a:tabLst/>
                         <a:defRPr/>
                       </a:pPr>
-                      <a:endParaRPr lang="en-US" sz="2400" b="1" kern="1200" dirty="0" smtClean="0">
+                      <a:endParaRPr lang="en-US" sz="3600" b="1" kern="1200" dirty="0">
                         <a:solidFill>
                           <a:schemeClr val="tx1"/>
                         </a:solidFill>
@@ -6932,7 +5473,7 @@
                         <a:tabLst/>
                         <a:defRPr/>
                       </a:pPr>
-                      <a:endParaRPr lang="en-US" sz="2400" b="1" kern="1200" dirty="0" smtClean="0">
+                      <a:endParaRPr lang="en-US" sz="3600" b="1" kern="1200" dirty="0">
                         <a:solidFill>
                           <a:schemeClr val="tx1"/>
                         </a:solidFill>
@@ -6960,7 +5501,7 @@
                         <a:tabLst/>
                         <a:defRPr/>
                       </a:pPr>
-                      <a:endParaRPr lang="en-US" sz="2400" b="1" kern="1200" dirty="0" smtClean="0">
+                      <a:endParaRPr lang="en-US" sz="3600" b="1" kern="1200" dirty="0">
                         <a:solidFill>
                           <a:schemeClr val="tx1"/>
                         </a:solidFill>
@@ -6988,7 +5529,7 @@
                         <a:tabLst/>
                         <a:defRPr/>
                       </a:pPr>
-                      <a:endParaRPr lang="en-US" sz="2400" b="1" kern="1200" dirty="0" smtClean="0">
+                      <a:endParaRPr lang="en-US" sz="3600" b="1" kern="1200" dirty="0">
                         <a:solidFill>
                           <a:schemeClr val="tx1"/>
                         </a:solidFill>
@@ -7016,7 +5557,7 @@
                         <a:tabLst/>
                         <a:defRPr/>
                       </a:pPr>
-                      <a:endParaRPr lang="en-US" sz="2400" b="1" kern="1200" dirty="0" smtClean="0">
+                      <a:endParaRPr lang="en-US" sz="3600" b="1" kern="1200" dirty="0">
                         <a:solidFill>
                           <a:schemeClr val="tx1"/>
                         </a:solidFill>
@@ -7044,7 +5585,7 @@
                         <a:tabLst/>
                         <a:defRPr/>
                       </a:pPr>
-                      <a:endParaRPr lang="en-US" sz="2400" dirty="0" smtClean="0">
+                      <a:endParaRPr lang="en-US" sz="3600" dirty="0">
                         <a:effectLst/>
                         <a:latin typeface="+mn-lt"/>
                         <a:cs typeface="Open Sans Hebrew" panose="00000500000000000000" pitchFamily="2" charset="-79"/>
@@ -7109,7 +5650,7 @@
         <p:spPr>
           <a:xfrm>
             <a:off x="10267328" y="776420"/>
-            <a:ext cx="16737952" cy="2739211"/>
+            <a:ext cx="16737952" cy="2831544"/>
           </a:xfrm>
           <a:prstGeom prst="rect">
             <a:avLst/>
@@ -7124,14 +5665,11 @@
           <a:p>
             <a:pPr algn="ctr"/>
             <a:r>
-              <a:rPr lang="en-US" sz="4800" b="1" dirty="0" smtClean="0">
+              <a:rPr lang="en-US" sz="5400" b="1" dirty="0">
                 <a:cs typeface="Open Sans Hebrew" panose="00000500000000000000" pitchFamily="2" charset="-79"/>
               </a:rPr>
               <a:t>Arduino Telemetry</a:t>
             </a:r>
-            <a:endParaRPr lang="en-US" sz="4800" b="1" dirty="0">
-              <a:cs typeface="Open Sans Hebrew" panose="00000500000000000000" pitchFamily="2" charset="-79"/>
-            </a:endParaRPr>
           </a:p>
           <a:p>
             <a:pPr algn="ctr"/>
@@ -7151,55 +5689,49 @@
               <a:rPr lang="en-US" sz="4000" dirty="0">
                 <a:cs typeface="Open Sans Hebrew" panose="00000500000000000000" pitchFamily="2" charset="-79"/>
               </a:rPr>
-              <a:t> </a:t>
-            </a:r>
-            <a:r>
-              <a:rPr lang="en-US" sz="4000" dirty="0" smtClean="0">
-                <a:cs typeface="Open Sans Hebrew" panose="00000500000000000000" pitchFamily="2" charset="-79"/>
-              </a:rPr>
-              <a:t>22-1-1-2666</a:t>
+              <a:t> 22-1-1-2666</a:t>
             </a:r>
           </a:p>
           <a:p>
             <a:pPr algn="ctr"/>
             <a:r>
-              <a:rPr lang="en-US" sz="4000" b="1" dirty="0" smtClean="0">
+              <a:rPr lang="en-US" sz="4000" b="1" dirty="0">
                 <a:cs typeface="Open Sans Hebrew" panose="00000500000000000000" pitchFamily="2" charset="-79"/>
               </a:rPr>
               <a:t>Names</a:t>
             </a:r>
             <a:r>
-              <a:rPr lang="en-US" sz="4000" dirty="0" smtClean="0">
+              <a:rPr lang="en-US" sz="4000" dirty="0">
                 <a:cs typeface="Open Sans Hebrew" panose="00000500000000000000" pitchFamily="2" charset="-79"/>
               </a:rPr>
               <a:t>: </a:t>
             </a:r>
             <a:r>
-              <a:rPr lang="en-US" sz="4400" dirty="0" smtClean="0">
+              <a:rPr lang="en-US" sz="4400" dirty="0">
                 <a:cs typeface="Open Sans Hebrew" panose="00000500000000000000" pitchFamily="2" charset="-79"/>
               </a:rPr>
               <a:t>Yonatan Amir, Yuri </a:t>
             </a:r>
             <a:r>
-              <a:rPr lang="en-US" sz="4400" dirty="0" err="1" smtClean="0">
+              <a:rPr lang="en-US" sz="4400" dirty="0" err="1">
                 <a:cs typeface="Open Sans Hebrew" panose="00000500000000000000" pitchFamily="2" charset="-79"/>
               </a:rPr>
               <a:t>Lukach</a:t>
             </a:r>
             <a:r>
-              <a:rPr lang="en-US" sz="4000" dirty="0" smtClean="0">
+              <a:rPr lang="en-US" sz="4000" dirty="0">
                 <a:cs typeface="Open Sans Hebrew" panose="00000500000000000000" pitchFamily="2" charset="-79"/>
               </a:rPr>
               <a:t> </a:t>
             </a:r>
-            <a:endParaRPr lang="he-IL" sz="4000" dirty="0" smtClean="0">
+            <a:endParaRPr lang="he-IL" sz="4000" dirty="0">
               <a:cs typeface="Open Sans Hebrew" panose="00000500000000000000" pitchFamily="2" charset="-79"/>
             </a:endParaRPr>
           </a:p>
           <a:p>
             <a:pPr algn="ctr"/>
             <a:r>
-              <a:rPr lang="en-US" sz="4000" b="1" dirty="0" smtClean="0">
+              <a:rPr lang="en-US" sz="4000" b="1" dirty="0">
                 <a:cs typeface="Open Sans Hebrew" panose="00000500000000000000" pitchFamily="2" charset="-79"/>
               </a:rPr>
               <a:t>Advisor</a:t>
@@ -7217,19 +5749,19 @@
               <a:t> </a:t>
             </a:r>
             <a:r>
-              <a:rPr lang="en-US" sz="4000" dirty="0" err="1" smtClean="0">
+              <a:rPr lang="en-US" sz="4000" dirty="0" err="1">
                 <a:cs typeface="Open Sans Hebrew" panose="00000500000000000000" pitchFamily="2" charset="-79"/>
               </a:rPr>
               <a:t>Simcha</a:t>
             </a:r>
             <a:r>
-              <a:rPr lang="en-US" sz="4000" dirty="0" smtClean="0">
+              <a:rPr lang="en-US" sz="4000" dirty="0">
                 <a:cs typeface="Open Sans Hebrew" panose="00000500000000000000" pitchFamily="2" charset="-79"/>
               </a:rPr>
               <a:t> </a:t>
             </a:r>
             <a:r>
-              <a:rPr lang="en-US" sz="4000" dirty="0" err="1" smtClean="0">
+              <a:rPr lang="en-US" sz="4000" dirty="0" err="1">
                 <a:cs typeface="Open Sans Hebrew" panose="00000500000000000000" pitchFamily="2" charset="-79"/>
               </a:rPr>
               <a:t>Leibovich</a:t>
@@ -7292,30 +5824,8 @@
         </p:blipFill>
         <p:spPr>
           <a:xfrm>
-            <a:off x="609600" y="18699968"/>
-            <a:ext cx="4806131" cy="4166003"/>
-          </a:xfrm>
-          <a:prstGeom prst="rect">
-            <a:avLst/>
-          </a:prstGeom>
-        </p:spPr>
-      </p:pic>
-      <p:pic>
-        <p:nvPicPr>
-          <p:cNvPr id="12" name="Image9"/>
-          <p:cNvPicPr/>
-          <p:nvPr/>
-        </p:nvPicPr>
-        <p:blipFill>
-          <a:blip r:embed="rId4"/>
-          <a:stretch>
-            <a:fillRect/>
-          </a:stretch>
-        </p:blipFill>
-        <p:spPr bwMode="auto">
-          <a:xfrm>
-            <a:off x="23941239" y="5405168"/>
-            <a:ext cx="6041456" cy="4094966"/>
+            <a:off x="12458701" y="6030925"/>
+            <a:ext cx="4876799" cy="4166003"/>
           </a:xfrm>
           <a:prstGeom prst="rect">
             <a:avLst/>
@@ -7331,14 +5841,14 @@
           <p:nvPr/>
         </p:nvPicPr>
         <p:blipFill>
-          <a:blip r:embed="rId5"/>
+          <a:blip r:embed="rId4"/>
           <a:stretch>
             <a:fillRect/>
           </a:stretch>
         </p:blipFill>
         <p:spPr>
           <a:xfrm>
-            <a:off x="23941239" y="11430406"/>
+            <a:off x="25126425" y="13753377"/>
             <a:ext cx="8720782" cy="4104769"/>
           </a:xfrm>
           <a:prstGeom prst="rect">
@@ -7353,7 +5863,7 @@
           <p:nvPr/>
         </p:nvPicPr>
         <p:blipFill>
-          <a:blip r:embed="rId6" cstate="print">
+          <a:blip r:embed="rId5" cstate="print">
             <a:extLst>
               <a:ext uri="{28A0092B-C50C-407E-A947-70E740481C1C}">
                 <a14:useLocalDpi xmlns:a14="http://schemas.microsoft.com/office/drawing/2010/main" val="0"/>
@@ -7367,7 +5877,7 @@
         </p:blipFill>
         <p:spPr bwMode="auto">
           <a:xfrm>
-            <a:off x="6635750" y="18590564"/>
+            <a:off x="18025322" y="5976222"/>
             <a:ext cx="4438650" cy="4275407"/>
           </a:xfrm>
           <a:prstGeom prst="rect">
@@ -7386,7 +5896,7 @@
           <p:nvPr/>
         </p:nvPicPr>
         <p:blipFill>
-          <a:blip r:embed="rId7" cstate="print">
+          <a:blip r:embed="rId6" cstate="print">
             <a:extLst>
               <a:ext uri="{28A0092B-C50C-407E-A947-70E740481C1C}">
                 <a14:useLocalDpi xmlns:a14="http://schemas.microsoft.com/office/drawing/2010/main" val="0"/>
@@ -7399,8 +5909,8 @@
         </p:blipFill>
         <p:spPr>
           <a:xfrm>
-            <a:off x="431262" y="14955519"/>
-            <a:ext cx="3339677" cy="2974811"/>
+            <a:off x="2081049" y="19306966"/>
+            <a:ext cx="7441324" cy="5271451"/>
           </a:xfrm>
           <a:prstGeom prst="rect">
             <a:avLst/>
@@ -7416,15 +5926,15 @@
           <p:nvPr/>
         </p:nvPicPr>
         <p:blipFill>
-          <a:blip r:embed="rId8"/>
+          <a:blip r:embed="rId7"/>
           <a:stretch>
             <a:fillRect/>
           </a:stretch>
         </p:blipFill>
         <p:spPr>
           <a:xfrm>
-            <a:off x="12214778" y="10923463"/>
-            <a:ext cx="3000912" cy="2559327"/>
+            <a:off x="12458701" y="12583745"/>
+            <a:ext cx="10005271" cy="8532992"/>
           </a:xfrm>
           <a:prstGeom prst="rect">
             <a:avLst/>
@@ -7433,20 +5943,34 @@
       </p:pic>
       <p:pic>
         <p:nvPicPr>
-          <p:cNvPr id="19" name="Image2"/>
-          <p:cNvPicPr/>
+          <p:cNvPr id="5" name="Picture 4">
+            <a:extLst>
+              <a:ext uri="{FF2B5EF4-FFF2-40B4-BE49-F238E27FC236}">
+                <a16:creationId xmlns:a16="http://schemas.microsoft.com/office/drawing/2014/main" id="{BC39F38B-061F-86CB-99F8-C7C99E3C2808}"/>
+              </a:ext>
+            </a:extLst>
+          </p:cNvPr>
+          <p:cNvPicPr>
+            <a:picLocks noChangeAspect="1"/>
+          </p:cNvPicPr>
           <p:nvPr/>
         </p:nvPicPr>
         <p:blipFill>
-          <a:blip r:embed="rId9"/>
+          <a:blip r:embed="rId8">
+            <a:extLst>
+              <a:ext uri="{28A0092B-C50C-407E-A947-70E740481C1C}">
+                <a14:useLocalDpi xmlns:a14="http://schemas.microsoft.com/office/drawing/2010/main" val="0"/>
+              </a:ext>
+            </a:extLst>
+          </a:blip>
           <a:stretch>
             <a:fillRect/>
           </a:stretch>
         </p:blipFill>
-        <p:spPr bwMode="auto">
+        <p:spPr>
           <a:xfrm>
-            <a:off x="12098233" y="19630602"/>
-            <a:ext cx="4279284" cy="3466466"/>
+            <a:off x="23634644" y="5005084"/>
+            <a:ext cx="5852172" cy="4389129"/>
           </a:xfrm>
           <a:prstGeom prst="rect">
             <a:avLst/>
@@ -7455,48 +5979,38 @@
       </p:pic>
       <p:pic>
         <p:nvPicPr>
-          <p:cNvPr id="22" name="תמונה 1"/>
-          <p:cNvPicPr/>
+          <p:cNvPr id="7" name="Picture 6">
+            <a:extLst>
+              <a:ext uri="{FF2B5EF4-FFF2-40B4-BE49-F238E27FC236}">
+                <a16:creationId xmlns:a16="http://schemas.microsoft.com/office/drawing/2014/main" id="{41B89B95-3A95-8A6B-9FA5-4F5B1F782D15}"/>
+              </a:ext>
+            </a:extLst>
+          </p:cNvPr>
+          <p:cNvPicPr>
+            <a:picLocks noChangeAspect="1"/>
+          </p:cNvPicPr>
           <p:nvPr/>
         </p:nvPicPr>
         <p:blipFill>
-          <a:blip r:embed="rId10"/>
-          <a:stretch/>
+          <a:blip r:embed="rId9">
+            <a:extLst>
+              <a:ext uri="{28A0092B-C50C-407E-A947-70E740481C1C}">
+                <a14:useLocalDpi xmlns:a14="http://schemas.microsoft.com/office/drawing/2010/main" val="0"/>
+              </a:ext>
+            </a:extLst>
+          </a:blip>
+          <a:stretch>
+            <a:fillRect/>
+          </a:stretch>
         </p:blipFill>
         <p:spPr>
           <a:xfrm>
-            <a:off x="23941239" y="17082138"/>
-            <a:ext cx="8219880" cy="4150800"/>
+            <a:off x="29201265" y="5005084"/>
+            <a:ext cx="5852172" cy="4389129"/>
           </a:xfrm>
           <a:prstGeom prst="rect">
             <a:avLst/>
           </a:prstGeom>
-          <a:ln w="0">
-            <a:noFill/>
-          </a:ln>
-        </p:spPr>
-      </p:pic>
-      <p:pic>
-        <p:nvPicPr>
-          <p:cNvPr id="23" name="Image15"/>
-          <p:cNvPicPr/>
-          <p:nvPr/>
-        </p:nvPicPr>
-        <p:blipFill>
-          <a:blip r:embed="rId11"/>
-          <a:stretch/>
-        </p:blipFill>
-        <p:spPr>
-          <a:xfrm>
-            <a:off x="12031637" y="14925490"/>
-            <a:ext cx="4174644" cy="2409199"/>
-          </a:xfrm>
-          <a:prstGeom prst="rect">
-            <a:avLst/>
-          </a:prstGeom>
-          <a:ln w="0">
-            <a:noFill/>
-          </a:ln>
         </p:spPr>
       </p:pic>
     </p:spTree>
@@ -7509,21 +6023,6 @@
   <p:clrMapOvr>
     <a:masterClrMapping/>
   </p:clrMapOvr>
-  <mc:AlternateContent xmlns:mc="http://schemas.openxmlformats.org/markup-compatibility/2006" xmlns:p14="http://schemas.microsoft.com/office/powerpoint/2010/main">
-    <mc:Choice Requires="p14">
-      <p:transition p14:dur="0"/>
-    </mc:Choice>
-    <mc:Fallback xmlns="">
-      <p:transition/>
-    </mc:Fallback>
-  </mc:AlternateContent>
-  <p:timing>
-    <p:tnLst>
-      <p:par>
-        <p:cTn id="1" dur="indefinite" restart="never" nodeType="tmRoot"/>
-      </p:par>
-    </p:tnLst>
-  </p:timing>
 </p:sld>
 </file>
 

</xml_diff>

<commit_message>
Changed some formatting in the presentation with Yoni. Changed spacing in project book table of contents. Added schematic in presentation. Changed some spacing in poster.
</commit_message>
<xml_diff>
--- a/ProjectDocuments/‏‏Poster_with_software.pptx
+++ b/ProjectDocuments/‏‏Poster_with_software.pptx
@@ -243,7 +243,7 @@
           <a:p>
             <a:fld id="{EBC92114-2DE2-4DBD-88F5-EC34E326FC88}" type="datetimeFigureOut">
               <a:rPr lang="he-IL" smtClean="0"/>
-              <a:t>י"ז/ניסן/תשפ"ד</a:t>
+              <a:t>כ"א/ניסן/תשפ"ד</a:t>
             </a:fld>
             <a:endParaRPr lang="he-IL"/>
           </a:p>
@@ -413,7 +413,7 @@
           <a:p>
             <a:fld id="{EBC92114-2DE2-4DBD-88F5-EC34E326FC88}" type="datetimeFigureOut">
               <a:rPr lang="he-IL" smtClean="0"/>
-              <a:t>י"ז/ניסן/תשפ"ד</a:t>
+              <a:t>כ"א/ניסן/תשפ"ד</a:t>
             </a:fld>
             <a:endParaRPr lang="he-IL"/>
           </a:p>
@@ -593,7 +593,7 @@
           <a:p>
             <a:fld id="{EBC92114-2DE2-4DBD-88F5-EC34E326FC88}" type="datetimeFigureOut">
               <a:rPr lang="he-IL" smtClean="0"/>
-              <a:t>י"ז/ניסן/תשפ"ד</a:t>
+              <a:t>כ"א/ניסן/תשפ"ד</a:t>
             </a:fld>
             <a:endParaRPr lang="he-IL"/>
           </a:p>
@@ -763,7 +763,7 @@
           <a:p>
             <a:fld id="{EBC92114-2DE2-4DBD-88F5-EC34E326FC88}" type="datetimeFigureOut">
               <a:rPr lang="he-IL" smtClean="0"/>
-              <a:t>י"ז/ניסן/תשפ"ד</a:t>
+              <a:t>כ"א/ניסן/תשפ"ד</a:t>
             </a:fld>
             <a:endParaRPr lang="he-IL"/>
           </a:p>
@@ -1007,7 +1007,7 @@
           <a:p>
             <a:fld id="{EBC92114-2DE2-4DBD-88F5-EC34E326FC88}" type="datetimeFigureOut">
               <a:rPr lang="he-IL" smtClean="0"/>
-              <a:t>י"ז/ניסן/תשפ"ד</a:t>
+              <a:t>כ"א/ניסן/תשפ"ד</a:t>
             </a:fld>
             <a:endParaRPr lang="he-IL"/>
           </a:p>
@@ -1239,7 +1239,7 @@
           <a:p>
             <a:fld id="{EBC92114-2DE2-4DBD-88F5-EC34E326FC88}" type="datetimeFigureOut">
               <a:rPr lang="he-IL" smtClean="0"/>
-              <a:t>י"ז/ניסן/תשפ"ד</a:t>
+              <a:t>כ"א/ניסן/תשפ"ד</a:t>
             </a:fld>
             <a:endParaRPr lang="he-IL"/>
           </a:p>
@@ -1606,7 +1606,7 @@
           <a:p>
             <a:fld id="{EBC92114-2DE2-4DBD-88F5-EC34E326FC88}" type="datetimeFigureOut">
               <a:rPr lang="he-IL" smtClean="0"/>
-              <a:t>י"ז/ניסן/תשפ"ד</a:t>
+              <a:t>כ"א/ניסן/תשפ"ד</a:t>
             </a:fld>
             <a:endParaRPr lang="he-IL"/>
           </a:p>
@@ -1724,7 +1724,7 @@
           <a:p>
             <a:fld id="{EBC92114-2DE2-4DBD-88F5-EC34E326FC88}" type="datetimeFigureOut">
               <a:rPr lang="he-IL" smtClean="0"/>
-              <a:t>י"ז/ניסן/תשפ"ד</a:t>
+              <a:t>כ"א/ניסן/תשפ"ד</a:t>
             </a:fld>
             <a:endParaRPr lang="he-IL"/>
           </a:p>
@@ -1819,7 +1819,7 @@
           <a:p>
             <a:fld id="{EBC92114-2DE2-4DBD-88F5-EC34E326FC88}" type="datetimeFigureOut">
               <a:rPr lang="he-IL" smtClean="0"/>
-              <a:t>י"ז/ניסן/תשפ"ד</a:t>
+              <a:t>כ"א/ניסן/תשפ"ד</a:t>
             </a:fld>
             <a:endParaRPr lang="he-IL"/>
           </a:p>
@@ -2096,7 +2096,7 @@
           <a:p>
             <a:fld id="{EBC92114-2DE2-4DBD-88F5-EC34E326FC88}" type="datetimeFigureOut">
               <a:rPr lang="he-IL" smtClean="0"/>
-              <a:t>י"ז/ניסן/תשפ"ד</a:t>
+              <a:t>כ"א/ניסן/תשפ"ד</a:t>
             </a:fld>
             <a:endParaRPr lang="he-IL"/>
           </a:p>
@@ -2353,7 +2353,7 @@
           <a:p>
             <a:fld id="{EBC92114-2DE2-4DBD-88F5-EC34E326FC88}" type="datetimeFigureOut">
               <a:rPr lang="he-IL" smtClean="0"/>
-              <a:t>י"ז/ניסן/תשפ"ד</a:t>
+              <a:t>כ"א/ניסן/תשפ"ד</a:t>
             </a:fld>
             <a:endParaRPr lang="he-IL"/>
           </a:p>
@@ -2566,7 +2566,7 @@
           <a:p>
             <a:fld id="{EBC92114-2DE2-4DBD-88F5-EC34E326FC88}" type="datetimeFigureOut">
               <a:rPr lang="he-IL" smtClean="0"/>
-              <a:t>י"ז/ניסן/תשפ"ד</a:t>
+              <a:t>כ"א/ניסן/תשפ"ד</a:t>
             </a:fld>
             <a:endParaRPr lang="he-IL"/>
           </a:p>
@@ -2980,7 +2980,7 @@
           <p:nvPr>
             <p:extLst>
               <p:ext uri="{D42A27DB-BD31-4B8C-83A1-F6EECF244321}">
-                <p14:modId xmlns:p14="http://schemas.microsoft.com/office/powerpoint/2010/main" val="3833155745"/>
+                <p14:modId xmlns:p14="http://schemas.microsoft.com/office/powerpoint/2010/main" val="3512963633"/>
               </p:ext>
             </p:extLst>
           </p:nvPr>
@@ -3867,6 +3867,58 @@
                         </a:rPr>
                         <a:t>visualize the hand of one of our testers.</a:t>
                       </a:r>
+                    </a:p>
+                    <a:p>
+                      <a:pPr marL="0" marR="0" lvl="0" indent="0" algn="l" defTabSz="2519995" rtl="0" eaLnBrk="1" fontAlgn="auto" latinLnBrk="0" hangingPunct="1">
+                        <a:lnSpc>
+                          <a:spcPct val="100000"/>
+                        </a:lnSpc>
+                        <a:spcBef>
+                          <a:spcPts val="0"/>
+                        </a:spcBef>
+                        <a:spcAft>
+                          <a:spcPts val="0"/>
+                        </a:spcAft>
+                        <a:buClrTx/>
+                        <a:buSzTx/>
+                        <a:buFontTx/>
+                        <a:buNone/>
+                        <a:tabLst/>
+                        <a:defRPr/>
+                      </a:pPr>
+                      <a:endParaRPr lang="en-US" sz="3600" b="0" i="0" dirty="0">
+                        <a:solidFill>
+                          <a:srgbClr val="0D0D0D"/>
+                        </a:solidFill>
+                        <a:effectLst/>
+                        <a:latin typeface="+mn-lt"/>
+                      </a:endParaRPr>
+                    </a:p>
+                    <a:p>
+                      <a:pPr marL="0" marR="0" lvl="0" indent="0" algn="l" defTabSz="2519995" rtl="0" eaLnBrk="1" fontAlgn="auto" latinLnBrk="0" hangingPunct="1">
+                        <a:lnSpc>
+                          <a:spcPct val="100000"/>
+                        </a:lnSpc>
+                        <a:spcBef>
+                          <a:spcPts val="0"/>
+                        </a:spcBef>
+                        <a:spcAft>
+                          <a:spcPts val="0"/>
+                        </a:spcAft>
+                        <a:buClrTx/>
+                        <a:buSzTx/>
+                        <a:buFontTx/>
+                        <a:buNone/>
+                        <a:tabLst/>
+                        <a:defRPr/>
+                      </a:pPr>
+                      <a:endParaRPr lang="en-US" sz="3600" b="0" i="0" dirty="0">
+                        <a:solidFill>
+                          <a:srgbClr val="0D0D0D"/>
+                        </a:solidFill>
+                        <a:effectLst/>
+                        <a:latin typeface="+mn-lt"/>
+                      </a:endParaRPr>
                     </a:p>
                     <a:p>
                       <a:pPr marL="0" marR="0" lvl="0" indent="0" algn="l" defTabSz="2519995" rtl="0" eaLnBrk="1" fontAlgn="auto" latinLnBrk="0" hangingPunct="1">
@@ -5804,36 +5856,6 @@
       </p:pic>
       <p:pic>
         <p:nvPicPr>
-          <p:cNvPr id="4" name="תמונה 3"/>
-          <p:cNvPicPr>
-            <a:picLocks noChangeAspect="1"/>
-          </p:cNvPicPr>
-          <p:nvPr/>
-        </p:nvPicPr>
-        <p:blipFill>
-          <a:blip r:embed="rId3">
-            <a:extLst>
-              <a:ext uri="{28A0092B-C50C-407E-A947-70E740481C1C}">
-                <a14:useLocalDpi xmlns:a14="http://schemas.microsoft.com/office/drawing/2010/main" val="0"/>
-              </a:ext>
-            </a:extLst>
-          </a:blip>
-          <a:stretch>
-            <a:fillRect/>
-          </a:stretch>
-        </p:blipFill>
-        <p:spPr>
-          <a:xfrm>
-            <a:off x="12458701" y="6030925"/>
-            <a:ext cx="4876799" cy="4166003"/>
-          </a:xfrm>
-          <a:prstGeom prst="rect">
-            <a:avLst/>
-          </a:prstGeom>
-        </p:spPr>
-      </p:pic>
-      <p:pic>
-        <p:nvPicPr>
           <p:cNvPr id="13" name="תמונה 12"/>
           <p:cNvPicPr>
             <a:picLocks noChangeAspect="1"/>
@@ -5841,7 +5863,7 @@
           <p:nvPr/>
         </p:nvPicPr>
         <p:blipFill>
-          <a:blip r:embed="rId4"/>
+          <a:blip r:embed="rId3"/>
           <a:stretch>
             <a:fillRect/>
           </a:stretch>
@@ -5863,7 +5885,7 @@
           <p:nvPr/>
         </p:nvPicPr>
         <p:blipFill>
-          <a:blip r:embed="rId5" cstate="print">
+          <a:blip r:embed="rId4" cstate="print">
             <a:extLst>
               <a:ext uri="{28A0092B-C50C-407E-A947-70E740481C1C}">
                 <a14:useLocalDpi xmlns:a14="http://schemas.microsoft.com/office/drawing/2010/main" val="0"/>
@@ -5896,7 +5918,7 @@
           <p:nvPr/>
         </p:nvPicPr>
         <p:blipFill>
-          <a:blip r:embed="rId6" cstate="print">
+          <a:blip r:embed="rId5" cstate="print">
             <a:extLst>
               <a:ext uri="{28A0092B-C50C-407E-A947-70E740481C1C}">
                 <a14:useLocalDpi xmlns:a14="http://schemas.microsoft.com/office/drawing/2010/main" val="0"/>
@@ -5926,14 +5948,14 @@
           <p:nvPr/>
         </p:nvPicPr>
         <p:blipFill>
-          <a:blip r:embed="rId7"/>
+          <a:blip r:embed="rId6"/>
           <a:stretch>
             <a:fillRect/>
           </a:stretch>
         </p:blipFill>
         <p:spPr>
           <a:xfrm>
-            <a:off x="12458701" y="12583745"/>
+            <a:off x="12583318" y="13118347"/>
             <a:ext cx="10005271" cy="8532992"/>
           </a:xfrm>
           <a:prstGeom prst="rect">
@@ -5956,7 +5978,7 @@
           <p:nvPr/>
         </p:nvPicPr>
         <p:blipFill>
-          <a:blip r:embed="rId8">
+          <a:blip r:embed="rId7">
             <a:extLst>
               <a:ext uri="{28A0092B-C50C-407E-A947-70E740481C1C}">
                 <a14:useLocalDpi xmlns:a14="http://schemas.microsoft.com/office/drawing/2010/main" val="0"/>
@@ -5992,7 +6014,7 @@
           <p:nvPr/>
         </p:nvPicPr>
         <p:blipFill>
-          <a:blip r:embed="rId9">
+          <a:blip r:embed="rId8">
             <a:extLst>
               <a:ext uri="{28A0092B-C50C-407E-A947-70E740481C1C}">
                 <a14:useLocalDpi xmlns:a14="http://schemas.microsoft.com/office/drawing/2010/main" val="0"/>
@@ -6007,6 +6029,42 @@
           <a:xfrm>
             <a:off x="29201265" y="5005084"/>
             <a:ext cx="5852172" cy="4389129"/>
+          </a:xfrm>
+          <a:prstGeom prst="rect">
+            <a:avLst/>
+          </a:prstGeom>
+        </p:spPr>
+      </p:pic>
+      <p:pic>
+        <p:nvPicPr>
+          <p:cNvPr id="6" name="Picture 5" descr="A diagram of a computer system&#10;&#10;Description automatically generated">
+            <a:extLst>
+              <a:ext uri="{FF2B5EF4-FFF2-40B4-BE49-F238E27FC236}">
+                <a16:creationId xmlns:a16="http://schemas.microsoft.com/office/drawing/2014/main" id="{C78E9AA8-A656-B464-ED26-846C0369E0C3}"/>
+              </a:ext>
+            </a:extLst>
+          </p:cNvPr>
+          <p:cNvPicPr>
+            <a:picLocks noChangeAspect="1"/>
+          </p:cNvPicPr>
+          <p:nvPr/>
+        </p:nvPicPr>
+        <p:blipFill>
+          <a:blip r:embed="rId9">
+            <a:extLst>
+              <a:ext uri="{28A0092B-C50C-407E-A947-70E740481C1C}">
+                <a14:useLocalDpi xmlns:a14="http://schemas.microsoft.com/office/drawing/2010/main" val="0"/>
+              </a:ext>
+            </a:extLst>
+          </a:blip>
+          <a:stretch>
+            <a:fillRect/>
+          </a:stretch>
+        </p:blipFill>
+        <p:spPr>
+          <a:xfrm>
+            <a:off x="12063671" y="6454526"/>
+            <a:ext cx="5522283" cy="4618530"/>
           </a:xfrm>
           <a:prstGeom prst="rect">
             <a:avLst/>

</xml_diff>